<commit_message>
feat: session 07 nest.js added
</commit_message>
<xml_diff>
--- a/nestjs/nestjs-07.pptx
+++ b/nestjs/nestjs-07.pptx
@@ -5,30 +5,26 @@
     <p:sldMasterId id="2147483705" r:id="rId1"/>
   </p:sldMasterIdLst>
   <p:notesMasterIdLst>
-    <p:notesMasterId r:id="rId23"/>
+    <p:notesMasterId r:id="rId19"/>
   </p:notesMasterIdLst>
   <p:sldIdLst>
     <p:sldId id="259" r:id="rId2"/>
     <p:sldId id="296" r:id="rId3"/>
-    <p:sldId id="321" r:id="rId4"/>
-    <p:sldId id="322" r:id="rId5"/>
-    <p:sldId id="323" r:id="rId6"/>
-    <p:sldId id="324" r:id="rId7"/>
-    <p:sldId id="325" r:id="rId8"/>
-    <p:sldId id="326" r:id="rId9"/>
-    <p:sldId id="330" r:id="rId10"/>
-    <p:sldId id="327" r:id="rId11"/>
-    <p:sldId id="328" r:id="rId12"/>
-    <p:sldId id="331" r:id="rId13"/>
-    <p:sldId id="329" r:id="rId14"/>
-    <p:sldId id="332" r:id="rId15"/>
-    <p:sldId id="333" r:id="rId16"/>
-    <p:sldId id="334" r:id="rId17"/>
-    <p:sldId id="335" r:id="rId18"/>
-    <p:sldId id="336" r:id="rId19"/>
-    <p:sldId id="337" r:id="rId20"/>
-    <p:sldId id="338" r:id="rId21"/>
-    <p:sldId id="320" r:id="rId22"/>
+    <p:sldId id="333" r:id="rId4"/>
+    <p:sldId id="341" r:id="rId5"/>
+    <p:sldId id="342" r:id="rId6"/>
+    <p:sldId id="343" r:id="rId7"/>
+    <p:sldId id="334" r:id="rId8"/>
+    <p:sldId id="335" r:id="rId9"/>
+    <p:sldId id="336" r:id="rId10"/>
+    <p:sldId id="344" r:id="rId11"/>
+    <p:sldId id="337" r:id="rId12"/>
+    <p:sldId id="338" r:id="rId13"/>
+    <p:sldId id="339" r:id="rId14"/>
+    <p:sldId id="345" r:id="rId15"/>
+    <p:sldId id="346" r:id="rId16"/>
+    <p:sldId id="340" r:id="rId17"/>
+    <p:sldId id="320" r:id="rId18"/>
   </p:sldIdLst>
   <p:sldSz cx="12192000" cy="6858000"/>
   <p:notesSz cx="6858000" cy="9144000"/>
@@ -217,7 +213,7 @@
           <a:p>
             <a:fld id="{9B9ECB28-6A22-4037-9487-F3F739F744D6}" type="datetimeFigureOut">
               <a:rPr lang="en-US" smtClean="0"/>
-              <a:t>1/29/2022</a:t>
+              <a:t>1/30/2022</a:t>
             </a:fld>
             <a:endParaRPr lang="en-US"/>
           </a:p>
@@ -530,6 +526,96 @@
           <a:p>
             <a:r>
               <a:rPr lang="en-US" dirty="0"/>
+              <a:t>Link for more info: https://hotovo.com/2021/06/30/inside-nestjs-project</a:t>
+            </a:r>
+          </a:p>
+          <a:p>
+            <a:endParaRPr lang="en-US" dirty="0"/>
+          </a:p>
+        </p:txBody>
+      </p:sp>
+      <p:sp>
+        <p:nvSpPr>
+          <p:cNvPr id="4" name="Slide Number Placeholder 3"/>
+          <p:cNvSpPr>
+            <a:spLocks noGrp="1"/>
+          </p:cNvSpPr>
+          <p:nvPr>
+            <p:ph type="sldNum" sz="quarter" idx="5"/>
+          </p:nvPr>
+        </p:nvSpPr>
+        <p:spPr/>
+        <p:txBody>
+          <a:bodyPr/>
+          <a:lstStyle/>
+          <a:p>
+            <a:fld id="{0FE84E6F-3671-472C-BE6F-A37BC298F4AB}" type="slidenum">
+              <a:rPr lang="en-US" smtClean="0"/>
+              <a:t>16</a:t>
+            </a:fld>
+            <a:endParaRPr lang="en-US"/>
+          </a:p>
+        </p:txBody>
+      </p:sp>
+    </p:spTree>
+    <p:extLst>
+      <p:ext uri="{BB962C8B-B14F-4D97-AF65-F5344CB8AC3E}">
+        <p14:creationId xmlns:p14="http://schemas.microsoft.com/office/powerpoint/2010/main" val="3704070817"/>
+      </p:ext>
+    </p:extLst>
+  </p:cSld>
+  <p:clrMapOvr>
+    <a:masterClrMapping/>
+  </p:clrMapOvr>
+</p:notes>
+</file>
+
+<file path=ppt/notesSlides/notesSlide2.xml><?xml version="1.0" encoding="utf-8"?>
+<p:notes xmlns:a="http://schemas.openxmlformats.org/drawingml/2006/main" xmlns:r="http://schemas.openxmlformats.org/officeDocument/2006/relationships" xmlns:p="http://schemas.openxmlformats.org/presentationml/2006/main">
+  <p:cSld>
+    <p:spTree>
+      <p:nvGrpSpPr>
+        <p:cNvPr id="1" name=""/>
+        <p:cNvGrpSpPr/>
+        <p:nvPr/>
+      </p:nvGrpSpPr>
+      <p:grpSpPr>
+        <a:xfrm>
+          <a:off x="0" y="0"/>
+          <a:ext cx="0" cy="0"/>
+          <a:chOff x="0" y="0"/>
+          <a:chExt cx="0" cy="0"/>
+        </a:xfrm>
+      </p:grpSpPr>
+      <p:sp>
+        <p:nvSpPr>
+          <p:cNvPr id="2" name="Slide Image Placeholder 1"/>
+          <p:cNvSpPr>
+            <a:spLocks noGrp="1" noRot="1" noChangeAspect="1"/>
+          </p:cNvSpPr>
+          <p:nvPr>
+            <p:ph type="sldImg"/>
+          </p:nvPr>
+        </p:nvSpPr>
+        <p:spPr/>
+      </p:sp>
+      <p:sp>
+        <p:nvSpPr>
+          <p:cNvPr id="3" name="Notes Placeholder 2"/>
+          <p:cNvSpPr>
+            <a:spLocks noGrp="1"/>
+          </p:cNvSpPr>
+          <p:nvPr>
+            <p:ph type="body" idx="1"/>
+          </p:nvPr>
+        </p:nvSpPr>
+        <p:spPr/>
+        <p:txBody>
+          <a:bodyPr/>
+          <a:lstStyle/>
+          <a:p>
+            <a:r>
+              <a:rPr lang="en-US" dirty="0"/>
               <a:t>Hint: </a:t>
             </a:r>
             <a:r>
@@ -608,7 +694,7 @@
           <a:p>
             <a:fld id="{0FE84E6F-3671-472C-BE6F-A37BC298F4AB}" type="slidenum">
               <a:rPr lang="en-US" smtClean="0"/>
-              <a:t>21</a:t>
+              <a:t>17</a:t>
             </a:fld>
             <a:endParaRPr lang="en-US"/>
           </a:p>
@@ -811,7 +897,7 @@
           <a:p>
             <a:fld id="{19B6F524-99F3-4BEA-ACD7-976EF4D36657}" type="datetime1">
               <a:rPr lang="en-US" smtClean="0"/>
-              <a:t>1/29/2022</a:t>
+              <a:t>1/30/2022</a:t>
             </a:fld>
             <a:endParaRPr lang="en-US" dirty="0"/>
           </a:p>
@@ -1120,7 +1206,7 @@
           <a:p>
             <a:fld id="{2145C3A9-05D9-428D-9788-A7F14838F6F9}" type="datetime1">
               <a:rPr lang="en-US" smtClean="0"/>
-              <a:t>1/29/2022</a:t>
+              <a:t>1/30/2022</a:t>
             </a:fld>
             <a:endParaRPr lang="en-US" dirty="0"/>
           </a:p>
@@ -1318,7 +1404,7 @@
           <a:p>
             <a:fld id="{82C701FB-B03E-4981-A9F8-99B474DD173A}" type="datetime1">
               <a:rPr lang="en-US" smtClean="0"/>
-              <a:t>1/29/2022</a:t>
+              <a:t>1/30/2022</a:t>
             </a:fld>
             <a:endParaRPr lang="en-US" dirty="0"/>
           </a:p>
@@ -1585,7 +1671,7 @@
           <a:p>
             <a:fld id="{7A7E8EF3-CBF7-4EB9-B6E5-3754574E3433}" type="datetime1">
               <a:rPr lang="en-US" smtClean="0"/>
-              <a:t>1/29/2022</a:t>
+              <a:t>1/30/2022</a:t>
             </a:fld>
             <a:endParaRPr lang="en-US" dirty="0"/>
           </a:p>
@@ -2025,7 +2111,7 @@
           <a:p>
             <a:fld id="{DA8A4A96-31AC-487C-9F15-1822D58542B7}" type="datetime1">
               <a:rPr lang="en-US" smtClean="0"/>
-              <a:t>1/29/2022</a:t>
+              <a:t>1/30/2022</a:t>
             </a:fld>
             <a:endParaRPr lang="en-US" dirty="0"/>
           </a:p>
@@ -2566,7 +2652,7 @@
           <a:p>
             <a:fld id="{FBBF9546-09C4-4F24-A284-5B81FF8659B4}" type="datetime1">
               <a:rPr lang="en-US" smtClean="0"/>
-              <a:t>1/29/2022</a:t>
+              <a:t>1/30/2022</a:t>
             </a:fld>
             <a:endParaRPr lang="en-US" dirty="0"/>
           </a:p>
@@ -3452,7 +3538,7 @@
           <a:p>
             <a:fld id="{5BF4405D-15A5-450B-B053-484859B9C8F7}" type="datetime1">
               <a:rPr lang="en-US" smtClean="0"/>
-              <a:t>1/29/2022</a:t>
+              <a:t>1/30/2022</a:t>
             </a:fld>
             <a:endParaRPr lang="en-US" dirty="0"/>
           </a:p>
@@ -3626,7 +3712,7 @@
           <a:p>
             <a:fld id="{E0366559-EC21-40C1-8A65-9A3B4EA78391}" type="datetime1">
               <a:rPr lang="en-US" smtClean="0"/>
-              <a:t>1/29/2022</a:t>
+              <a:t>1/30/2022</a:t>
             </a:fld>
             <a:endParaRPr lang="en-US" dirty="0"/>
           </a:p>
@@ -3814,7 +3900,7 @@
           <a:p>
             <a:fld id="{4F09CA92-695C-4FFA-8E37-4D2C288BCC04}" type="datetime1">
               <a:rPr lang="en-US" smtClean="0"/>
-              <a:t>1/29/2022</a:t>
+              <a:t>1/30/2022</a:t>
             </a:fld>
             <a:endParaRPr lang="en-US" dirty="0"/>
           </a:p>
@@ -3988,7 +4074,7 @@
           <a:p>
             <a:fld id="{CA551262-FC07-4FE4-9221-F72F7D4F209A}" type="datetime1">
               <a:rPr lang="en-US" smtClean="0"/>
-              <a:t>1/29/2022</a:t>
+              <a:t>1/30/2022</a:t>
             </a:fld>
             <a:endParaRPr lang="en-US" dirty="0"/>
           </a:p>
@@ -4236,7 +4322,7 @@
           <a:p>
             <a:fld id="{46A321E4-8899-4F7D-BEB1-BD52626ABD8D}" type="datetime1">
               <a:rPr lang="en-US" smtClean="0"/>
-              <a:t>1/29/2022</a:t>
+              <a:t>1/30/2022</a:t>
             </a:fld>
             <a:endParaRPr lang="en-US" dirty="0"/>
           </a:p>
@@ -4482,7 +4568,7 @@
           <a:p>
             <a:fld id="{B53F6DFA-8A0E-4513-867D-18B9AA66B23C}" type="datetime1">
               <a:rPr lang="en-US" smtClean="0"/>
-              <a:t>1/29/2022</a:t>
+              <a:t>1/30/2022</a:t>
             </a:fld>
             <a:endParaRPr lang="en-US" dirty="0"/>
           </a:p>
@@ -4969,7 +5055,7 @@
           <a:p>
             <a:fld id="{154283A7-B9AC-454B-A468-44B75A398B49}" type="datetime1">
               <a:rPr lang="en-US" smtClean="0"/>
-              <a:t>1/29/2022</a:t>
+              <a:t>1/30/2022</a:t>
             </a:fld>
             <a:endParaRPr lang="en-US" dirty="0"/>
           </a:p>
@@ -5091,7 +5177,7 @@
           <a:p>
             <a:fld id="{A3F8184D-DEDD-48A0-9ACA-5F6ED9EFE5B8}" type="datetime1">
               <a:rPr lang="en-US" smtClean="0"/>
-              <a:t>1/29/2022</a:t>
+              <a:t>1/30/2022</a:t>
             </a:fld>
             <a:endParaRPr lang="en-US" dirty="0"/>
           </a:p>
@@ -5190,7 +5276,7 @@
           <a:p>
             <a:fld id="{BF38AC0E-F520-48F3-BA14-8BAB82D735FB}" type="datetime1">
               <a:rPr lang="en-US" smtClean="0"/>
-              <a:t>1/29/2022</a:t>
+              <a:t>1/30/2022</a:t>
             </a:fld>
             <a:endParaRPr lang="en-US" dirty="0"/>
           </a:p>
@@ -5449,7 +5535,7 @@
           <a:p>
             <a:fld id="{317D0F2A-2724-4AD4-BF4C-A7B1910D9412}" type="datetime1">
               <a:rPr lang="en-US" smtClean="0"/>
-              <a:t>1/29/2022</a:t>
+              <a:t>1/30/2022</a:t>
             </a:fld>
             <a:endParaRPr lang="en-US" dirty="0"/>
           </a:p>
@@ -5760,7 +5846,7 @@
           <a:p>
             <a:fld id="{9A0B82A5-4A21-4F82-91DB-989CE997E82E}" type="datetime1">
               <a:rPr lang="en-US" smtClean="0"/>
-              <a:t>1/29/2022</a:t>
+              <a:t>1/30/2022</a:t>
             </a:fld>
             <a:endParaRPr lang="en-US" dirty="0"/>
           </a:p>
@@ -5997,7 +6083,7 @@
           <a:p>
             <a:fld id="{01BFEF8A-AE08-4951-B923-589F814B0C31}" type="datetime1">
               <a:rPr lang="en-US" smtClean="0"/>
-              <a:t>1/29/2022</a:t>
+              <a:t>1/30/2022</a:t>
             </a:fld>
             <a:endParaRPr lang="en-US" dirty="0"/>
           </a:p>
@@ -6815,7 +6901,7 @@
           <a:p>
             <a:r>
               <a:rPr lang="en-US" sz="2800" dirty="0"/>
-              <a:t>05 – Configuration</a:t>
+              <a:t>06 – Other building blocks</a:t>
             </a:r>
           </a:p>
         </p:txBody>
@@ -6855,7 +6941,7 @@
           <p:cNvPr id="2" name="Title 1">
             <a:extLst>
               <a:ext uri="{FF2B5EF4-FFF2-40B4-BE49-F238E27FC236}">
-                <a16:creationId xmlns:a16="http://schemas.microsoft.com/office/drawing/2014/main" id="{1B8DF1F3-3B5D-4E35-8104-6B641CA39837}"/>
+                <a16:creationId xmlns:a16="http://schemas.microsoft.com/office/drawing/2014/main" id="{BEB6AD25-6188-4B89-96E1-11A10EA5C3D4}"/>
               </a:ext>
             </a:extLst>
           </p:cNvPr>
@@ -6873,18 +6959,17 @@
           <a:p>
             <a:r>
               <a:rPr lang="en-US" dirty="0"/>
-              <a:t>Demo</a:t>
-            </a:r>
-            <a:endParaRPr lang="fa-IR" dirty="0"/>
-          </a:p>
-        </p:txBody>
-      </p:sp>
-      <p:sp>
-        <p:nvSpPr>
-          <p:cNvPr id="3" name="Content Placeholder 2">
+              <a:t>ER</a:t>
+            </a:r>
+          </a:p>
+        </p:txBody>
+      </p:sp>
+      <p:sp>
+        <p:nvSpPr>
+          <p:cNvPr id="4" name="Footer Placeholder 3">
             <a:extLst>
               <a:ext uri="{FF2B5EF4-FFF2-40B4-BE49-F238E27FC236}">
-                <a16:creationId xmlns:a16="http://schemas.microsoft.com/office/drawing/2014/main" id="{43054017-0CDB-4108-B0ED-D6E948CF1C44}"/>
+                <a16:creationId xmlns:a16="http://schemas.microsoft.com/office/drawing/2014/main" id="{344B651D-9FE7-42E3-AAE4-C98F47FFD8C5}"/>
               </a:ext>
             </a:extLst>
           </p:cNvPr>
@@ -6892,78 +6977,6 @@
             <a:spLocks noGrp="1"/>
           </p:cNvSpPr>
           <p:nvPr>
-            <p:ph idx="1"/>
-          </p:nvPr>
-        </p:nvSpPr>
-        <p:spPr/>
-        <p:txBody>
-          <a:bodyPr>
-            <a:normAutofit/>
-          </a:bodyPr>
-          <a:lstStyle/>
-          <a:p>
-            <a:r>
-              <a:rPr lang="en-US" dirty="0"/>
-              <a:t>Catch exception filters:</a:t>
-            </a:r>
-          </a:p>
-          <a:p>
-            <a:pPr lvl="1"/>
-            <a:r>
-              <a:rPr lang="en-US" dirty="0"/>
-              <a:t>Built-in exception handler layer to process and handles all unhandled exceptions</a:t>
-            </a:r>
-          </a:p>
-          <a:p>
-            <a:pPr lvl="1"/>
-            <a:r>
-              <a:rPr lang="en-US" dirty="0"/>
-              <a:t>When an exception not handled by our application, it automatically caught by this layer</a:t>
-            </a:r>
-          </a:p>
-          <a:p>
-            <a:pPr lvl="1"/>
-            <a:r>
-              <a:rPr lang="en-US" dirty="0"/>
-              <a:t>Suppose we want to return exception message schema in different way</a:t>
-            </a:r>
-          </a:p>
-          <a:p>
-            <a:pPr lvl="1"/>
-            <a:r>
-              <a:rPr lang="en-US" dirty="0"/>
-              <a:t>nest g filter &lt;path-to-your-class&gt;</a:t>
-            </a:r>
-          </a:p>
-          <a:p>
-            <a:pPr lvl="1"/>
-            <a:r>
-              <a:rPr lang="en-US" dirty="0"/>
-              <a:t>@Catch decorator binds required metadata to the exception filter</a:t>
-            </a:r>
-          </a:p>
-          <a:p>
-            <a:pPr lvl="2"/>
-            <a:r>
-              <a:rPr lang="en-US" dirty="0"/>
-              <a:t>We can pass all the exception types we want to handle to this decorator (in comma separated format)</a:t>
-            </a:r>
-          </a:p>
-        </p:txBody>
-      </p:sp>
-      <p:sp>
-        <p:nvSpPr>
-          <p:cNvPr id="4" name="Footer Placeholder 3">
-            <a:extLst>
-              <a:ext uri="{FF2B5EF4-FFF2-40B4-BE49-F238E27FC236}">
-                <a16:creationId xmlns:a16="http://schemas.microsoft.com/office/drawing/2014/main" id="{4158419A-71E8-4EE8-85D6-0BC4AC6D6EF9}"/>
-              </a:ext>
-            </a:extLst>
-          </p:cNvPr>
-          <p:cNvSpPr>
-            <a:spLocks noGrp="1"/>
-          </p:cNvSpPr>
-          <p:nvPr>
             <p:ph type="ftr" sz="quarter" idx="11"/>
           </p:nvPr>
         </p:nvSpPr>
@@ -6985,7 +6998,7 @@
           <p:cNvPr id="5" name="Slide Number Placeholder 4">
             <a:extLst>
               <a:ext uri="{FF2B5EF4-FFF2-40B4-BE49-F238E27FC236}">
-                <a16:creationId xmlns:a16="http://schemas.microsoft.com/office/drawing/2014/main" id="{BBA32E10-89F5-4C6B-BEC7-B55B45AE1605}"/>
+                <a16:creationId xmlns:a16="http://schemas.microsoft.com/office/drawing/2014/main" id="{C24172A4-2575-480C-B43A-A457BCE23B65}"/>
               </a:ext>
             </a:extLst>
           </p:cNvPr>
@@ -7009,10 +7022,59 @@
           </a:p>
         </p:txBody>
       </p:sp>
+      <p:pic>
+        <p:nvPicPr>
+          <p:cNvPr id="3076" name="Picture 4">
+            <a:extLst>
+              <a:ext uri="{FF2B5EF4-FFF2-40B4-BE49-F238E27FC236}">
+                <a16:creationId xmlns:a16="http://schemas.microsoft.com/office/drawing/2014/main" id="{0A3E7E81-472D-406C-9AAB-4F9FF58D817F}"/>
+              </a:ext>
+            </a:extLst>
+          </p:cNvPr>
+          <p:cNvPicPr>
+            <a:picLocks noGrp="1" noChangeAspect="1" noChangeArrowheads="1"/>
+          </p:cNvPicPr>
+          <p:nvPr>
+            <p:ph idx="1"/>
+          </p:nvPr>
+        </p:nvPicPr>
+        <p:blipFill>
+          <a:blip r:embed="rId2">
+            <a:extLst>
+              <a:ext uri="{28A0092B-C50C-407E-A947-70E740481C1C}">
+                <a14:useLocalDpi xmlns:a14="http://schemas.microsoft.com/office/drawing/2010/main" val="0"/>
+              </a:ext>
+            </a:extLst>
+          </a:blip>
+          <a:srcRect/>
+          <a:stretch>
+            <a:fillRect/>
+          </a:stretch>
+        </p:blipFill>
+        <p:spPr bwMode="auto">
+          <a:xfrm>
+            <a:off x="2259725" y="1271152"/>
+            <a:ext cx="7663026" cy="5296772"/>
+          </a:xfrm>
+          <a:prstGeom prst="rect">
+            <a:avLst/>
+          </a:prstGeom>
+          <a:noFill/>
+          <a:extLst>
+            <a:ext uri="{909E8E84-426E-40DD-AFC4-6F175D3DCCD1}">
+              <a14:hiddenFill xmlns:a14="http://schemas.microsoft.com/office/drawing/2010/main">
+                <a:solidFill>
+                  <a:srgbClr val="FFFFFF"/>
+                </a:solidFill>
+              </a14:hiddenFill>
+            </a:ext>
+          </a:extLst>
+        </p:spPr>
+      </p:pic>
     </p:spTree>
     <p:extLst>
       <p:ext uri="{BB962C8B-B14F-4D97-AF65-F5344CB8AC3E}">
-        <p14:creationId xmlns:p14="http://schemas.microsoft.com/office/powerpoint/2010/main" val="4204436340"/>
+        <p14:creationId xmlns:p14="http://schemas.microsoft.com/office/powerpoint/2010/main" val="2303761078"/>
       </p:ext>
     </p:extLst>
   </p:cSld>
@@ -7044,1501 +7106,6 @@
           <p:cNvPr id="2" name="Title 1">
             <a:extLst>
               <a:ext uri="{FF2B5EF4-FFF2-40B4-BE49-F238E27FC236}">
-                <a16:creationId xmlns:a16="http://schemas.microsoft.com/office/drawing/2014/main" id="{1B8DF1F3-3B5D-4E35-8104-6B641CA39837}"/>
-              </a:ext>
-            </a:extLst>
-          </p:cNvPr>
-          <p:cNvSpPr>
-            <a:spLocks noGrp="1"/>
-          </p:cNvSpPr>
-          <p:nvPr>
-            <p:ph type="title"/>
-          </p:nvPr>
-        </p:nvSpPr>
-        <p:spPr/>
-        <p:txBody>
-          <a:bodyPr/>
-          <a:lstStyle/>
-          <a:p>
-            <a:r>
-              <a:rPr lang="en-US" dirty="0"/>
-              <a:t>Demo</a:t>
-            </a:r>
-            <a:endParaRPr lang="fa-IR" dirty="0"/>
-          </a:p>
-        </p:txBody>
-      </p:sp>
-      <p:sp>
-        <p:nvSpPr>
-          <p:cNvPr id="3" name="Content Placeholder 2">
-            <a:extLst>
-              <a:ext uri="{FF2B5EF4-FFF2-40B4-BE49-F238E27FC236}">
-                <a16:creationId xmlns:a16="http://schemas.microsoft.com/office/drawing/2014/main" id="{43054017-0CDB-4108-B0ED-D6E948CF1C44}"/>
-              </a:ext>
-            </a:extLst>
-          </p:cNvPr>
-          <p:cNvSpPr>
-            <a:spLocks noGrp="1"/>
-          </p:cNvSpPr>
-          <p:nvPr>
-            <p:ph idx="1"/>
-          </p:nvPr>
-        </p:nvSpPr>
-        <p:spPr/>
-        <p:txBody>
-          <a:bodyPr>
-            <a:normAutofit/>
-          </a:bodyPr>
-          <a:lstStyle/>
-          <a:p>
-            <a:r>
-              <a:rPr lang="en-US" dirty="0"/>
-              <a:t>Catch exception filters:</a:t>
-            </a:r>
-          </a:p>
-          <a:p>
-            <a:pPr lvl="1"/>
-            <a:r>
-              <a:rPr lang="en-US" dirty="0"/>
-              <a:t>How to get response object? </a:t>
-            </a:r>
-          </a:p>
-          <a:p>
-            <a:pPr lvl="2"/>
-            <a:r>
-              <a:rPr lang="en-US" dirty="0"/>
-              <a:t>Through host argument </a:t>
-            </a:r>
-          </a:p>
-          <a:p>
-            <a:pPr lvl="3"/>
-            <a:r>
-              <a:rPr lang="en-US" dirty="0" err="1"/>
-              <a:t>host.switchToHttp</a:t>
-            </a:r>
-            <a:r>
-              <a:rPr lang="en-US" dirty="0"/>
-              <a:t>()</a:t>
-            </a:r>
-          </a:p>
-          <a:p>
-            <a:pPr lvl="3"/>
-            <a:r>
-              <a:rPr lang="en-US" dirty="0"/>
-              <a:t>This will give us the context, and then </a:t>
-            </a:r>
-            <a:r>
-              <a:rPr lang="en-US" dirty="0" err="1"/>
-              <a:t>getResponse</a:t>
-            </a:r>
-            <a:endParaRPr lang="en-US" dirty="0"/>
-          </a:p>
-          <a:p>
-            <a:pPr lvl="1"/>
-            <a:r>
-              <a:rPr lang="en-US" dirty="0"/>
-              <a:t>You can implements error monitoring easily with this filter (like using sentry.io)</a:t>
-            </a:r>
-          </a:p>
-          <a:p>
-            <a:pPr lvl="1"/>
-            <a:endParaRPr lang="en-US" dirty="0"/>
-          </a:p>
-        </p:txBody>
-      </p:sp>
-      <p:sp>
-        <p:nvSpPr>
-          <p:cNvPr id="4" name="Footer Placeholder 3">
-            <a:extLst>
-              <a:ext uri="{FF2B5EF4-FFF2-40B4-BE49-F238E27FC236}">
-                <a16:creationId xmlns:a16="http://schemas.microsoft.com/office/drawing/2014/main" id="{4158419A-71E8-4EE8-85D6-0BC4AC6D6EF9}"/>
-              </a:ext>
-            </a:extLst>
-          </p:cNvPr>
-          <p:cNvSpPr>
-            <a:spLocks noGrp="1"/>
-          </p:cNvSpPr>
-          <p:nvPr>
-            <p:ph type="ftr" sz="quarter" idx="11"/>
-          </p:nvPr>
-        </p:nvSpPr>
-        <p:spPr/>
-        <p:txBody>
-          <a:bodyPr/>
-          <a:lstStyle/>
-          <a:p>
-            <a:r>
-              <a:rPr lang="en-US"/>
-              <a:t>Nodejs Basics</a:t>
-            </a:r>
-            <a:endParaRPr lang="en-US" dirty="0"/>
-          </a:p>
-        </p:txBody>
-      </p:sp>
-      <p:sp>
-        <p:nvSpPr>
-          <p:cNvPr id="5" name="Slide Number Placeholder 4">
-            <a:extLst>
-              <a:ext uri="{FF2B5EF4-FFF2-40B4-BE49-F238E27FC236}">
-                <a16:creationId xmlns:a16="http://schemas.microsoft.com/office/drawing/2014/main" id="{BBA32E10-89F5-4C6B-BEC7-B55B45AE1605}"/>
-              </a:ext>
-            </a:extLst>
-          </p:cNvPr>
-          <p:cNvSpPr>
-            <a:spLocks noGrp="1"/>
-          </p:cNvSpPr>
-          <p:nvPr>
-            <p:ph type="sldNum" sz="quarter" idx="12"/>
-          </p:nvPr>
-        </p:nvSpPr>
-        <p:spPr/>
-        <p:txBody>
-          <a:bodyPr/>
-          <a:lstStyle/>
-          <a:p>
-            <a:fld id="{3A98EE3D-8CD1-4C3F-BD1C-C98C9596463C}" type="slidenum">
-              <a:rPr lang="en-US" smtClean="0"/>
-              <a:t>11</a:t>
-            </a:fld>
-            <a:endParaRPr lang="en-US" dirty="0"/>
-          </a:p>
-        </p:txBody>
-      </p:sp>
-    </p:spTree>
-    <p:extLst>
-      <p:ext uri="{BB962C8B-B14F-4D97-AF65-F5344CB8AC3E}">
-        <p14:creationId xmlns:p14="http://schemas.microsoft.com/office/powerpoint/2010/main" val="3280884983"/>
-      </p:ext>
-    </p:extLst>
-  </p:cSld>
-  <p:clrMapOvr>
-    <a:masterClrMapping/>
-  </p:clrMapOvr>
-</p:sld>
-</file>
-
-<file path=ppt/slides/slide12.xml><?xml version="1.0" encoding="utf-8"?>
-<p:sld xmlns:a="http://schemas.openxmlformats.org/drawingml/2006/main" xmlns:r="http://schemas.openxmlformats.org/officeDocument/2006/relationships" xmlns:p="http://schemas.openxmlformats.org/presentationml/2006/main">
-  <p:cSld>
-    <p:spTree>
-      <p:nvGrpSpPr>
-        <p:cNvPr id="1" name=""/>
-        <p:cNvGrpSpPr/>
-        <p:nvPr/>
-      </p:nvGrpSpPr>
-      <p:grpSpPr>
-        <a:xfrm>
-          <a:off x="0" y="0"/>
-          <a:ext cx="0" cy="0"/>
-          <a:chOff x="0" y="0"/>
-          <a:chExt cx="0" cy="0"/>
-        </a:xfrm>
-      </p:grpSpPr>
-      <p:sp>
-        <p:nvSpPr>
-          <p:cNvPr id="2" name="Title 1">
-            <a:extLst>
-              <a:ext uri="{FF2B5EF4-FFF2-40B4-BE49-F238E27FC236}">
-                <a16:creationId xmlns:a16="http://schemas.microsoft.com/office/drawing/2014/main" id="{61C6DE61-9EA1-4A76-A453-A924E1365D58}"/>
-              </a:ext>
-            </a:extLst>
-          </p:cNvPr>
-          <p:cNvSpPr>
-            <a:spLocks noGrp="1"/>
-          </p:cNvSpPr>
-          <p:nvPr>
-            <p:ph type="title"/>
-          </p:nvPr>
-        </p:nvSpPr>
-        <p:spPr/>
-        <p:txBody>
-          <a:bodyPr/>
-          <a:lstStyle/>
-          <a:p>
-            <a:r>
-              <a:rPr lang="en-US" dirty="0"/>
-              <a:t>New requirement</a:t>
-            </a:r>
-            <a:endParaRPr lang="fa-IR" dirty="0"/>
-          </a:p>
-        </p:txBody>
-      </p:sp>
-      <p:sp>
-        <p:nvSpPr>
-          <p:cNvPr id="3" name="Content Placeholder 2">
-            <a:extLst>
-              <a:ext uri="{FF2B5EF4-FFF2-40B4-BE49-F238E27FC236}">
-                <a16:creationId xmlns:a16="http://schemas.microsoft.com/office/drawing/2014/main" id="{C46DD90C-9447-41E7-828A-DB9F378701C5}"/>
-              </a:ext>
-            </a:extLst>
-          </p:cNvPr>
-          <p:cNvSpPr>
-            <a:spLocks noGrp="1"/>
-          </p:cNvSpPr>
-          <p:nvPr>
-            <p:ph idx="1"/>
-          </p:nvPr>
-        </p:nvSpPr>
-        <p:spPr/>
-        <p:txBody>
-          <a:bodyPr/>
-          <a:lstStyle/>
-          <a:p>
-            <a:r>
-              <a:rPr lang="en-US" dirty="0"/>
-              <a:t>We have to monetize our application</a:t>
-            </a:r>
-          </a:p>
-          <a:p>
-            <a:r>
-              <a:rPr lang="en-US" dirty="0"/>
-              <a:t>For public APIs, Accepts requests, otherwise only accept requests that has some specific </a:t>
-            </a:r>
-            <a:r>
-              <a:rPr lang="en-US" dirty="0" err="1"/>
-              <a:t>api</a:t>
-            </a:r>
-            <a:r>
-              <a:rPr lang="en-US" dirty="0"/>
-              <a:t>-key</a:t>
-            </a:r>
-          </a:p>
-          <a:p>
-            <a:r>
-              <a:rPr lang="en-US" dirty="0"/>
-              <a:t>API-keys are stored inside database</a:t>
-            </a:r>
-          </a:p>
-          <a:p>
-            <a:endParaRPr lang="fa-IR" dirty="0"/>
-          </a:p>
-        </p:txBody>
-      </p:sp>
-      <p:sp>
-        <p:nvSpPr>
-          <p:cNvPr id="4" name="Footer Placeholder 3">
-            <a:extLst>
-              <a:ext uri="{FF2B5EF4-FFF2-40B4-BE49-F238E27FC236}">
-                <a16:creationId xmlns:a16="http://schemas.microsoft.com/office/drawing/2014/main" id="{33A3BD16-00B8-40EA-B908-500651FB0C98}"/>
-              </a:ext>
-            </a:extLst>
-          </p:cNvPr>
-          <p:cNvSpPr>
-            <a:spLocks noGrp="1"/>
-          </p:cNvSpPr>
-          <p:nvPr>
-            <p:ph type="ftr" sz="quarter" idx="11"/>
-          </p:nvPr>
-        </p:nvSpPr>
-        <p:spPr/>
-        <p:txBody>
-          <a:bodyPr/>
-          <a:lstStyle/>
-          <a:p>
-            <a:r>
-              <a:rPr lang="en-US"/>
-              <a:t>Nodejs Basics</a:t>
-            </a:r>
-            <a:endParaRPr lang="en-US" dirty="0"/>
-          </a:p>
-        </p:txBody>
-      </p:sp>
-      <p:sp>
-        <p:nvSpPr>
-          <p:cNvPr id="5" name="Slide Number Placeholder 4">
-            <a:extLst>
-              <a:ext uri="{FF2B5EF4-FFF2-40B4-BE49-F238E27FC236}">
-                <a16:creationId xmlns:a16="http://schemas.microsoft.com/office/drawing/2014/main" id="{2E8A99A7-7AB9-4F5C-8B98-F4EE1A3F171C}"/>
-              </a:ext>
-            </a:extLst>
-          </p:cNvPr>
-          <p:cNvSpPr>
-            <a:spLocks noGrp="1"/>
-          </p:cNvSpPr>
-          <p:nvPr>
-            <p:ph type="sldNum" sz="quarter" idx="12"/>
-          </p:nvPr>
-        </p:nvSpPr>
-        <p:spPr/>
-        <p:txBody>
-          <a:bodyPr/>
-          <a:lstStyle/>
-          <a:p>
-            <a:fld id="{3A98EE3D-8CD1-4C3F-BD1C-C98C9596463C}" type="slidenum">
-              <a:rPr lang="en-US" smtClean="0"/>
-              <a:t>12</a:t>
-            </a:fld>
-            <a:endParaRPr lang="en-US" dirty="0"/>
-          </a:p>
-        </p:txBody>
-      </p:sp>
-    </p:spTree>
-    <p:extLst>
-      <p:ext uri="{BB962C8B-B14F-4D97-AF65-F5344CB8AC3E}">
-        <p14:creationId xmlns:p14="http://schemas.microsoft.com/office/powerpoint/2010/main" val="386400170"/>
-      </p:ext>
-    </p:extLst>
-  </p:cSld>
-  <p:clrMapOvr>
-    <a:masterClrMapping/>
-  </p:clrMapOvr>
-</p:sld>
-</file>
-
-<file path=ppt/slides/slide13.xml><?xml version="1.0" encoding="utf-8"?>
-<p:sld xmlns:a="http://schemas.openxmlformats.org/drawingml/2006/main" xmlns:r="http://schemas.openxmlformats.org/officeDocument/2006/relationships" xmlns:p="http://schemas.openxmlformats.org/presentationml/2006/main">
-  <p:cSld>
-    <p:spTree>
-      <p:nvGrpSpPr>
-        <p:cNvPr id="1" name=""/>
-        <p:cNvGrpSpPr/>
-        <p:nvPr/>
-      </p:nvGrpSpPr>
-      <p:grpSpPr>
-        <a:xfrm>
-          <a:off x="0" y="0"/>
-          <a:ext cx="0" cy="0"/>
-          <a:chOff x="0" y="0"/>
-          <a:chExt cx="0" cy="0"/>
-        </a:xfrm>
-      </p:grpSpPr>
-      <p:sp>
-        <p:nvSpPr>
-          <p:cNvPr id="2" name="Title 1">
-            <a:extLst>
-              <a:ext uri="{FF2B5EF4-FFF2-40B4-BE49-F238E27FC236}">
-                <a16:creationId xmlns:a16="http://schemas.microsoft.com/office/drawing/2014/main" id="{6BCEF143-6C21-4547-A2AE-C613889A1856}"/>
-              </a:ext>
-            </a:extLst>
-          </p:cNvPr>
-          <p:cNvSpPr>
-            <a:spLocks noGrp="1"/>
-          </p:cNvSpPr>
-          <p:nvPr>
-            <p:ph type="title"/>
-          </p:nvPr>
-        </p:nvSpPr>
-        <p:spPr/>
-        <p:txBody>
-          <a:bodyPr/>
-          <a:lstStyle/>
-          <a:p>
-            <a:r>
-              <a:rPr lang="en-US" dirty="0"/>
-              <a:t>Demo</a:t>
-            </a:r>
-            <a:endParaRPr lang="fa-IR" dirty="0"/>
-          </a:p>
-        </p:txBody>
-      </p:sp>
-      <p:sp>
-        <p:nvSpPr>
-          <p:cNvPr id="3" name="Content Placeholder 2">
-            <a:extLst>
-              <a:ext uri="{FF2B5EF4-FFF2-40B4-BE49-F238E27FC236}">
-                <a16:creationId xmlns:a16="http://schemas.microsoft.com/office/drawing/2014/main" id="{151B9C59-BD9F-48B4-904E-39684216E5F5}"/>
-              </a:ext>
-            </a:extLst>
-          </p:cNvPr>
-          <p:cNvSpPr>
-            <a:spLocks noGrp="1"/>
-          </p:cNvSpPr>
-          <p:nvPr>
-            <p:ph idx="1"/>
-          </p:nvPr>
-        </p:nvSpPr>
-        <p:spPr/>
-        <p:txBody>
-          <a:bodyPr>
-            <a:normAutofit lnSpcReduction="10000"/>
-          </a:bodyPr>
-          <a:lstStyle/>
-          <a:p>
-            <a:r>
-              <a:rPr lang="en-US" dirty="0"/>
-              <a:t>Protect routes with guards</a:t>
-            </a:r>
-          </a:p>
-          <a:p>
-            <a:pPr lvl="1"/>
-            <a:r>
-              <a:rPr lang="en-US" dirty="0"/>
-              <a:t>If request meets some condition like authorization, authentication, </a:t>
-            </a:r>
-            <a:r>
-              <a:rPr lang="en-US" dirty="0" err="1"/>
-              <a:t>acls</a:t>
-            </a:r>
-            <a:r>
-              <a:rPr lang="en-US" dirty="0"/>
-              <a:t>, … it will be allowed to access the route, otherwise denied and error will be thrown</a:t>
-            </a:r>
-          </a:p>
-          <a:p>
-            <a:pPr lvl="1"/>
-            <a:r>
-              <a:rPr lang="en-US" dirty="0"/>
-              <a:t>Authentication:</a:t>
-            </a:r>
-          </a:p>
-          <a:p>
-            <a:pPr lvl="2"/>
-            <a:r>
-              <a:rPr lang="en-US" dirty="0"/>
-              <a:t>Extract some token from request and check access</a:t>
-            </a:r>
-          </a:p>
-          <a:p>
-            <a:pPr lvl="2"/>
-            <a:r>
-              <a:rPr lang="en-US" dirty="0"/>
-              <a:t>There are many strategies</a:t>
-            </a:r>
-            <a:endParaRPr lang="fa-IR" dirty="0"/>
-          </a:p>
-          <a:p>
-            <a:pPr lvl="2"/>
-            <a:r>
-              <a:rPr lang="en-US" dirty="0"/>
-              <a:t>We will discuss it more in depth in Internship sessions</a:t>
-            </a:r>
-          </a:p>
-          <a:p>
-            <a:pPr lvl="1"/>
-            <a:r>
-              <a:rPr lang="en-US" dirty="0"/>
-              <a:t>Create guard:</a:t>
-            </a:r>
-          </a:p>
-          <a:p>
-            <a:pPr lvl="2"/>
-            <a:r>
-              <a:rPr lang="en-US" dirty="0"/>
-              <a:t>nest g guard &lt;path-to-your-class&gt;</a:t>
-            </a:r>
-          </a:p>
-          <a:p>
-            <a:pPr lvl="2"/>
-            <a:r>
-              <a:rPr lang="en-US" dirty="0" err="1"/>
-              <a:t>canActivate</a:t>
-            </a:r>
-            <a:r>
-              <a:rPr lang="en-US" dirty="0"/>
-              <a:t>: allowed or not? As simple as you see </a:t>
-            </a:r>
-            <a:r>
-              <a:rPr lang="en-US" dirty="0">
-                <a:sym typeface="Wingdings" panose="05000000000000000000" pitchFamily="2" charset="2"/>
-              </a:rPr>
-              <a:t></a:t>
-            </a:r>
-          </a:p>
-          <a:p>
-            <a:pPr lvl="2"/>
-            <a:r>
-              <a:rPr lang="en-US" dirty="0"/>
-              <a:t>What is the status? It’s obvious </a:t>
-            </a:r>
-            <a:r>
-              <a:rPr lang="en-US" dirty="0">
-                <a:sym typeface="Wingdings" panose="05000000000000000000" pitchFamily="2" charset="2"/>
-              </a:rPr>
-              <a:t> 403 (forbidden resource)</a:t>
-            </a:r>
-            <a:endParaRPr lang="en-US" dirty="0"/>
-          </a:p>
-        </p:txBody>
-      </p:sp>
-      <p:sp>
-        <p:nvSpPr>
-          <p:cNvPr id="4" name="Footer Placeholder 3">
-            <a:extLst>
-              <a:ext uri="{FF2B5EF4-FFF2-40B4-BE49-F238E27FC236}">
-                <a16:creationId xmlns:a16="http://schemas.microsoft.com/office/drawing/2014/main" id="{4835EF2C-E451-4266-B0BD-A13DF993FC59}"/>
-              </a:ext>
-            </a:extLst>
-          </p:cNvPr>
-          <p:cNvSpPr>
-            <a:spLocks noGrp="1"/>
-          </p:cNvSpPr>
-          <p:nvPr>
-            <p:ph type="ftr" sz="quarter" idx="11"/>
-          </p:nvPr>
-        </p:nvSpPr>
-        <p:spPr/>
-        <p:txBody>
-          <a:bodyPr/>
-          <a:lstStyle/>
-          <a:p>
-            <a:r>
-              <a:rPr lang="en-US"/>
-              <a:t>Nodejs Basics</a:t>
-            </a:r>
-            <a:endParaRPr lang="en-US" dirty="0"/>
-          </a:p>
-        </p:txBody>
-      </p:sp>
-      <p:sp>
-        <p:nvSpPr>
-          <p:cNvPr id="5" name="Slide Number Placeholder 4">
-            <a:extLst>
-              <a:ext uri="{FF2B5EF4-FFF2-40B4-BE49-F238E27FC236}">
-                <a16:creationId xmlns:a16="http://schemas.microsoft.com/office/drawing/2014/main" id="{93916E74-0ECF-46DF-AB4E-C7A232017DFB}"/>
-              </a:ext>
-            </a:extLst>
-          </p:cNvPr>
-          <p:cNvSpPr>
-            <a:spLocks noGrp="1"/>
-          </p:cNvSpPr>
-          <p:nvPr>
-            <p:ph type="sldNum" sz="quarter" idx="12"/>
-          </p:nvPr>
-        </p:nvSpPr>
-        <p:spPr/>
-        <p:txBody>
-          <a:bodyPr/>
-          <a:lstStyle/>
-          <a:p>
-            <a:fld id="{3A98EE3D-8CD1-4C3F-BD1C-C98C9596463C}" type="slidenum">
-              <a:rPr lang="en-US" smtClean="0"/>
-              <a:t>13</a:t>
-            </a:fld>
-            <a:endParaRPr lang="en-US" dirty="0"/>
-          </a:p>
-        </p:txBody>
-      </p:sp>
-    </p:spTree>
-    <p:extLst>
-      <p:ext uri="{BB962C8B-B14F-4D97-AF65-F5344CB8AC3E}">
-        <p14:creationId xmlns:p14="http://schemas.microsoft.com/office/powerpoint/2010/main" val="2902303042"/>
-      </p:ext>
-    </p:extLst>
-  </p:cSld>
-  <p:clrMapOvr>
-    <a:masterClrMapping/>
-  </p:clrMapOvr>
-</p:sld>
-</file>
-
-<file path=ppt/slides/slide14.xml><?xml version="1.0" encoding="utf-8"?>
-<p:sld xmlns:a="http://schemas.openxmlformats.org/drawingml/2006/main" xmlns:r="http://schemas.openxmlformats.org/officeDocument/2006/relationships" xmlns:p="http://schemas.openxmlformats.org/presentationml/2006/main">
-  <p:cSld>
-    <p:spTree>
-      <p:nvGrpSpPr>
-        <p:cNvPr id="1" name=""/>
-        <p:cNvGrpSpPr/>
-        <p:nvPr/>
-      </p:nvGrpSpPr>
-      <p:grpSpPr>
-        <a:xfrm>
-          <a:off x="0" y="0"/>
-          <a:ext cx="0" cy="0"/>
-          <a:chOff x="0" y="0"/>
-          <a:chExt cx="0" cy="0"/>
-        </a:xfrm>
-      </p:grpSpPr>
-      <p:sp>
-        <p:nvSpPr>
-          <p:cNvPr id="2" name="Title 1">
-            <a:extLst>
-              <a:ext uri="{FF2B5EF4-FFF2-40B4-BE49-F238E27FC236}">
-                <a16:creationId xmlns:a16="http://schemas.microsoft.com/office/drawing/2014/main" id="{9BE5389A-2D23-46C7-9B93-5495B0A7052B}"/>
-              </a:ext>
-            </a:extLst>
-          </p:cNvPr>
-          <p:cNvSpPr>
-            <a:spLocks noGrp="1"/>
-          </p:cNvSpPr>
-          <p:nvPr>
-            <p:ph type="title"/>
-          </p:nvPr>
-        </p:nvSpPr>
-        <p:spPr/>
-        <p:txBody>
-          <a:bodyPr/>
-          <a:lstStyle/>
-          <a:p>
-            <a:r>
-              <a:rPr lang="en-US" dirty="0"/>
-              <a:t>Demo</a:t>
-            </a:r>
-            <a:endParaRPr lang="fa-IR" dirty="0"/>
-          </a:p>
-        </p:txBody>
-      </p:sp>
-      <p:sp>
-        <p:nvSpPr>
-          <p:cNvPr id="3" name="Content Placeholder 2">
-            <a:extLst>
-              <a:ext uri="{FF2B5EF4-FFF2-40B4-BE49-F238E27FC236}">
-                <a16:creationId xmlns:a16="http://schemas.microsoft.com/office/drawing/2014/main" id="{7828E311-42C9-4F3F-9795-6892C2F6450E}"/>
-              </a:ext>
-            </a:extLst>
-          </p:cNvPr>
-          <p:cNvSpPr>
-            <a:spLocks noGrp="1"/>
-          </p:cNvSpPr>
-          <p:nvPr>
-            <p:ph idx="1"/>
-          </p:nvPr>
-        </p:nvSpPr>
-        <p:spPr/>
-        <p:txBody>
-          <a:bodyPr>
-            <a:normAutofit lnSpcReduction="10000"/>
-          </a:bodyPr>
-          <a:lstStyle/>
-          <a:p>
-            <a:r>
-              <a:rPr lang="en-US" dirty="0"/>
-              <a:t>How to specify whether a route is public or not?</a:t>
-            </a:r>
-          </a:p>
-          <a:p>
-            <a:pPr lvl="1"/>
-            <a:r>
-              <a:rPr lang="en-US" dirty="0"/>
-              <a:t>There it comes metadata</a:t>
-            </a:r>
-          </a:p>
-          <a:p>
-            <a:pPr lvl="1"/>
-            <a:r>
-              <a:rPr lang="en-US" dirty="0"/>
-              <a:t>@SetMetadata(key, value)</a:t>
-            </a:r>
-          </a:p>
-          <a:p>
-            <a:pPr lvl="1"/>
-            <a:r>
-              <a:rPr lang="en-US" dirty="0"/>
-              <a:t>How to reuse code</a:t>
-            </a:r>
-          </a:p>
-          <a:p>
-            <a:pPr lvl="2"/>
-            <a:r>
-              <a:rPr lang="en-US" dirty="0"/>
-              <a:t>Thanks to decorators we can specify custom decorator for ourselves</a:t>
-            </a:r>
-          </a:p>
-          <a:p>
-            <a:pPr lvl="2"/>
-            <a:r>
-              <a:rPr lang="en-US" dirty="0"/>
-              <a:t>Anonymous functions is our solution to achieve custom decorators</a:t>
-            </a:r>
-          </a:p>
-          <a:p>
-            <a:pPr lvl="1"/>
-            <a:r>
-              <a:rPr lang="en-US" dirty="0"/>
-              <a:t>Hot to access metadata in our guard?</a:t>
-            </a:r>
-          </a:p>
-          <a:p>
-            <a:pPr lvl="2"/>
-            <a:r>
-              <a:rPr lang="en-US" dirty="0"/>
-              <a:t>There the helper class, named reflector, comes</a:t>
-            </a:r>
-          </a:p>
-          <a:p>
-            <a:pPr lvl="2"/>
-            <a:r>
-              <a:rPr lang="en-US" dirty="0"/>
-              <a:t>This class are provided by the nest core package</a:t>
-            </a:r>
-          </a:p>
-          <a:p>
-            <a:pPr lvl="1"/>
-            <a:r>
-              <a:rPr lang="en-US" dirty="0"/>
-              <a:t>Remember, if you use other dependency like reflector, then you have to use providers (APP_GUARD) to follow injection rules</a:t>
-            </a:r>
-          </a:p>
-          <a:p>
-            <a:pPr lvl="2"/>
-            <a:endParaRPr lang="fa-IR" dirty="0"/>
-          </a:p>
-        </p:txBody>
-      </p:sp>
-      <p:sp>
-        <p:nvSpPr>
-          <p:cNvPr id="4" name="Footer Placeholder 3">
-            <a:extLst>
-              <a:ext uri="{FF2B5EF4-FFF2-40B4-BE49-F238E27FC236}">
-                <a16:creationId xmlns:a16="http://schemas.microsoft.com/office/drawing/2014/main" id="{505D4F16-CA4E-4AA2-B545-EE50AB6DA067}"/>
-              </a:ext>
-            </a:extLst>
-          </p:cNvPr>
-          <p:cNvSpPr>
-            <a:spLocks noGrp="1"/>
-          </p:cNvSpPr>
-          <p:nvPr>
-            <p:ph type="ftr" sz="quarter" idx="11"/>
-          </p:nvPr>
-        </p:nvSpPr>
-        <p:spPr/>
-        <p:txBody>
-          <a:bodyPr/>
-          <a:lstStyle/>
-          <a:p>
-            <a:r>
-              <a:rPr lang="en-US"/>
-              <a:t>Nodejs Basics</a:t>
-            </a:r>
-            <a:endParaRPr lang="en-US" dirty="0"/>
-          </a:p>
-        </p:txBody>
-      </p:sp>
-      <p:sp>
-        <p:nvSpPr>
-          <p:cNvPr id="5" name="Slide Number Placeholder 4">
-            <a:extLst>
-              <a:ext uri="{FF2B5EF4-FFF2-40B4-BE49-F238E27FC236}">
-                <a16:creationId xmlns:a16="http://schemas.microsoft.com/office/drawing/2014/main" id="{13E7BDC2-7AE8-4177-A189-882F4C363F01}"/>
-              </a:ext>
-            </a:extLst>
-          </p:cNvPr>
-          <p:cNvSpPr>
-            <a:spLocks noGrp="1"/>
-          </p:cNvSpPr>
-          <p:nvPr>
-            <p:ph type="sldNum" sz="quarter" idx="12"/>
-          </p:nvPr>
-        </p:nvSpPr>
-        <p:spPr/>
-        <p:txBody>
-          <a:bodyPr/>
-          <a:lstStyle/>
-          <a:p>
-            <a:fld id="{3A98EE3D-8CD1-4C3F-BD1C-C98C9596463C}" type="slidenum">
-              <a:rPr lang="en-US" smtClean="0"/>
-              <a:t>14</a:t>
-            </a:fld>
-            <a:endParaRPr lang="en-US" dirty="0"/>
-          </a:p>
-        </p:txBody>
-      </p:sp>
-    </p:spTree>
-    <p:extLst>
-      <p:ext uri="{BB962C8B-B14F-4D97-AF65-F5344CB8AC3E}">
-        <p14:creationId xmlns:p14="http://schemas.microsoft.com/office/powerpoint/2010/main" val="1985732007"/>
-      </p:ext>
-    </p:extLst>
-  </p:cSld>
-  <p:clrMapOvr>
-    <a:masterClrMapping/>
-  </p:clrMapOvr>
-</p:sld>
-</file>
-
-<file path=ppt/slides/slide15.xml><?xml version="1.0" encoding="utf-8"?>
-<p:sld xmlns:a="http://schemas.openxmlformats.org/drawingml/2006/main" xmlns:r="http://schemas.openxmlformats.org/officeDocument/2006/relationships" xmlns:p="http://schemas.openxmlformats.org/presentationml/2006/main">
-  <p:cSld>
-    <p:spTree>
-      <p:nvGrpSpPr>
-        <p:cNvPr id="1" name=""/>
-        <p:cNvGrpSpPr/>
-        <p:nvPr/>
-      </p:nvGrpSpPr>
-      <p:grpSpPr>
-        <a:xfrm>
-          <a:off x="0" y="0"/>
-          <a:ext cx="0" cy="0"/>
-          <a:chOff x="0" y="0"/>
-          <a:chExt cx="0" cy="0"/>
-        </a:xfrm>
-      </p:grpSpPr>
-      <p:sp>
-        <p:nvSpPr>
-          <p:cNvPr id="2" name="Title 1">
-            <a:extLst>
-              <a:ext uri="{FF2B5EF4-FFF2-40B4-BE49-F238E27FC236}">
-                <a16:creationId xmlns:a16="http://schemas.microsoft.com/office/drawing/2014/main" id="{C7BB3756-00A2-424D-B489-FC1536683FC8}"/>
-              </a:ext>
-            </a:extLst>
-          </p:cNvPr>
-          <p:cNvSpPr>
-            <a:spLocks noGrp="1"/>
-          </p:cNvSpPr>
-          <p:nvPr>
-            <p:ph type="title"/>
-          </p:nvPr>
-        </p:nvSpPr>
-        <p:spPr/>
-        <p:txBody>
-          <a:bodyPr/>
-          <a:lstStyle/>
-          <a:p>
-            <a:r>
-              <a:rPr lang="en-US" dirty="0"/>
-              <a:t>New requirement</a:t>
-            </a:r>
-            <a:endParaRPr lang="fa-IR" dirty="0"/>
-          </a:p>
-        </p:txBody>
-      </p:sp>
-      <p:sp>
-        <p:nvSpPr>
-          <p:cNvPr id="3" name="Content Placeholder 2">
-            <a:extLst>
-              <a:ext uri="{FF2B5EF4-FFF2-40B4-BE49-F238E27FC236}">
-                <a16:creationId xmlns:a16="http://schemas.microsoft.com/office/drawing/2014/main" id="{BB33740E-30CA-4F7D-8C34-5AE2F2A664B9}"/>
-              </a:ext>
-            </a:extLst>
-          </p:cNvPr>
-          <p:cNvSpPr>
-            <a:spLocks noGrp="1"/>
-          </p:cNvSpPr>
-          <p:nvPr>
-            <p:ph idx="1"/>
-          </p:nvPr>
-        </p:nvSpPr>
-        <p:spPr/>
-        <p:txBody>
-          <a:bodyPr/>
-          <a:lstStyle/>
-          <a:p>
-            <a:r>
-              <a:rPr lang="en-US" dirty="0"/>
-              <a:t>Wrap all responses inside an object with a filed called data.</a:t>
-            </a:r>
-          </a:p>
-          <a:p>
-            <a:r>
-              <a:rPr lang="en-US" dirty="0"/>
-              <a:t>Also add a timeout for all requests (make it configurable for me)</a:t>
-            </a:r>
-            <a:endParaRPr lang="fa-IR" dirty="0"/>
-          </a:p>
-        </p:txBody>
-      </p:sp>
-      <p:sp>
-        <p:nvSpPr>
-          <p:cNvPr id="4" name="Footer Placeholder 3">
-            <a:extLst>
-              <a:ext uri="{FF2B5EF4-FFF2-40B4-BE49-F238E27FC236}">
-                <a16:creationId xmlns:a16="http://schemas.microsoft.com/office/drawing/2014/main" id="{5974FB87-24B0-44DE-958F-FDF1FC25A12B}"/>
-              </a:ext>
-            </a:extLst>
-          </p:cNvPr>
-          <p:cNvSpPr>
-            <a:spLocks noGrp="1"/>
-          </p:cNvSpPr>
-          <p:nvPr>
-            <p:ph type="ftr" sz="quarter" idx="11"/>
-          </p:nvPr>
-        </p:nvSpPr>
-        <p:spPr/>
-        <p:txBody>
-          <a:bodyPr/>
-          <a:lstStyle/>
-          <a:p>
-            <a:r>
-              <a:rPr lang="en-US"/>
-              <a:t>Nodejs Basics</a:t>
-            </a:r>
-            <a:endParaRPr lang="en-US" dirty="0"/>
-          </a:p>
-        </p:txBody>
-      </p:sp>
-      <p:sp>
-        <p:nvSpPr>
-          <p:cNvPr id="5" name="Slide Number Placeholder 4">
-            <a:extLst>
-              <a:ext uri="{FF2B5EF4-FFF2-40B4-BE49-F238E27FC236}">
-                <a16:creationId xmlns:a16="http://schemas.microsoft.com/office/drawing/2014/main" id="{EF4C0C1A-952A-433B-AE83-DFFBF202A28E}"/>
-              </a:ext>
-            </a:extLst>
-          </p:cNvPr>
-          <p:cNvSpPr>
-            <a:spLocks noGrp="1"/>
-          </p:cNvSpPr>
-          <p:nvPr>
-            <p:ph type="sldNum" sz="quarter" idx="12"/>
-          </p:nvPr>
-        </p:nvSpPr>
-        <p:spPr/>
-        <p:txBody>
-          <a:bodyPr/>
-          <a:lstStyle/>
-          <a:p>
-            <a:fld id="{3A98EE3D-8CD1-4C3F-BD1C-C98C9596463C}" type="slidenum">
-              <a:rPr lang="en-US" smtClean="0"/>
-              <a:t>15</a:t>
-            </a:fld>
-            <a:endParaRPr lang="en-US" dirty="0"/>
-          </a:p>
-        </p:txBody>
-      </p:sp>
-    </p:spTree>
-    <p:extLst>
-      <p:ext uri="{BB962C8B-B14F-4D97-AF65-F5344CB8AC3E}">
-        <p14:creationId xmlns:p14="http://schemas.microsoft.com/office/powerpoint/2010/main" val="563040513"/>
-      </p:ext>
-    </p:extLst>
-  </p:cSld>
-  <p:clrMapOvr>
-    <a:masterClrMapping/>
-  </p:clrMapOvr>
-</p:sld>
-</file>
-
-<file path=ppt/slides/slide16.xml><?xml version="1.0" encoding="utf-8"?>
-<p:sld xmlns:a="http://schemas.openxmlformats.org/drawingml/2006/main" xmlns:r="http://schemas.openxmlformats.org/officeDocument/2006/relationships" xmlns:p="http://schemas.openxmlformats.org/presentationml/2006/main">
-  <p:cSld>
-    <p:spTree>
-      <p:nvGrpSpPr>
-        <p:cNvPr id="1" name=""/>
-        <p:cNvGrpSpPr/>
-        <p:nvPr/>
-      </p:nvGrpSpPr>
-      <p:grpSpPr>
-        <a:xfrm>
-          <a:off x="0" y="0"/>
-          <a:ext cx="0" cy="0"/>
-          <a:chOff x="0" y="0"/>
-          <a:chExt cx="0" cy="0"/>
-        </a:xfrm>
-      </p:grpSpPr>
-      <p:sp>
-        <p:nvSpPr>
-          <p:cNvPr id="2" name="Title 1">
-            <a:extLst>
-              <a:ext uri="{FF2B5EF4-FFF2-40B4-BE49-F238E27FC236}">
-                <a16:creationId xmlns:a16="http://schemas.microsoft.com/office/drawing/2014/main" id="{59C824AA-98C6-442B-9C3E-28E49CA4BEE7}"/>
-              </a:ext>
-            </a:extLst>
-          </p:cNvPr>
-          <p:cNvSpPr>
-            <a:spLocks noGrp="1"/>
-          </p:cNvSpPr>
-          <p:nvPr>
-            <p:ph type="title"/>
-          </p:nvPr>
-        </p:nvSpPr>
-        <p:spPr/>
-        <p:txBody>
-          <a:bodyPr/>
-          <a:lstStyle/>
-          <a:p>
-            <a:r>
-              <a:rPr lang="en-US" dirty="0"/>
-              <a:t>Demo</a:t>
-            </a:r>
-            <a:endParaRPr lang="fa-IR" dirty="0"/>
-          </a:p>
-        </p:txBody>
-      </p:sp>
-      <p:sp>
-        <p:nvSpPr>
-          <p:cNvPr id="3" name="Content Placeholder 2">
-            <a:extLst>
-              <a:ext uri="{FF2B5EF4-FFF2-40B4-BE49-F238E27FC236}">
-                <a16:creationId xmlns:a16="http://schemas.microsoft.com/office/drawing/2014/main" id="{B81E832D-6009-409D-9C14-9099612DA2C1}"/>
-              </a:ext>
-            </a:extLst>
-          </p:cNvPr>
-          <p:cNvSpPr>
-            <a:spLocks noGrp="1"/>
-          </p:cNvSpPr>
-          <p:nvPr>
-            <p:ph idx="1"/>
-          </p:nvPr>
-        </p:nvSpPr>
-        <p:spPr/>
-        <p:txBody>
-          <a:bodyPr/>
-          <a:lstStyle/>
-          <a:p>
-            <a:r>
-              <a:rPr lang="en-US" dirty="0"/>
-              <a:t>Benefits of interceptors:</a:t>
-            </a:r>
-          </a:p>
-          <a:p>
-            <a:pPr lvl="1"/>
-            <a:r>
-              <a:rPr lang="en-US" dirty="0"/>
-              <a:t>Bind extra logics before or after method execution</a:t>
-            </a:r>
-          </a:p>
-          <a:p>
-            <a:pPr lvl="1"/>
-            <a:r>
-              <a:rPr lang="en-US" dirty="0"/>
-              <a:t>Transform the result returned from a method</a:t>
-            </a:r>
-          </a:p>
-          <a:p>
-            <a:pPr lvl="1"/>
-            <a:r>
-              <a:rPr lang="en-US" dirty="0"/>
-              <a:t>Transform the exceptions throwed from a method</a:t>
-            </a:r>
-          </a:p>
-          <a:p>
-            <a:pPr lvl="1"/>
-            <a:r>
-              <a:rPr lang="en-US" dirty="0"/>
-              <a:t>Extend basic method behavior</a:t>
-            </a:r>
-          </a:p>
-          <a:p>
-            <a:pPr lvl="1"/>
-            <a:r>
-              <a:rPr lang="en-US" dirty="0"/>
-              <a:t>Completely override a method depending on specific condition (caching)</a:t>
-            </a:r>
-          </a:p>
-          <a:p>
-            <a:r>
-              <a:rPr lang="en-US" dirty="0"/>
-              <a:t>How to create interceptor</a:t>
-            </a:r>
-          </a:p>
-          <a:p>
-            <a:pPr lvl="1"/>
-            <a:r>
-              <a:rPr lang="en-US" dirty="0"/>
-              <a:t>nest g interceptor &lt;path-to-your-class&gt;</a:t>
-            </a:r>
-          </a:p>
-          <a:p>
-            <a:pPr lvl="1"/>
-            <a:r>
-              <a:rPr lang="en-US" dirty="0"/>
-              <a:t>You should implement intercept method</a:t>
-            </a:r>
-            <a:endParaRPr lang="fa-IR" dirty="0"/>
-          </a:p>
-        </p:txBody>
-      </p:sp>
-      <p:sp>
-        <p:nvSpPr>
-          <p:cNvPr id="4" name="Footer Placeholder 3">
-            <a:extLst>
-              <a:ext uri="{FF2B5EF4-FFF2-40B4-BE49-F238E27FC236}">
-                <a16:creationId xmlns:a16="http://schemas.microsoft.com/office/drawing/2014/main" id="{62300816-4443-4FD8-9DD2-6E984A3975EC}"/>
-              </a:ext>
-            </a:extLst>
-          </p:cNvPr>
-          <p:cNvSpPr>
-            <a:spLocks noGrp="1"/>
-          </p:cNvSpPr>
-          <p:nvPr>
-            <p:ph type="ftr" sz="quarter" idx="11"/>
-          </p:nvPr>
-        </p:nvSpPr>
-        <p:spPr/>
-        <p:txBody>
-          <a:bodyPr/>
-          <a:lstStyle/>
-          <a:p>
-            <a:r>
-              <a:rPr lang="en-US"/>
-              <a:t>Nodejs Basics</a:t>
-            </a:r>
-            <a:endParaRPr lang="en-US" dirty="0"/>
-          </a:p>
-        </p:txBody>
-      </p:sp>
-      <p:sp>
-        <p:nvSpPr>
-          <p:cNvPr id="5" name="Slide Number Placeholder 4">
-            <a:extLst>
-              <a:ext uri="{FF2B5EF4-FFF2-40B4-BE49-F238E27FC236}">
-                <a16:creationId xmlns:a16="http://schemas.microsoft.com/office/drawing/2014/main" id="{BC18DAB2-4064-40E9-A516-F486A96161D7}"/>
-              </a:ext>
-            </a:extLst>
-          </p:cNvPr>
-          <p:cNvSpPr>
-            <a:spLocks noGrp="1"/>
-          </p:cNvSpPr>
-          <p:nvPr>
-            <p:ph type="sldNum" sz="quarter" idx="12"/>
-          </p:nvPr>
-        </p:nvSpPr>
-        <p:spPr/>
-        <p:txBody>
-          <a:bodyPr/>
-          <a:lstStyle/>
-          <a:p>
-            <a:fld id="{3A98EE3D-8CD1-4C3F-BD1C-C98C9596463C}" type="slidenum">
-              <a:rPr lang="en-US" smtClean="0"/>
-              <a:t>16</a:t>
-            </a:fld>
-            <a:endParaRPr lang="en-US" dirty="0"/>
-          </a:p>
-        </p:txBody>
-      </p:sp>
-    </p:spTree>
-    <p:extLst>
-      <p:ext uri="{BB962C8B-B14F-4D97-AF65-F5344CB8AC3E}">
-        <p14:creationId xmlns:p14="http://schemas.microsoft.com/office/powerpoint/2010/main" val="27077479"/>
-      </p:ext>
-    </p:extLst>
-  </p:cSld>
-  <p:clrMapOvr>
-    <a:masterClrMapping/>
-  </p:clrMapOvr>
-</p:sld>
-</file>
-
-<file path=ppt/slides/slide17.xml><?xml version="1.0" encoding="utf-8"?>
-<p:sld xmlns:a="http://schemas.openxmlformats.org/drawingml/2006/main" xmlns:r="http://schemas.openxmlformats.org/officeDocument/2006/relationships" xmlns:p="http://schemas.openxmlformats.org/presentationml/2006/main">
-  <p:cSld>
-    <p:spTree>
-      <p:nvGrpSpPr>
-        <p:cNvPr id="1" name=""/>
-        <p:cNvGrpSpPr/>
-        <p:nvPr/>
-      </p:nvGrpSpPr>
-      <p:grpSpPr>
-        <a:xfrm>
-          <a:off x="0" y="0"/>
-          <a:ext cx="0" cy="0"/>
-          <a:chOff x="0" y="0"/>
-          <a:chExt cx="0" cy="0"/>
-        </a:xfrm>
-      </p:grpSpPr>
-      <p:sp>
-        <p:nvSpPr>
-          <p:cNvPr id="2" name="Title 1">
-            <a:extLst>
-              <a:ext uri="{FF2B5EF4-FFF2-40B4-BE49-F238E27FC236}">
-                <a16:creationId xmlns:a16="http://schemas.microsoft.com/office/drawing/2014/main" id="{A4699B38-1E23-4F16-B1D7-0BAC0CE16C47}"/>
-              </a:ext>
-            </a:extLst>
-          </p:cNvPr>
-          <p:cNvSpPr>
-            <a:spLocks noGrp="1"/>
-          </p:cNvSpPr>
-          <p:nvPr>
-            <p:ph type="title"/>
-          </p:nvPr>
-        </p:nvSpPr>
-        <p:spPr/>
-        <p:txBody>
-          <a:bodyPr/>
-          <a:lstStyle/>
-          <a:p>
-            <a:r>
-              <a:rPr lang="en-US" dirty="0"/>
-              <a:t>Demo</a:t>
-            </a:r>
-            <a:endParaRPr lang="fa-IR" dirty="0"/>
-          </a:p>
-        </p:txBody>
-      </p:sp>
-      <p:sp>
-        <p:nvSpPr>
-          <p:cNvPr id="3" name="Content Placeholder 2">
-            <a:extLst>
-              <a:ext uri="{FF2B5EF4-FFF2-40B4-BE49-F238E27FC236}">
-                <a16:creationId xmlns:a16="http://schemas.microsoft.com/office/drawing/2014/main" id="{A4CA9403-858C-4BBF-8F6F-55C8634DF6AF}"/>
-              </a:ext>
-            </a:extLst>
-          </p:cNvPr>
-          <p:cNvSpPr>
-            <a:spLocks noGrp="1"/>
-          </p:cNvSpPr>
-          <p:nvPr>
-            <p:ph idx="1"/>
-          </p:nvPr>
-        </p:nvSpPr>
-        <p:spPr/>
-        <p:txBody>
-          <a:bodyPr/>
-          <a:lstStyle/>
-          <a:p>
-            <a:r>
-              <a:rPr lang="en-US" dirty="0"/>
-              <a:t>We say that we can access before and after request, where are them?</a:t>
-            </a:r>
-          </a:p>
-          <a:p>
-            <a:pPr lvl="1"/>
-            <a:r>
-              <a:rPr lang="en-US" dirty="0"/>
-              <a:t>Before: previous to return</a:t>
-            </a:r>
-          </a:p>
-          <a:p>
-            <a:pPr lvl="1"/>
-            <a:r>
-              <a:rPr lang="en-US" dirty="0"/>
-              <a:t>After: You can pipe to the observable returned from the </a:t>
-            </a:r>
-            <a:r>
-              <a:rPr lang="en-US" dirty="0" err="1"/>
-              <a:t>nest.handle</a:t>
-            </a:r>
-            <a:r>
-              <a:rPr lang="en-US" dirty="0"/>
-              <a:t>() function</a:t>
-            </a:r>
-          </a:p>
-          <a:p>
-            <a:r>
-              <a:rPr lang="en-US" dirty="0"/>
-              <a:t>How to add multiple interceptor</a:t>
-            </a:r>
-          </a:p>
-          <a:p>
-            <a:pPr lvl="1"/>
-            <a:r>
-              <a:rPr lang="en-US" dirty="0"/>
-              <a:t>Arrays are your friend man </a:t>
-            </a:r>
-            <a:r>
-              <a:rPr lang="en-US" dirty="0">
-                <a:sym typeface="Wingdings" panose="05000000000000000000" pitchFamily="2" charset="2"/>
-              </a:rPr>
-              <a:t></a:t>
-            </a:r>
-            <a:endParaRPr lang="fa-IR" dirty="0"/>
-          </a:p>
-        </p:txBody>
-      </p:sp>
-      <p:sp>
-        <p:nvSpPr>
-          <p:cNvPr id="4" name="Footer Placeholder 3">
-            <a:extLst>
-              <a:ext uri="{FF2B5EF4-FFF2-40B4-BE49-F238E27FC236}">
-                <a16:creationId xmlns:a16="http://schemas.microsoft.com/office/drawing/2014/main" id="{3559274D-2BB2-42F2-AAB6-2B589491BB8A}"/>
-              </a:ext>
-            </a:extLst>
-          </p:cNvPr>
-          <p:cNvSpPr>
-            <a:spLocks noGrp="1"/>
-          </p:cNvSpPr>
-          <p:nvPr>
-            <p:ph type="ftr" sz="quarter" idx="11"/>
-          </p:nvPr>
-        </p:nvSpPr>
-        <p:spPr/>
-        <p:txBody>
-          <a:bodyPr/>
-          <a:lstStyle/>
-          <a:p>
-            <a:r>
-              <a:rPr lang="en-US"/>
-              <a:t>Nodejs Basics</a:t>
-            </a:r>
-            <a:endParaRPr lang="en-US" dirty="0"/>
-          </a:p>
-        </p:txBody>
-      </p:sp>
-      <p:sp>
-        <p:nvSpPr>
-          <p:cNvPr id="5" name="Slide Number Placeholder 4">
-            <a:extLst>
-              <a:ext uri="{FF2B5EF4-FFF2-40B4-BE49-F238E27FC236}">
-                <a16:creationId xmlns:a16="http://schemas.microsoft.com/office/drawing/2014/main" id="{6114D192-0D90-4A43-BBC7-34131FFA1DA0}"/>
-              </a:ext>
-            </a:extLst>
-          </p:cNvPr>
-          <p:cNvSpPr>
-            <a:spLocks noGrp="1"/>
-          </p:cNvSpPr>
-          <p:nvPr>
-            <p:ph type="sldNum" sz="quarter" idx="12"/>
-          </p:nvPr>
-        </p:nvSpPr>
-        <p:spPr/>
-        <p:txBody>
-          <a:bodyPr/>
-          <a:lstStyle/>
-          <a:p>
-            <a:fld id="{3A98EE3D-8CD1-4C3F-BD1C-C98C9596463C}" type="slidenum">
-              <a:rPr lang="en-US" smtClean="0"/>
-              <a:t>17</a:t>
-            </a:fld>
-            <a:endParaRPr lang="en-US" dirty="0"/>
-          </a:p>
-        </p:txBody>
-      </p:sp>
-    </p:spTree>
-    <p:extLst>
-      <p:ext uri="{BB962C8B-B14F-4D97-AF65-F5344CB8AC3E}">
-        <p14:creationId xmlns:p14="http://schemas.microsoft.com/office/powerpoint/2010/main" val="2196419277"/>
-      </p:ext>
-    </p:extLst>
-  </p:cSld>
-  <p:clrMapOvr>
-    <a:masterClrMapping/>
-  </p:clrMapOvr>
-</p:sld>
-</file>
-
-<file path=ppt/slides/slide18.xml><?xml version="1.0" encoding="utf-8"?>
-<p:sld xmlns:a="http://schemas.openxmlformats.org/drawingml/2006/main" xmlns:r="http://schemas.openxmlformats.org/officeDocument/2006/relationships" xmlns:p="http://schemas.openxmlformats.org/presentationml/2006/main">
-  <p:cSld>
-    <p:spTree>
-      <p:nvGrpSpPr>
-        <p:cNvPr id="1" name=""/>
-        <p:cNvGrpSpPr/>
-        <p:nvPr/>
-      </p:nvGrpSpPr>
-      <p:grpSpPr>
-        <a:xfrm>
-          <a:off x="0" y="0"/>
-          <a:ext cx="0" cy="0"/>
-          <a:chOff x="0" y="0"/>
-          <a:chExt cx="0" cy="0"/>
-        </a:xfrm>
-      </p:grpSpPr>
-      <p:sp>
-        <p:nvSpPr>
-          <p:cNvPr id="2" name="Title 1">
-            <a:extLst>
-              <a:ext uri="{FF2B5EF4-FFF2-40B4-BE49-F238E27FC236}">
-                <a16:creationId xmlns:a16="http://schemas.microsoft.com/office/drawing/2014/main" id="{6C7E4EDB-3C99-4561-91BE-45B0D2795F43}"/>
-              </a:ext>
-            </a:extLst>
-          </p:cNvPr>
-          <p:cNvSpPr>
-            <a:spLocks noGrp="1"/>
-          </p:cNvSpPr>
-          <p:nvPr>
-            <p:ph type="title"/>
-          </p:nvPr>
-        </p:nvSpPr>
-        <p:spPr/>
-        <p:txBody>
-          <a:bodyPr/>
-          <a:lstStyle/>
-          <a:p>
-            <a:r>
-              <a:rPr lang="en-US" dirty="0"/>
-              <a:t>New requirement</a:t>
-            </a:r>
-            <a:endParaRPr lang="fa-IR" dirty="0"/>
-          </a:p>
-        </p:txBody>
-      </p:sp>
-      <p:sp>
-        <p:nvSpPr>
-          <p:cNvPr id="3" name="Content Placeholder 2">
-            <a:extLst>
-              <a:ext uri="{FF2B5EF4-FFF2-40B4-BE49-F238E27FC236}">
-                <a16:creationId xmlns:a16="http://schemas.microsoft.com/office/drawing/2014/main" id="{2CAA97B9-4E26-4EE7-91E8-19797D51254B}"/>
-              </a:ext>
-            </a:extLst>
-          </p:cNvPr>
-          <p:cNvSpPr>
-            <a:spLocks noGrp="1"/>
-          </p:cNvSpPr>
-          <p:nvPr>
-            <p:ph idx="1"/>
-          </p:nvPr>
-        </p:nvSpPr>
-        <p:spPr/>
-        <p:txBody>
-          <a:bodyPr/>
-          <a:lstStyle/>
-          <a:p>
-            <a:endParaRPr lang="fa-IR" dirty="0"/>
-          </a:p>
-        </p:txBody>
-      </p:sp>
-      <p:sp>
-        <p:nvSpPr>
-          <p:cNvPr id="4" name="Footer Placeholder 3">
-            <a:extLst>
-              <a:ext uri="{FF2B5EF4-FFF2-40B4-BE49-F238E27FC236}">
-                <a16:creationId xmlns:a16="http://schemas.microsoft.com/office/drawing/2014/main" id="{F498F1CF-EB07-4297-B572-0470C43F0934}"/>
-              </a:ext>
-            </a:extLst>
-          </p:cNvPr>
-          <p:cNvSpPr>
-            <a:spLocks noGrp="1"/>
-          </p:cNvSpPr>
-          <p:nvPr>
-            <p:ph type="ftr" sz="quarter" idx="11"/>
-          </p:nvPr>
-        </p:nvSpPr>
-        <p:spPr/>
-        <p:txBody>
-          <a:bodyPr/>
-          <a:lstStyle/>
-          <a:p>
-            <a:r>
-              <a:rPr lang="en-US"/>
-              <a:t>Nodejs Basics</a:t>
-            </a:r>
-            <a:endParaRPr lang="en-US" dirty="0"/>
-          </a:p>
-        </p:txBody>
-      </p:sp>
-      <p:sp>
-        <p:nvSpPr>
-          <p:cNvPr id="5" name="Slide Number Placeholder 4">
-            <a:extLst>
-              <a:ext uri="{FF2B5EF4-FFF2-40B4-BE49-F238E27FC236}">
-                <a16:creationId xmlns:a16="http://schemas.microsoft.com/office/drawing/2014/main" id="{1DB97C80-30A3-4CBF-9406-B4BB57347374}"/>
-              </a:ext>
-            </a:extLst>
-          </p:cNvPr>
-          <p:cNvSpPr>
-            <a:spLocks noGrp="1"/>
-          </p:cNvSpPr>
-          <p:nvPr>
-            <p:ph type="sldNum" sz="quarter" idx="12"/>
-          </p:nvPr>
-        </p:nvSpPr>
-        <p:spPr/>
-        <p:txBody>
-          <a:bodyPr/>
-          <a:lstStyle/>
-          <a:p>
-            <a:fld id="{3A98EE3D-8CD1-4C3F-BD1C-C98C9596463C}" type="slidenum">
-              <a:rPr lang="en-US" smtClean="0"/>
-              <a:t>18</a:t>
-            </a:fld>
-            <a:endParaRPr lang="en-US" dirty="0"/>
-          </a:p>
-        </p:txBody>
-      </p:sp>
-    </p:spTree>
-    <p:extLst>
-      <p:ext uri="{BB962C8B-B14F-4D97-AF65-F5344CB8AC3E}">
-        <p14:creationId xmlns:p14="http://schemas.microsoft.com/office/powerpoint/2010/main" val="3285941705"/>
-      </p:ext>
-    </p:extLst>
-  </p:cSld>
-  <p:clrMapOvr>
-    <a:masterClrMapping/>
-  </p:clrMapOvr>
-</p:sld>
-</file>
-
-<file path=ppt/slides/slide19.xml><?xml version="1.0" encoding="utf-8"?>
-<p:sld xmlns:a="http://schemas.openxmlformats.org/drawingml/2006/main" xmlns:r="http://schemas.openxmlformats.org/officeDocument/2006/relationships" xmlns:p="http://schemas.openxmlformats.org/presentationml/2006/main">
-  <p:cSld>
-    <p:spTree>
-      <p:nvGrpSpPr>
-        <p:cNvPr id="1" name=""/>
-        <p:cNvGrpSpPr/>
-        <p:nvPr/>
-      </p:nvGrpSpPr>
-      <p:grpSpPr>
-        <a:xfrm>
-          <a:off x="0" y="0"/>
-          <a:ext cx="0" cy="0"/>
-          <a:chOff x="0" y="0"/>
-          <a:chExt cx="0" cy="0"/>
-        </a:xfrm>
-      </p:grpSpPr>
-      <p:sp>
-        <p:nvSpPr>
-          <p:cNvPr id="2" name="Title 1">
-            <a:extLst>
-              <a:ext uri="{FF2B5EF4-FFF2-40B4-BE49-F238E27FC236}">
                 <a16:creationId xmlns:a16="http://schemas.microsoft.com/office/drawing/2014/main" id="{B9475E96-B110-481B-A9C7-A393B8B7CAE4}"/>
               </a:ext>
             </a:extLst>
@@ -8668,7 +7235,7 @@
           <a:p>
             <a:fld id="{3A98EE3D-8CD1-4C3F-BD1C-C98C9596463C}" type="slidenum">
               <a:rPr lang="en-US" smtClean="0"/>
-              <a:t>19</a:t>
+              <a:t>11</a:t>
             </a:fld>
             <a:endParaRPr lang="en-US" dirty="0"/>
           </a:p>
@@ -8717,6 +7284,1167 @@
 </p:sld>
 </file>
 
+<file path=ppt/slides/slide12.xml><?xml version="1.0" encoding="utf-8"?>
+<p:sld xmlns:a="http://schemas.openxmlformats.org/drawingml/2006/main" xmlns:r="http://schemas.openxmlformats.org/officeDocument/2006/relationships" xmlns:p="http://schemas.openxmlformats.org/presentationml/2006/main">
+  <p:cSld>
+    <p:spTree>
+      <p:nvGrpSpPr>
+        <p:cNvPr id="1" name=""/>
+        <p:cNvGrpSpPr/>
+        <p:nvPr/>
+      </p:nvGrpSpPr>
+      <p:grpSpPr>
+        <a:xfrm>
+          <a:off x="0" y="0"/>
+          <a:ext cx="0" cy="0"/>
+          <a:chOff x="0" y="0"/>
+          <a:chExt cx="0" cy="0"/>
+        </a:xfrm>
+      </p:grpSpPr>
+      <p:sp>
+        <p:nvSpPr>
+          <p:cNvPr id="2" name="Title 1">
+            <a:extLst>
+              <a:ext uri="{FF2B5EF4-FFF2-40B4-BE49-F238E27FC236}">
+                <a16:creationId xmlns:a16="http://schemas.microsoft.com/office/drawing/2014/main" id="{2B4F6F49-7065-4959-9AE9-3E56BADA9F54}"/>
+              </a:ext>
+            </a:extLst>
+          </p:cNvPr>
+          <p:cNvSpPr>
+            <a:spLocks noGrp="1"/>
+          </p:cNvSpPr>
+          <p:nvPr>
+            <p:ph type="title"/>
+          </p:nvPr>
+        </p:nvSpPr>
+        <p:spPr/>
+        <p:txBody>
+          <a:bodyPr/>
+          <a:lstStyle/>
+          <a:p>
+            <a:r>
+              <a:rPr lang="en-US" dirty="0"/>
+              <a:t>Demo</a:t>
+            </a:r>
+            <a:endParaRPr lang="fa-IR" dirty="0"/>
+          </a:p>
+        </p:txBody>
+      </p:sp>
+      <p:sp>
+        <p:nvSpPr>
+          <p:cNvPr id="3" name="Content Placeholder 2">
+            <a:extLst>
+              <a:ext uri="{FF2B5EF4-FFF2-40B4-BE49-F238E27FC236}">
+                <a16:creationId xmlns:a16="http://schemas.microsoft.com/office/drawing/2014/main" id="{7FB20D9D-DFF9-4239-8F15-E91D0539D392}"/>
+              </a:ext>
+            </a:extLst>
+          </p:cNvPr>
+          <p:cNvSpPr>
+            <a:spLocks noGrp="1"/>
+          </p:cNvSpPr>
+          <p:nvPr>
+            <p:ph idx="1"/>
+          </p:nvPr>
+        </p:nvSpPr>
+        <p:spPr/>
+        <p:txBody>
+          <a:bodyPr/>
+          <a:lstStyle/>
+          <a:p>
+            <a:r>
+              <a:rPr lang="en-US" dirty="0"/>
+              <a:t>How to create a pipe:</a:t>
+            </a:r>
+          </a:p>
+          <a:p>
+            <a:pPr lvl="1"/>
+            <a:r>
+              <a:rPr lang="en-US" dirty="0">
+                <a:latin typeface="Consolas" panose="020B0609020204030204" pitchFamily="49" charset="0"/>
+              </a:rPr>
+              <a:t>nest g pipe &lt;path-to-your-class&gt;</a:t>
+            </a:r>
+          </a:p>
+          <a:p>
+            <a:r>
+              <a:rPr lang="en-US" dirty="0"/>
+              <a:t>You should implement transform method</a:t>
+            </a:r>
+          </a:p>
+          <a:p>
+            <a:pPr lvl="1"/>
+            <a:r>
+              <a:rPr lang="en-US" dirty="0"/>
+              <a:t>Input1: value </a:t>
+            </a:r>
+          </a:p>
+          <a:p>
+            <a:pPr lvl="1"/>
+            <a:r>
+              <a:rPr lang="en-US" dirty="0"/>
+              <a:t>Input2: metadata, is the metadata of the currently processed argument</a:t>
+            </a:r>
+          </a:p>
+          <a:p>
+            <a:pPr lvl="1"/>
+            <a:r>
+              <a:rPr lang="en-US" dirty="0"/>
+              <a:t>What you return is override the value </a:t>
+            </a:r>
+            <a:r>
+              <a:rPr lang="en-US" dirty="0">
+                <a:sym typeface="Wingdings" panose="05000000000000000000" pitchFamily="2" charset="2"/>
+              </a:rPr>
+              <a:t> as simple as you see</a:t>
+            </a:r>
+          </a:p>
+        </p:txBody>
+      </p:sp>
+      <p:sp>
+        <p:nvSpPr>
+          <p:cNvPr id="4" name="Footer Placeholder 3">
+            <a:extLst>
+              <a:ext uri="{FF2B5EF4-FFF2-40B4-BE49-F238E27FC236}">
+                <a16:creationId xmlns:a16="http://schemas.microsoft.com/office/drawing/2014/main" id="{1A83C6CF-67E4-4B0B-8A38-9BA3A743CE27}"/>
+              </a:ext>
+            </a:extLst>
+          </p:cNvPr>
+          <p:cNvSpPr>
+            <a:spLocks noGrp="1"/>
+          </p:cNvSpPr>
+          <p:nvPr>
+            <p:ph type="ftr" sz="quarter" idx="11"/>
+          </p:nvPr>
+        </p:nvSpPr>
+        <p:spPr/>
+        <p:txBody>
+          <a:bodyPr/>
+          <a:lstStyle/>
+          <a:p>
+            <a:r>
+              <a:rPr lang="en-US"/>
+              <a:t>Nodejs Basics</a:t>
+            </a:r>
+            <a:endParaRPr lang="en-US" dirty="0"/>
+          </a:p>
+        </p:txBody>
+      </p:sp>
+      <p:sp>
+        <p:nvSpPr>
+          <p:cNvPr id="5" name="Slide Number Placeholder 4">
+            <a:extLst>
+              <a:ext uri="{FF2B5EF4-FFF2-40B4-BE49-F238E27FC236}">
+                <a16:creationId xmlns:a16="http://schemas.microsoft.com/office/drawing/2014/main" id="{727CC769-6D0B-44D0-80BF-CF3993109448}"/>
+              </a:ext>
+            </a:extLst>
+          </p:cNvPr>
+          <p:cNvSpPr>
+            <a:spLocks noGrp="1"/>
+          </p:cNvSpPr>
+          <p:nvPr>
+            <p:ph type="sldNum" sz="quarter" idx="12"/>
+          </p:nvPr>
+        </p:nvSpPr>
+        <p:spPr/>
+        <p:txBody>
+          <a:bodyPr/>
+          <a:lstStyle/>
+          <a:p>
+            <a:fld id="{3A98EE3D-8CD1-4C3F-BD1C-C98C9596463C}" type="slidenum">
+              <a:rPr lang="en-US" smtClean="0"/>
+              <a:t>12</a:t>
+            </a:fld>
+            <a:endParaRPr lang="en-US" dirty="0"/>
+          </a:p>
+        </p:txBody>
+      </p:sp>
+    </p:spTree>
+    <p:extLst>
+      <p:ext uri="{BB962C8B-B14F-4D97-AF65-F5344CB8AC3E}">
+        <p14:creationId xmlns:p14="http://schemas.microsoft.com/office/powerpoint/2010/main" val="3226252466"/>
+      </p:ext>
+    </p:extLst>
+  </p:cSld>
+  <p:clrMapOvr>
+    <a:masterClrMapping/>
+  </p:clrMapOvr>
+</p:sld>
+</file>
+
+<file path=ppt/slides/slide13.xml><?xml version="1.0" encoding="utf-8"?>
+<p:sld xmlns:a="http://schemas.openxmlformats.org/drawingml/2006/main" xmlns:r="http://schemas.openxmlformats.org/officeDocument/2006/relationships" xmlns:p="http://schemas.openxmlformats.org/presentationml/2006/main">
+  <p:cSld>
+    <p:spTree>
+      <p:nvGrpSpPr>
+        <p:cNvPr id="1" name=""/>
+        <p:cNvGrpSpPr/>
+        <p:nvPr/>
+      </p:nvGrpSpPr>
+      <p:grpSpPr>
+        <a:xfrm>
+          <a:off x="0" y="0"/>
+          <a:ext cx="0" cy="0"/>
+          <a:chOff x="0" y="0"/>
+          <a:chExt cx="0" cy="0"/>
+        </a:xfrm>
+      </p:grpSpPr>
+      <p:sp>
+        <p:nvSpPr>
+          <p:cNvPr id="2" name="Title 1">
+            <a:extLst>
+              <a:ext uri="{FF2B5EF4-FFF2-40B4-BE49-F238E27FC236}">
+                <a16:creationId xmlns:a16="http://schemas.microsoft.com/office/drawing/2014/main" id="{80F762D4-A843-463B-82DD-D9EDE7DB59FF}"/>
+              </a:ext>
+            </a:extLst>
+          </p:cNvPr>
+          <p:cNvSpPr>
+            <a:spLocks noGrp="1"/>
+          </p:cNvSpPr>
+          <p:nvPr>
+            <p:ph type="title"/>
+          </p:nvPr>
+        </p:nvSpPr>
+        <p:spPr/>
+        <p:txBody>
+          <a:bodyPr/>
+          <a:lstStyle/>
+          <a:p>
+            <a:r>
+              <a:rPr lang="en-US" dirty="0"/>
+              <a:t>New requirement</a:t>
+            </a:r>
+          </a:p>
+        </p:txBody>
+      </p:sp>
+      <p:sp>
+        <p:nvSpPr>
+          <p:cNvPr id="3" name="Content Placeholder 2">
+            <a:extLst>
+              <a:ext uri="{FF2B5EF4-FFF2-40B4-BE49-F238E27FC236}">
+                <a16:creationId xmlns:a16="http://schemas.microsoft.com/office/drawing/2014/main" id="{BFF78A40-5448-4212-BD70-5E8C0095277D}"/>
+              </a:ext>
+            </a:extLst>
+          </p:cNvPr>
+          <p:cNvSpPr>
+            <a:spLocks noGrp="1"/>
+          </p:cNvSpPr>
+          <p:nvPr>
+            <p:ph idx="1"/>
+          </p:nvPr>
+        </p:nvSpPr>
+        <p:spPr/>
+        <p:txBody>
+          <a:bodyPr/>
+          <a:lstStyle/>
+          <a:p>
+            <a:r>
+              <a:rPr lang="en-US" dirty="0"/>
+              <a:t>Dev:</a:t>
+            </a:r>
+          </a:p>
+          <a:p>
+            <a:pPr lvl="1"/>
+            <a:r>
+              <a:rPr lang="en-US" dirty="0"/>
+              <a:t>Log every request duration, we want this to measure our performance </a:t>
+            </a:r>
+            <a:r>
+              <a:rPr lang="en-US" dirty="0">
+                <a:sym typeface="Wingdings" panose="05000000000000000000" pitchFamily="2" charset="2"/>
+              </a:rPr>
+              <a:t></a:t>
+            </a:r>
+            <a:endParaRPr lang="en-US" dirty="0"/>
+          </a:p>
+          <a:p>
+            <a:pPr lvl="1"/>
+            <a:endParaRPr lang="en-US" dirty="0"/>
+          </a:p>
+        </p:txBody>
+      </p:sp>
+      <p:sp>
+        <p:nvSpPr>
+          <p:cNvPr id="4" name="Footer Placeholder 3">
+            <a:extLst>
+              <a:ext uri="{FF2B5EF4-FFF2-40B4-BE49-F238E27FC236}">
+                <a16:creationId xmlns:a16="http://schemas.microsoft.com/office/drawing/2014/main" id="{098447D3-F92B-4607-A138-6F9DA6B4A32F}"/>
+              </a:ext>
+            </a:extLst>
+          </p:cNvPr>
+          <p:cNvSpPr>
+            <a:spLocks noGrp="1"/>
+          </p:cNvSpPr>
+          <p:nvPr>
+            <p:ph type="ftr" sz="quarter" idx="11"/>
+          </p:nvPr>
+        </p:nvSpPr>
+        <p:spPr/>
+        <p:txBody>
+          <a:bodyPr/>
+          <a:lstStyle/>
+          <a:p>
+            <a:r>
+              <a:rPr lang="en-US"/>
+              <a:t>Nodejs Basics</a:t>
+            </a:r>
+            <a:endParaRPr lang="en-US" dirty="0"/>
+          </a:p>
+        </p:txBody>
+      </p:sp>
+      <p:sp>
+        <p:nvSpPr>
+          <p:cNvPr id="5" name="Slide Number Placeholder 4">
+            <a:extLst>
+              <a:ext uri="{FF2B5EF4-FFF2-40B4-BE49-F238E27FC236}">
+                <a16:creationId xmlns:a16="http://schemas.microsoft.com/office/drawing/2014/main" id="{6C8FCFB8-044D-4395-9869-7485523DF77B}"/>
+              </a:ext>
+            </a:extLst>
+          </p:cNvPr>
+          <p:cNvSpPr>
+            <a:spLocks noGrp="1"/>
+          </p:cNvSpPr>
+          <p:nvPr>
+            <p:ph type="sldNum" sz="quarter" idx="12"/>
+          </p:nvPr>
+        </p:nvSpPr>
+        <p:spPr/>
+        <p:txBody>
+          <a:bodyPr/>
+          <a:lstStyle/>
+          <a:p>
+            <a:fld id="{3A98EE3D-8CD1-4C3F-BD1C-C98C9596463C}" type="slidenum">
+              <a:rPr lang="en-US" smtClean="0"/>
+              <a:t>13</a:t>
+            </a:fld>
+            <a:endParaRPr lang="en-US" dirty="0"/>
+          </a:p>
+        </p:txBody>
+      </p:sp>
+    </p:spTree>
+    <p:extLst>
+      <p:ext uri="{BB962C8B-B14F-4D97-AF65-F5344CB8AC3E}">
+        <p14:creationId xmlns:p14="http://schemas.microsoft.com/office/powerpoint/2010/main" val="2545455785"/>
+      </p:ext>
+    </p:extLst>
+  </p:cSld>
+  <p:clrMapOvr>
+    <a:masterClrMapping/>
+  </p:clrMapOvr>
+</p:sld>
+</file>
+
+<file path=ppt/slides/slide14.xml><?xml version="1.0" encoding="utf-8"?>
+<p:sld xmlns:a="http://schemas.openxmlformats.org/drawingml/2006/main" xmlns:r="http://schemas.openxmlformats.org/officeDocument/2006/relationships" xmlns:p="http://schemas.openxmlformats.org/presentationml/2006/main">
+  <p:cSld>
+    <p:spTree>
+      <p:nvGrpSpPr>
+        <p:cNvPr id="1" name=""/>
+        <p:cNvGrpSpPr/>
+        <p:nvPr/>
+      </p:nvGrpSpPr>
+      <p:grpSpPr>
+        <a:xfrm>
+          <a:off x="0" y="0"/>
+          <a:ext cx="0" cy="0"/>
+          <a:chOff x="0" y="0"/>
+          <a:chExt cx="0" cy="0"/>
+        </a:xfrm>
+      </p:grpSpPr>
+      <p:sp>
+        <p:nvSpPr>
+          <p:cNvPr id="2" name="Title 1">
+            <a:extLst>
+              <a:ext uri="{FF2B5EF4-FFF2-40B4-BE49-F238E27FC236}">
+                <a16:creationId xmlns:a16="http://schemas.microsoft.com/office/drawing/2014/main" id="{7C98B97C-3663-43CD-874E-2BB4CE1C8897}"/>
+              </a:ext>
+            </a:extLst>
+          </p:cNvPr>
+          <p:cNvSpPr>
+            <a:spLocks noGrp="1"/>
+          </p:cNvSpPr>
+          <p:nvPr>
+            <p:ph type="title"/>
+          </p:nvPr>
+        </p:nvSpPr>
+        <p:spPr/>
+        <p:txBody>
+          <a:bodyPr/>
+          <a:lstStyle/>
+          <a:p>
+            <a:r>
+              <a:rPr lang="en-US" dirty="0"/>
+              <a:t>Demo</a:t>
+            </a:r>
+          </a:p>
+        </p:txBody>
+      </p:sp>
+      <p:sp>
+        <p:nvSpPr>
+          <p:cNvPr id="3" name="Content Placeholder 2">
+            <a:extLst>
+              <a:ext uri="{FF2B5EF4-FFF2-40B4-BE49-F238E27FC236}">
+                <a16:creationId xmlns:a16="http://schemas.microsoft.com/office/drawing/2014/main" id="{3B721B17-E87C-4130-9BC5-89CE3661FC1D}"/>
+              </a:ext>
+            </a:extLst>
+          </p:cNvPr>
+          <p:cNvSpPr>
+            <a:spLocks noGrp="1"/>
+          </p:cNvSpPr>
+          <p:nvPr>
+            <p:ph idx="1"/>
+          </p:nvPr>
+        </p:nvSpPr>
+        <p:spPr/>
+        <p:txBody>
+          <a:bodyPr/>
+          <a:lstStyle/>
+          <a:p>
+            <a:r>
+              <a:rPr lang="en-US" dirty="0"/>
+              <a:t>Middleware:</a:t>
+            </a:r>
+          </a:p>
+          <a:p>
+            <a:pPr lvl="1"/>
+            <a:r>
+              <a:rPr lang="en-US" dirty="0"/>
+              <a:t>They have access to req and res objects</a:t>
+            </a:r>
+          </a:p>
+          <a:p>
+            <a:pPr lvl="1"/>
+            <a:r>
+              <a:rPr lang="en-US" dirty="0"/>
+              <a:t>Benefits:</a:t>
+            </a:r>
+          </a:p>
+          <a:p>
+            <a:pPr lvl="2"/>
+            <a:r>
+              <a:rPr lang="en-US" dirty="0"/>
+              <a:t>Making changes to req, res</a:t>
+            </a:r>
+          </a:p>
+          <a:p>
+            <a:pPr lvl="2"/>
+            <a:r>
+              <a:rPr lang="en-US" dirty="0"/>
+              <a:t>Ending req, res cycle</a:t>
+            </a:r>
+          </a:p>
+          <a:p>
+            <a:pPr lvl="2"/>
+            <a:r>
+              <a:rPr lang="en-US" dirty="0"/>
+              <a:t>You have to call next method</a:t>
+            </a:r>
+          </a:p>
+          <a:p>
+            <a:pPr lvl="1"/>
+            <a:r>
+              <a:rPr lang="en-US" dirty="0"/>
+              <a:t>How to create them:</a:t>
+            </a:r>
+          </a:p>
+          <a:p>
+            <a:pPr lvl="2"/>
+            <a:r>
+              <a:rPr lang="en-US" dirty="0"/>
+              <a:t>nest g middleware &lt;path-to-your-class&gt;</a:t>
+            </a:r>
+          </a:p>
+          <a:p>
+            <a:pPr lvl="1"/>
+            <a:r>
+              <a:rPr lang="en-US" dirty="0"/>
+              <a:t>Function Middlewares are stateless, buy class Middlewares is able to have state</a:t>
+            </a:r>
+          </a:p>
+        </p:txBody>
+      </p:sp>
+      <p:sp>
+        <p:nvSpPr>
+          <p:cNvPr id="4" name="Footer Placeholder 3">
+            <a:extLst>
+              <a:ext uri="{FF2B5EF4-FFF2-40B4-BE49-F238E27FC236}">
+                <a16:creationId xmlns:a16="http://schemas.microsoft.com/office/drawing/2014/main" id="{F1D396F6-5965-4C34-969D-4E0AAC94EBE2}"/>
+              </a:ext>
+            </a:extLst>
+          </p:cNvPr>
+          <p:cNvSpPr>
+            <a:spLocks noGrp="1"/>
+          </p:cNvSpPr>
+          <p:nvPr>
+            <p:ph type="ftr" sz="quarter" idx="11"/>
+          </p:nvPr>
+        </p:nvSpPr>
+        <p:spPr/>
+        <p:txBody>
+          <a:bodyPr/>
+          <a:lstStyle/>
+          <a:p>
+            <a:r>
+              <a:rPr lang="en-US"/>
+              <a:t>Nodejs Basics</a:t>
+            </a:r>
+            <a:endParaRPr lang="en-US" dirty="0"/>
+          </a:p>
+        </p:txBody>
+      </p:sp>
+      <p:sp>
+        <p:nvSpPr>
+          <p:cNvPr id="5" name="Slide Number Placeholder 4">
+            <a:extLst>
+              <a:ext uri="{FF2B5EF4-FFF2-40B4-BE49-F238E27FC236}">
+                <a16:creationId xmlns:a16="http://schemas.microsoft.com/office/drawing/2014/main" id="{DADCC05A-E211-4F4B-9AA9-1CB11FE83FB4}"/>
+              </a:ext>
+            </a:extLst>
+          </p:cNvPr>
+          <p:cNvSpPr>
+            <a:spLocks noGrp="1"/>
+          </p:cNvSpPr>
+          <p:nvPr>
+            <p:ph type="sldNum" sz="quarter" idx="12"/>
+          </p:nvPr>
+        </p:nvSpPr>
+        <p:spPr/>
+        <p:txBody>
+          <a:bodyPr/>
+          <a:lstStyle/>
+          <a:p>
+            <a:fld id="{3A98EE3D-8CD1-4C3F-BD1C-C98C9596463C}" type="slidenum">
+              <a:rPr lang="en-US" smtClean="0"/>
+              <a:t>14</a:t>
+            </a:fld>
+            <a:endParaRPr lang="en-US" dirty="0"/>
+          </a:p>
+        </p:txBody>
+      </p:sp>
+    </p:spTree>
+    <p:extLst>
+      <p:ext uri="{BB962C8B-B14F-4D97-AF65-F5344CB8AC3E}">
+        <p14:creationId xmlns:p14="http://schemas.microsoft.com/office/powerpoint/2010/main" val="3193930332"/>
+      </p:ext>
+    </p:extLst>
+  </p:cSld>
+  <p:clrMapOvr>
+    <a:masterClrMapping/>
+  </p:clrMapOvr>
+</p:sld>
+</file>
+
+<file path=ppt/slides/slide15.xml><?xml version="1.0" encoding="utf-8"?>
+<p:sld xmlns:a="http://schemas.openxmlformats.org/drawingml/2006/main" xmlns:r="http://schemas.openxmlformats.org/officeDocument/2006/relationships" xmlns:p="http://schemas.openxmlformats.org/presentationml/2006/main">
+  <p:cSld>
+    <p:spTree>
+      <p:nvGrpSpPr>
+        <p:cNvPr id="1" name=""/>
+        <p:cNvGrpSpPr/>
+        <p:nvPr/>
+      </p:nvGrpSpPr>
+      <p:grpSpPr>
+        <a:xfrm>
+          <a:off x="0" y="0"/>
+          <a:ext cx="0" cy="0"/>
+          <a:chOff x="0" y="0"/>
+          <a:chExt cx="0" cy="0"/>
+        </a:xfrm>
+      </p:grpSpPr>
+      <p:sp>
+        <p:nvSpPr>
+          <p:cNvPr id="2" name="Title 1">
+            <a:extLst>
+              <a:ext uri="{FF2B5EF4-FFF2-40B4-BE49-F238E27FC236}">
+                <a16:creationId xmlns:a16="http://schemas.microsoft.com/office/drawing/2014/main" id="{60070020-B583-4B9E-9C23-16AB23FD7BDB}"/>
+              </a:ext>
+            </a:extLst>
+          </p:cNvPr>
+          <p:cNvSpPr>
+            <a:spLocks noGrp="1"/>
+          </p:cNvSpPr>
+          <p:nvPr>
+            <p:ph type="title"/>
+          </p:nvPr>
+        </p:nvSpPr>
+        <p:spPr/>
+        <p:txBody>
+          <a:bodyPr/>
+          <a:lstStyle/>
+          <a:p>
+            <a:r>
+              <a:rPr lang="en-US" dirty="0"/>
+              <a:t>Demo</a:t>
+            </a:r>
+          </a:p>
+        </p:txBody>
+      </p:sp>
+      <p:sp>
+        <p:nvSpPr>
+          <p:cNvPr id="3" name="Content Placeholder 2">
+            <a:extLst>
+              <a:ext uri="{FF2B5EF4-FFF2-40B4-BE49-F238E27FC236}">
+                <a16:creationId xmlns:a16="http://schemas.microsoft.com/office/drawing/2014/main" id="{76F2F745-7621-4900-82C9-22402813DCB5}"/>
+              </a:ext>
+            </a:extLst>
+          </p:cNvPr>
+          <p:cNvSpPr>
+            <a:spLocks noGrp="1"/>
+          </p:cNvSpPr>
+          <p:nvPr>
+            <p:ph idx="1"/>
+          </p:nvPr>
+        </p:nvSpPr>
+        <p:spPr/>
+        <p:txBody>
+          <a:bodyPr/>
+          <a:lstStyle/>
+          <a:p>
+            <a:r>
+              <a:rPr lang="en-US" dirty="0"/>
+              <a:t>How to use them?</a:t>
+            </a:r>
+          </a:p>
+          <a:p>
+            <a:pPr lvl="1"/>
+            <a:r>
+              <a:rPr lang="en-US" dirty="0"/>
+              <a:t>Middlewares are not bind to any methods, but instead to routes so</a:t>
+            </a:r>
+          </a:p>
+          <a:p>
+            <a:pPr lvl="2"/>
+            <a:r>
+              <a:rPr lang="en-US" dirty="0"/>
+              <a:t>You can’t inject them, you have to change your module structure as follows</a:t>
+            </a:r>
+          </a:p>
+          <a:p>
+            <a:pPr lvl="1"/>
+            <a:r>
+              <a:rPr lang="en-US" dirty="0"/>
+              <a:t>Implements </a:t>
+            </a:r>
+            <a:r>
+              <a:rPr lang="en-US" dirty="0" err="1"/>
+              <a:t>NestModule</a:t>
+            </a:r>
+            <a:r>
+              <a:rPr lang="en-US" dirty="0"/>
+              <a:t> interface</a:t>
+            </a:r>
+          </a:p>
+          <a:p>
+            <a:pPr lvl="2"/>
+            <a:r>
+              <a:rPr lang="en-US" dirty="0"/>
+              <a:t>Require you to define configure() function with a consumer</a:t>
+            </a:r>
+          </a:p>
+          <a:p>
+            <a:pPr lvl="2"/>
+            <a:r>
+              <a:rPr lang="en-US" dirty="0" err="1"/>
+              <a:t>consumer.apply</a:t>
+            </a:r>
+            <a:r>
+              <a:rPr lang="en-US" dirty="0"/>
+              <a:t>(your-middleware).</a:t>
+            </a:r>
+            <a:r>
+              <a:rPr lang="en-US" dirty="0" err="1"/>
+              <a:t>forRoutes</a:t>
+            </a:r>
+            <a:r>
+              <a:rPr lang="en-US" dirty="0"/>
+              <a:t>(‘*’)</a:t>
+            </a:r>
+          </a:p>
+          <a:p>
+            <a:pPr lvl="2"/>
+            <a:r>
+              <a:rPr lang="en-US" dirty="0"/>
+              <a:t>You can exclude() some routes</a:t>
+            </a:r>
+          </a:p>
+          <a:p>
+            <a:pPr lvl="1"/>
+            <a:r>
+              <a:rPr lang="en-US" dirty="0"/>
+              <a:t>Add our callback to finish event on res</a:t>
+            </a:r>
+          </a:p>
+        </p:txBody>
+      </p:sp>
+      <p:sp>
+        <p:nvSpPr>
+          <p:cNvPr id="4" name="Footer Placeholder 3">
+            <a:extLst>
+              <a:ext uri="{FF2B5EF4-FFF2-40B4-BE49-F238E27FC236}">
+                <a16:creationId xmlns:a16="http://schemas.microsoft.com/office/drawing/2014/main" id="{98E37E77-EC0E-4CD0-8FC5-ADCDD08502F6}"/>
+              </a:ext>
+            </a:extLst>
+          </p:cNvPr>
+          <p:cNvSpPr>
+            <a:spLocks noGrp="1"/>
+          </p:cNvSpPr>
+          <p:nvPr>
+            <p:ph type="ftr" sz="quarter" idx="11"/>
+          </p:nvPr>
+        </p:nvSpPr>
+        <p:spPr/>
+        <p:txBody>
+          <a:bodyPr/>
+          <a:lstStyle/>
+          <a:p>
+            <a:r>
+              <a:rPr lang="en-US"/>
+              <a:t>Nodejs Basics</a:t>
+            </a:r>
+            <a:endParaRPr lang="en-US" dirty="0"/>
+          </a:p>
+        </p:txBody>
+      </p:sp>
+      <p:sp>
+        <p:nvSpPr>
+          <p:cNvPr id="5" name="Slide Number Placeholder 4">
+            <a:extLst>
+              <a:ext uri="{FF2B5EF4-FFF2-40B4-BE49-F238E27FC236}">
+                <a16:creationId xmlns:a16="http://schemas.microsoft.com/office/drawing/2014/main" id="{A1C9AFEB-A955-463C-940F-72A39F2D653F}"/>
+              </a:ext>
+            </a:extLst>
+          </p:cNvPr>
+          <p:cNvSpPr>
+            <a:spLocks noGrp="1"/>
+          </p:cNvSpPr>
+          <p:nvPr>
+            <p:ph type="sldNum" sz="quarter" idx="12"/>
+          </p:nvPr>
+        </p:nvSpPr>
+        <p:spPr/>
+        <p:txBody>
+          <a:bodyPr/>
+          <a:lstStyle/>
+          <a:p>
+            <a:fld id="{3A98EE3D-8CD1-4C3F-BD1C-C98C9596463C}" type="slidenum">
+              <a:rPr lang="en-US" smtClean="0"/>
+              <a:t>15</a:t>
+            </a:fld>
+            <a:endParaRPr lang="en-US" dirty="0"/>
+          </a:p>
+        </p:txBody>
+      </p:sp>
+    </p:spTree>
+    <p:extLst>
+      <p:ext uri="{BB962C8B-B14F-4D97-AF65-F5344CB8AC3E}">
+        <p14:creationId xmlns:p14="http://schemas.microsoft.com/office/powerpoint/2010/main" val="3784153259"/>
+      </p:ext>
+    </p:extLst>
+  </p:cSld>
+  <p:clrMapOvr>
+    <a:masterClrMapping/>
+  </p:clrMapOvr>
+</p:sld>
+</file>
+
+<file path=ppt/slides/slide16.xml><?xml version="1.0" encoding="utf-8"?>
+<p:sld xmlns:a="http://schemas.openxmlformats.org/drawingml/2006/main" xmlns:r="http://schemas.openxmlformats.org/officeDocument/2006/relationships" xmlns:p="http://schemas.openxmlformats.org/presentationml/2006/main">
+  <p:cSld>
+    <p:spTree>
+      <p:nvGrpSpPr>
+        <p:cNvPr id="1" name=""/>
+        <p:cNvGrpSpPr/>
+        <p:nvPr/>
+      </p:nvGrpSpPr>
+      <p:grpSpPr>
+        <a:xfrm>
+          <a:off x="0" y="0"/>
+          <a:ext cx="0" cy="0"/>
+          <a:chOff x="0" y="0"/>
+          <a:chExt cx="0" cy="0"/>
+        </a:xfrm>
+      </p:grpSpPr>
+      <p:sp>
+        <p:nvSpPr>
+          <p:cNvPr id="2" name="Title 1">
+            <a:extLst>
+              <a:ext uri="{FF2B5EF4-FFF2-40B4-BE49-F238E27FC236}">
+                <a16:creationId xmlns:a16="http://schemas.microsoft.com/office/drawing/2014/main" id="{6ED9877A-E202-4619-8997-A577FDC71D18}"/>
+              </a:ext>
+            </a:extLst>
+          </p:cNvPr>
+          <p:cNvSpPr>
+            <a:spLocks noGrp="1"/>
+          </p:cNvSpPr>
+          <p:nvPr>
+            <p:ph type="title"/>
+          </p:nvPr>
+        </p:nvSpPr>
+        <p:spPr/>
+        <p:txBody>
+          <a:bodyPr/>
+          <a:lstStyle/>
+          <a:p>
+            <a:r>
+              <a:rPr lang="en-US" dirty="0"/>
+              <a:t>Request Lifecycle in Nest.js</a:t>
+            </a:r>
+          </a:p>
+        </p:txBody>
+      </p:sp>
+      <p:sp>
+        <p:nvSpPr>
+          <p:cNvPr id="4" name="Footer Placeholder 3">
+            <a:extLst>
+              <a:ext uri="{FF2B5EF4-FFF2-40B4-BE49-F238E27FC236}">
+                <a16:creationId xmlns:a16="http://schemas.microsoft.com/office/drawing/2014/main" id="{8D639ECC-F0ED-4ACD-8B7D-E693230AFE0C}"/>
+              </a:ext>
+            </a:extLst>
+          </p:cNvPr>
+          <p:cNvSpPr>
+            <a:spLocks noGrp="1"/>
+          </p:cNvSpPr>
+          <p:nvPr>
+            <p:ph type="ftr" sz="quarter" idx="11"/>
+          </p:nvPr>
+        </p:nvSpPr>
+        <p:spPr/>
+        <p:txBody>
+          <a:bodyPr/>
+          <a:lstStyle/>
+          <a:p>
+            <a:r>
+              <a:rPr lang="en-US"/>
+              <a:t>Nodejs Basics</a:t>
+            </a:r>
+            <a:endParaRPr lang="en-US" dirty="0"/>
+          </a:p>
+        </p:txBody>
+      </p:sp>
+      <p:sp>
+        <p:nvSpPr>
+          <p:cNvPr id="5" name="Slide Number Placeholder 4">
+            <a:extLst>
+              <a:ext uri="{FF2B5EF4-FFF2-40B4-BE49-F238E27FC236}">
+                <a16:creationId xmlns:a16="http://schemas.microsoft.com/office/drawing/2014/main" id="{5703D7FD-3C6A-40CA-94A9-156BD6EF79B7}"/>
+              </a:ext>
+            </a:extLst>
+          </p:cNvPr>
+          <p:cNvSpPr>
+            <a:spLocks noGrp="1"/>
+          </p:cNvSpPr>
+          <p:nvPr>
+            <p:ph type="sldNum" sz="quarter" idx="12"/>
+          </p:nvPr>
+        </p:nvSpPr>
+        <p:spPr/>
+        <p:txBody>
+          <a:bodyPr/>
+          <a:lstStyle/>
+          <a:p>
+            <a:fld id="{3A98EE3D-8CD1-4C3F-BD1C-C98C9596463C}" type="slidenum">
+              <a:rPr lang="en-US" smtClean="0"/>
+              <a:t>16</a:t>
+            </a:fld>
+            <a:endParaRPr lang="en-US" dirty="0"/>
+          </a:p>
+        </p:txBody>
+      </p:sp>
+      <p:sp>
+        <p:nvSpPr>
+          <p:cNvPr id="8" name="AutoShape 4">
+            <a:extLst>
+              <a:ext uri="{FF2B5EF4-FFF2-40B4-BE49-F238E27FC236}">
+                <a16:creationId xmlns:a16="http://schemas.microsoft.com/office/drawing/2014/main" id="{6A42DC6C-67D5-4337-B7FA-2898664EE1DB}"/>
+              </a:ext>
+            </a:extLst>
+          </p:cNvPr>
+          <p:cNvSpPr>
+            <a:spLocks noChangeAspect="1" noChangeArrowheads="1"/>
+          </p:cNvSpPr>
+          <p:nvPr/>
+        </p:nvSpPr>
+        <p:spPr bwMode="auto">
+          <a:xfrm>
+            <a:off x="5943600" y="3276600"/>
+            <a:ext cx="304800" cy="304800"/>
+          </a:xfrm>
+          <a:prstGeom prst="rect">
+            <a:avLst/>
+          </a:prstGeom>
+          <a:noFill/>
+          <a:extLst>
+            <a:ext uri="{909E8E84-426E-40DD-AFC4-6F175D3DCCD1}">
+              <a14:hiddenFill xmlns:a14="http://schemas.microsoft.com/office/drawing/2010/main">
+                <a:solidFill>
+                  <a:srgbClr val="FFFFFF"/>
+                </a:solidFill>
+              </a14:hiddenFill>
+            </a:ext>
+          </a:extLst>
+        </p:spPr>
+        <p:txBody>
+          <a:bodyPr vert="horz" wrap="square" lIns="91440" tIns="45720" rIns="91440" bIns="45720" numCol="1" anchor="t" anchorCtr="0" compatLnSpc="1">
+            <a:prstTxWarp prst="textNoShape">
+              <a:avLst/>
+            </a:prstTxWarp>
+          </a:bodyPr>
+          <a:lstStyle/>
+          <a:p>
+            <a:endParaRPr lang="en-US"/>
+          </a:p>
+        </p:txBody>
+      </p:sp>
+      <p:pic>
+        <p:nvPicPr>
+          <p:cNvPr id="1030" name="Picture 6">
+            <a:extLst>
+              <a:ext uri="{FF2B5EF4-FFF2-40B4-BE49-F238E27FC236}">
+                <a16:creationId xmlns:a16="http://schemas.microsoft.com/office/drawing/2014/main" id="{E669EEB0-00CE-4193-87B8-A3B27D73D24B}"/>
+              </a:ext>
+            </a:extLst>
+          </p:cNvPr>
+          <p:cNvPicPr>
+            <a:picLocks noGrp="1" noChangeAspect="1" noChangeArrowheads="1"/>
+          </p:cNvPicPr>
+          <p:nvPr>
+            <p:ph idx="1"/>
+          </p:nvPr>
+        </p:nvPicPr>
+        <p:blipFill>
+          <a:blip r:embed="rId3">
+            <a:extLst>
+              <a:ext uri="{28A0092B-C50C-407E-A947-70E740481C1C}">
+                <a14:useLocalDpi xmlns:a14="http://schemas.microsoft.com/office/drawing/2010/main" val="0"/>
+              </a:ext>
+            </a:extLst>
+          </a:blip>
+          <a:srcRect/>
+          <a:stretch>
+            <a:fillRect/>
+          </a:stretch>
+        </p:blipFill>
+        <p:spPr bwMode="auto">
+          <a:xfrm>
+            <a:off x="169730" y="1797270"/>
+            <a:ext cx="11843016" cy="4244536"/>
+          </a:xfrm>
+          <a:prstGeom prst="rect">
+            <a:avLst/>
+          </a:prstGeom>
+          <a:noFill/>
+          <a:extLst>
+            <a:ext uri="{909E8E84-426E-40DD-AFC4-6F175D3DCCD1}">
+              <a14:hiddenFill xmlns:a14="http://schemas.microsoft.com/office/drawing/2010/main">
+                <a:solidFill>
+                  <a:srgbClr val="FFFFFF"/>
+                </a:solidFill>
+              </a14:hiddenFill>
+            </a:ext>
+          </a:extLst>
+        </p:spPr>
+      </p:pic>
+    </p:spTree>
+    <p:extLst>
+      <p:ext uri="{BB962C8B-B14F-4D97-AF65-F5344CB8AC3E}">
+        <p14:creationId xmlns:p14="http://schemas.microsoft.com/office/powerpoint/2010/main" val="3666123827"/>
+      </p:ext>
+    </p:extLst>
+  </p:cSld>
+  <p:clrMapOvr>
+    <a:masterClrMapping/>
+  </p:clrMapOvr>
+</p:sld>
+</file>
+
+<file path=ppt/slides/slide17.xml><?xml version="1.0" encoding="utf-8"?>
+<p:sld xmlns:a="http://schemas.openxmlformats.org/drawingml/2006/main" xmlns:r="http://schemas.openxmlformats.org/officeDocument/2006/relationships" xmlns:p="http://schemas.openxmlformats.org/presentationml/2006/main">
+  <p:cSld>
+    <p:spTree>
+      <p:nvGrpSpPr>
+        <p:cNvPr id="1" name=""/>
+        <p:cNvGrpSpPr/>
+        <p:nvPr/>
+      </p:nvGrpSpPr>
+      <p:grpSpPr>
+        <a:xfrm>
+          <a:off x="0" y="0"/>
+          <a:ext cx="0" cy="0"/>
+          <a:chOff x="0" y="0"/>
+          <a:chExt cx="0" cy="0"/>
+        </a:xfrm>
+      </p:grpSpPr>
+      <p:sp>
+        <p:nvSpPr>
+          <p:cNvPr id="2" name="Title 1">
+            <a:extLst>
+              <a:ext uri="{FF2B5EF4-FFF2-40B4-BE49-F238E27FC236}">
+                <a16:creationId xmlns:a16="http://schemas.microsoft.com/office/drawing/2014/main" id="{6B1A0672-14A7-4501-900C-A98EBCCF7AFE}"/>
+              </a:ext>
+            </a:extLst>
+          </p:cNvPr>
+          <p:cNvSpPr>
+            <a:spLocks noGrp="1"/>
+          </p:cNvSpPr>
+          <p:nvPr>
+            <p:ph type="title"/>
+          </p:nvPr>
+        </p:nvSpPr>
+        <p:spPr/>
+        <p:txBody>
+          <a:bodyPr/>
+          <a:lstStyle/>
+          <a:p>
+            <a:r>
+              <a:rPr lang="en-US" dirty="0"/>
+              <a:t>Exercise</a:t>
+            </a:r>
+          </a:p>
+        </p:txBody>
+      </p:sp>
+      <p:sp>
+        <p:nvSpPr>
+          <p:cNvPr id="3" name="Content Placeholder 2">
+            <a:extLst>
+              <a:ext uri="{FF2B5EF4-FFF2-40B4-BE49-F238E27FC236}">
+                <a16:creationId xmlns:a16="http://schemas.microsoft.com/office/drawing/2014/main" id="{2AEB1BE9-8435-42BF-A4F1-2F148FA9187A}"/>
+              </a:ext>
+            </a:extLst>
+          </p:cNvPr>
+          <p:cNvSpPr>
+            <a:spLocks noGrp="1"/>
+          </p:cNvSpPr>
+          <p:nvPr>
+            <p:ph idx="1"/>
+          </p:nvPr>
+        </p:nvSpPr>
+        <p:spPr/>
+        <p:txBody>
+          <a:bodyPr>
+            <a:normAutofit/>
+          </a:bodyPr>
+          <a:lstStyle/>
+          <a:p>
+            <a:r>
+              <a:rPr lang="en-US" dirty="0"/>
+              <a:t>Required:</a:t>
+            </a:r>
+          </a:p>
+          <a:p>
+            <a:pPr lvl="1"/>
+            <a:r>
+              <a:rPr lang="en-US" dirty="0"/>
+              <a:t>Exercise all we speak</a:t>
+            </a:r>
+            <a:endParaRPr lang="fa-IR" dirty="0"/>
+          </a:p>
+          <a:p>
+            <a:r>
+              <a:rPr lang="en-US" dirty="0"/>
+              <a:t>Optional:</a:t>
+            </a:r>
+          </a:p>
+          <a:p>
+            <a:pPr lvl="1"/>
+            <a:r>
+              <a:rPr lang="en-US" dirty="0"/>
+              <a:t>Notify user whenever a lower price available</a:t>
+            </a:r>
+          </a:p>
+          <a:p>
+            <a:pPr lvl="1"/>
+            <a:r>
+              <a:rPr lang="en-US" dirty="0"/>
+              <a:t>You can add your </a:t>
+            </a:r>
+            <a:r>
+              <a:rPr lang="en-US" dirty="0" err="1"/>
+              <a:t>setInterval</a:t>
+            </a:r>
+            <a:r>
+              <a:rPr lang="en-US" dirty="0"/>
+              <a:t> inside main.ts</a:t>
+            </a:r>
+          </a:p>
+          <a:p>
+            <a:pPr lvl="1"/>
+            <a:r>
+              <a:rPr lang="en-US" dirty="0"/>
+              <a:t>Suppose that user inquire you every 5 second.</a:t>
+            </a:r>
+          </a:p>
+        </p:txBody>
+      </p:sp>
+      <p:sp>
+        <p:nvSpPr>
+          <p:cNvPr id="4" name="Footer Placeholder 3">
+            <a:extLst>
+              <a:ext uri="{FF2B5EF4-FFF2-40B4-BE49-F238E27FC236}">
+                <a16:creationId xmlns:a16="http://schemas.microsoft.com/office/drawing/2014/main" id="{E3C0E9F9-B143-43AD-BD5C-508C3E46FF7B}"/>
+              </a:ext>
+            </a:extLst>
+          </p:cNvPr>
+          <p:cNvSpPr>
+            <a:spLocks noGrp="1"/>
+          </p:cNvSpPr>
+          <p:nvPr>
+            <p:ph type="ftr" sz="quarter" idx="11"/>
+          </p:nvPr>
+        </p:nvSpPr>
+        <p:spPr/>
+        <p:txBody>
+          <a:bodyPr/>
+          <a:lstStyle/>
+          <a:p>
+            <a:r>
+              <a:rPr lang="en-US"/>
+              <a:t>Nodejs Basics</a:t>
+            </a:r>
+            <a:endParaRPr lang="en-US" dirty="0"/>
+          </a:p>
+        </p:txBody>
+      </p:sp>
+      <p:sp>
+        <p:nvSpPr>
+          <p:cNvPr id="5" name="Slide Number Placeholder 4">
+            <a:extLst>
+              <a:ext uri="{FF2B5EF4-FFF2-40B4-BE49-F238E27FC236}">
+                <a16:creationId xmlns:a16="http://schemas.microsoft.com/office/drawing/2014/main" id="{1B95C015-BA9F-40C7-A04C-3B835E7354AB}"/>
+              </a:ext>
+            </a:extLst>
+          </p:cNvPr>
+          <p:cNvSpPr>
+            <a:spLocks noGrp="1"/>
+          </p:cNvSpPr>
+          <p:nvPr>
+            <p:ph type="sldNum" sz="quarter" idx="12"/>
+          </p:nvPr>
+        </p:nvSpPr>
+        <p:spPr/>
+        <p:txBody>
+          <a:bodyPr/>
+          <a:lstStyle/>
+          <a:p>
+            <a:fld id="{3A98EE3D-8CD1-4C3F-BD1C-C98C9596463C}" type="slidenum">
+              <a:rPr lang="en-US" smtClean="0"/>
+              <a:t>17</a:t>
+            </a:fld>
+            <a:endParaRPr lang="en-US" dirty="0"/>
+          </a:p>
+        </p:txBody>
+      </p:sp>
+    </p:spTree>
+    <p:extLst>
+      <p:ext uri="{BB962C8B-B14F-4D97-AF65-F5344CB8AC3E}">
+        <p14:creationId xmlns:p14="http://schemas.microsoft.com/office/powerpoint/2010/main" val="817859998"/>
+      </p:ext>
+    </p:extLst>
+  </p:cSld>
+  <p:clrMapOvr>
+    <a:masterClrMapping/>
+  </p:clrMapOvr>
+</p:sld>
+</file>
+
 <file path=ppt/slides/slide2.xml><?xml version="1.0" encoding="utf-8"?>
 <p:sld xmlns:a="http://schemas.openxmlformats.org/drawingml/2006/main" xmlns:r="http://schemas.openxmlformats.org/officeDocument/2006/relationships" xmlns:p="http://schemas.openxmlformats.org/presentationml/2006/main">
   <p:cSld>
@@ -8791,7 +8519,7 @@
                   <a:schemeClr val="tx1"/>
                 </a:solidFill>
               </a:rPr>
-              <a:t>Add Request Logging with Middlewares</a:t>
+              <a:t>Add Pointcuts with Interceptors</a:t>
             </a:r>
           </a:p>
           <a:p>
@@ -8801,7 +8529,27 @@
                   <a:schemeClr val="tx1"/>
                 </a:solidFill>
               </a:rPr>
-              <a:t>Create Custom Param Decorators</a:t>
+              <a:t>Handling Timeouts with Interceptors</a:t>
+            </a:r>
+          </a:p>
+          <a:p>
+            <a:r>
+              <a:rPr lang="en-US" dirty="0">
+                <a:solidFill>
+                  <a:schemeClr val="tx1"/>
+                </a:solidFill>
+              </a:rPr>
+              <a:t>Creating Custom Pipes</a:t>
+            </a:r>
+          </a:p>
+          <a:p>
+            <a:r>
+              <a:rPr lang="en-US" dirty="0">
+                <a:solidFill>
+                  <a:schemeClr val="tx1"/>
+                </a:solidFill>
+              </a:rPr>
+              <a:t>Add Request Logging with Middlewares</a:t>
             </a:r>
           </a:p>
         </p:txBody>
@@ -8868,350 +8616,6 @@
     <p:extLst>
       <p:ext uri="{BB962C8B-B14F-4D97-AF65-F5344CB8AC3E}">
         <p14:creationId xmlns:p14="http://schemas.microsoft.com/office/powerpoint/2010/main" val="2687854352"/>
-      </p:ext>
-    </p:extLst>
-  </p:cSld>
-  <p:clrMapOvr>
-    <a:masterClrMapping/>
-  </p:clrMapOvr>
-</p:sld>
-</file>
-
-<file path=ppt/slides/slide20.xml><?xml version="1.0" encoding="utf-8"?>
-<p:sld xmlns:a="http://schemas.openxmlformats.org/drawingml/2006/main" xmlns:r="http://schemas.openxmlformats.org/officeDocument/2006/relationships" xmlns:p="http://schemas.openxmlformats.org/presentationml/2006/main">
-  <p:cSld>
-    <p:spTree>
-      <p:nvGrpSpPr>
-        <p:cNvPr id="1" name=""/>
-        <p:cNvGrpSpPr/>
-        <p:nvPr/>
-      </p:nvGrpSpPr>
-      <p:grpSpPr>
-        <a:xfrm>
-          <a:off x="0" y="0"/>
-          <a:ext cx="0" cy="0"/>
-          <a:chOff x="0" y="0"/>
-          <a:chExt cx="0" cy="0"/>
-        </a:xfrm>
-      </p:grpSpPr>
-      <p:sp>
-        <p:nvSpPr>
-          <p:cNvPr id="2" name="Title 1">
-            <a:extLst>
-              <a:ext uri="{FF2B5EF4-FFF2-40B4-BE49-F238E27FC236}">
-                <a16:creationId xmlns:a16="http://schemas.microsoft.com/office/drawing/2014/main" id="{2B4F6F49-7065-4959-9AE9-3E56BADA9F54}"/>
-              </a:ext>
-            </a:extLst>
-          </p:cNvPr>
-          <p:cNvSpPr>
-            <a:spLocks noGrp="1"/>
-          </p:cNvSpPr>
-          <p:nvPr>
-            <p:ph type="title"/>
-          </p:nvPr>
-        </p:nvSpPr>
-        <p:spPr/>
-        <p:txBody>
-          <a:bodyPr/>
-          <a:lstStyle/>
-          <a:p>
-            <a:r>
-              <a:rPr lang="en-US" dirty="0"/>
-              <a:t>Demo</a:t>
-            </a:r>
-            <a:endParaRPr lang="fa-IR" dirty="0"/>
-          </a:p>
-        </p:txBody>
-      </p:sp>
-      <p:sp>
-        <p:nvSpPr>
-          <p:cNvPr id="3" name="Content Placeholder 2">
-            <a:extLst>
-              <a:ext uri="{FF2B5EF4-FFF2-40B4-BE49-F238E27FC236}">
-                <a16:creationId xmlns:a16="http://schemas.microsoft.com/office/drawing/2014/main" id="{7FB20D9D-DFF9-4239-8F15-E91D0539D392}"/>
-              </a:ext>
-            </a:extLst>
-          </p:cNvPr>
-          <p:cNvSpPr>
-            <a:spLocks noGrp="1"/>
-          </p:cNvSpPr>
-          <p:nvPr>
-            <p:ph idx="1"/>
-          </p:nvPr>
-        </p:nvSpPr>
-        <p:spPr/>
-        <p:txBody>
-          <a:bodyPr/>
-          <a:lstStyle/>
-          <a:p>
-            <a:r>
-              <a:rPr lang="en-US" dirty="0"/>
-              <a:t>How to create a pipe:</a:t>
-            </a:r>
-          </a:p>
-          <a:p>
-            <a:pPr lvl="1"/>
-            <a:r>
-              <a:rPr lang="en-US" dirty="0"/>
-              <a:t>nest g pipe &lt;path-to-your-class&gt;</a:t>
-            </a:r>
-          </a:p>
-          <a:p>
-            <a:r>
-              <a:rPr lang="en-US" dirty="0"/>
-              <a:t>You should implement transform method</a:t>
-            </a:r>
-          </a:p>
-          <a:p>
-            <a:pPr lvl="1"/>
-            <a:r>
-              <a:rPr lang="en-US" dirty="0"/>
-              <a:t>Input1: value </a:t>
-            </a:r>
-          </a:p>
-          <a:p>
-            <a:pPr lvl="1"/>
-            <a:r>
-              <a:rPr lang="en-US" dirty="0"/>
-              <a:t>Input2: metadata, is the metadata of the currently processed argument</a:t>
-            </a:r>
-          </a:p>
-          <a:p>
-            <a:pPr lvl="1"/>
-            <a:r>
-              <a:rPr lang="en-US" dirty="0"/>
-              <a:t>What you return is override the value </a:t>
-            </a:r>
-            <a:r>
-              <a:rPr lang="en-US" dirty="0">
-                <a:sym typeface="Wingdings" panose="05000000000000000000" pitchFamily="2" charset="2"/>
-              </a:rPr>
-              <a:t> as simple as you see</a:t>
-            </a:r>
-          </a:p>
-        </p:txBody>
-      </p:sp>
-      <p:sp>
-        <p:nvSpPr>
-          <p:cNvPr id="4" name="Footer Placeholder 3">
-            <a:extLst>
-              <a:ext uri="{FF2B5EF4-FFF2-40B4-BE49-F238E27FC236}">
-                <a16:creationId xmlns:a16="http://schemas.microsoft.com/office/drawing/2014/main" id="{1A83C6CF-67E4-4B0B-8A38-9BA3A743CE27}"/>
-              </a:ext>
-            </a:extLst>
-          </p:cNvPr>
-          <p:cNvSpPr>
-            <a:spLocks noGrp="1"/>
-          </p:cNvSpPr>
-          <p:nvPr>
-            <p:ph type="ftr" sz="quarter" idx="11"/>
-          </p:nvPr>
-        </p:nvSpPr>
-        <p:spPr/>
-        <p:txBody>
-          <a:bodyPr/>
-          <a:lstStyle/>
-          <a:p>
-            <a:r>
-              <a:rPr lang="en-US"/>
-              <a:t>Nodejs Basics</a:t>
-            </a:r>
-            <a:endParaRPr lang="en-US" dirty="0"/>
-          </a:p>
-        </p:txBody>
-      </p:sp>
-      <p:sp>
-        <p:nvSpPr>
-          <p:cNvPr id="5" name="Slide Number Placeholder 4">
-            <a:extLst>
-              <a:ext uri="{FF2B5EF4-FFF2-40B4-BE49-F238E27FC236}">
-                <a16:creationId xmlns:a16="http://schemas.microsoft.com/office/drawing/2014/main" id="{727CC769-6D0B-44D0-80BF-CF3993109448}"/>
-              </a:ext>
-            </a:extLst>
-          </p:cNvPr>
-          <p:cNvSpPr>
-            <a:spLocks noGrp="1"/>
-          </p:cNvSpPr>
-          <p:nvPr>
-            <p:ph type="sldNum" sz="quarter" idx="12"/>
-          </p:nvPr>
-        </p:nvSpPr>
-        <p:spPr/>
-        <p:txBody>
-          <a:bodyPr/>
-          <a:lstStyle/>
-          <a:p>
-            <a:fld id="{3A98EE3D-8CD1-4C3F-BD1C-C98C9596463C}" type="slidenum">
-              <a:rPr lang="en-US" smtClean="0"/>
-              <a:t>20</a:t>
-            </a:fld>
-            <a:endParaRPr lang="en-US" dirty="0"/>
-          </a:p>
-        </p:txBody>
-      </p:sp>
-    </p:spTree>
-    <p:extLst>
-      <p:ext uri="{BB962C8B-B14F-4D97-AF65-F5344CB8AC3E}">
-        <p14:creationId xmlns:p14="http://schemas.microsoft.com/office/powerpoint/2010/main" val="3226252466"/>
-      </p:ext>
-    </p:extLst>
-  </p:cSld>
-  <p:clrMapOvr>
-    <a:masterClrMapping/>
-  </p:clrMapOvr>
-</p:sld>
-</file>
-
-<file path=ppt/slides/slide21.xml><?xml version="1.0" encoding="utf-8"?>
-<p:sld xmlns:a="http://schemas.openxmlformats.org/drawingml/2006/main" xmlns:r="http://schemas.openxmlformats.org/officeDocument/2006/relationships" xmlns:p="http://schemas.openxmlformats.org/presentationml/2006/main">
-  <p:cSld>
-    <p:spTree>
-      <p:nvGrpSpPr>
-        <p:cNvPr id="1" name=""/>
-        <p:cNvGrpSpPr/>
-        <p:nvPr/>
-      </p:nvGrpSpPr>
-      <p:grpSpPr>
-        <a:xfrm>
-          <a:off x="0" y="0"/>
-          <a:ext cx="0" cy="0"/>
-          <a:chOff x="0" y="0"/>
-          <a:chExt cx="0" cy="0"/>
-        </a:xfrm>
-      </p:grpSpPr>
-      <p:sp>
-        <p:nvSpPr>
-          <p:cNvPr id="2" name="Title 1">
-            <a:extLst>
-              <a:ext uri="{FF2B5EF4-FFF2-40B4-BE49-F238E27FC236}">
-                <a16:creationId xmlns:a16="http://schemas.microsoft.com/office/drawing/2014/main" id="{6B1A0672-14A7-4501-900C-A98EBCCF7AFE}"/>
-              </a:ext>
-            </a:extLst>
-          </p:cNvPr>
-          <p:cNvSpPr>
-            <a:spLocks noGrp="1"/>
-          </p:cNvSpPr>
-          <p:nvPr>
-            <p:ph type="title"/>
-          </p:nvPr>
-        </p:nvSpPr>
-        <p:spPr/>
-        <p:txBody>
-          <a:bodyPr/>
-          <a:lstStyle/>
-          <a:p>
-            <a:r>
-              <a:rPr lang="en-US" dirty="0"/>
-              <a:t>Exercise</a:t>
-            </a:r>
-          </a:p>
-        </p:txBody>
-      </p:sp>
-      <p:sp>
-        <p:nvSpPr>
-          <p:cNvPr id="3" name="Content Placeholder 2">
-            <a:extLst>
-              <a:ext uri="{FF2B5EF4-FFF2-40B4-BE49-F238E27FC236}">
-                <a16:creationId xmlns:a16="http://schemas.microsoft.com/office/drawing/2014/main" id="{2AEB1BE9-8435-42BF-A4F1-2F148FA9187A}"/>
-              </a:ext>
-            </a:extLst>
-          </p:cNvPr>
-          <p:cNvSpPr>
-            <a:spLocks noGrp="1"/>
-          </p:cNvSpPr>
-          <p:nvPr>
-            <p:ph idx="1"/>
-          </p:nvPr>
-        </p:nvSpPr>
-        <p:spPr/>
-        <p:txBody>
-          <a:bodyPr>
-            <a:normAutofit/>
-          </a:bodyPr>
-          <a:lstStyle/>
-          <a:p>
-            <a:r>
-              <a:rPr lang="en-US" dirty="0"/>
-              <a:t>Required:</a:t>
-            </a:r>
-          </a:p>
-          <a:p>
-            <a:pPr lvl="1"/>
-            <a:r>
-              <a:rPr lang="en-US" dirty="0"/>
-              <a:t>Exercise all we speak</a:t>
-            </a:r>
-          </a:p>
-          <a:p>
-            <a:r>
-              <a:rPr lang="en-US" dirty="0"/>
-              <a:t>Optional:</a:t>
-            </a:r>
-          </a:p>
-        </p:txBody>
-      </p:sp>
-      <p:sp>
-        <p:nvSpPr>
-          <p:cNvPr id="4" name="Footer Placeholder 3">
-            <a:extLst>
-              <a:ext uri="{FF2B5EF4-FFF2-40B4-BE49-F238E27FC236}">
-                <a16:creationId xmlns:a16="http://schemas.microsoft.com/office/drawing/2014/main" id="{E3C0E9F9-B143-43AD-BD5C-508C3E46FF7B}"/>
-              </a:ext>
-            </a:extLst>
-          </p:cNvPr>
-          <p:cNvSpPr>
-            <a:spLocks noGrp="1"/>
-          </p:cNvSpPr>
-          <p:nvPr>
-            <p:ph type="ftr" sz="quarter" idx="11"/>
-          </p:nvPr>
-        </p:nvSpPr>
-        <p:spPr/>
-        <p:txBody>
-          <a:bodyPr/>
-          <a:lstStyle/>
-          <a:p>
-            <a:r>
-              <a:rPr lang="en-US"/>
-              <a:t>Nodejs Basics</a:t>
-            </a:r>
-            <a:endParaRPr lang="en-US" dirty="0"/>
-          </a:p>
-        </p:txBody>
-      </p:sp>
-      <p:sp>
-        <p:nvSpPr>
-          <p:cNvPr id="5" name="Slide Number Placeholder 4">
-            <a:extLst>
-              <a:ext uri="{FF2B5EF4-FFF2-40B4-BE49-F238E27FC236}">
-                <a16:creationId xmlns:a16="http://schemas.microsoft.com/office/drawing/2014/main" id="{1B95C015-BA9F-40C7-A04C-3B835E7354AB}"/>
-              </a:ext>
-            </a:extLst>
-          </p:cNvPr>
-          <p:cNvSpPr>
-            <a:spLocks noGrp="1"/>
-          </p:cNvSpPr>
-          <p:nvPr>
-            <p:ph type="sldNum" sz="quarter" idx="12"/>
-          </p:nvPr>
-        </p:nvSpPr>
-        <p:spPr/>
-        <p:txBody>
-          <a:bodyPr/>
-          <a:lstStyle/>
-          <a:p>
-            <a:fld id="{3A98EE3D-8CD1-4C3F-BD1C-C98C9596463C}" type="slidenum">
-              <a:rPr lang="en-US" smtClean="0"/>
-              <a:t>21</a:t>
-            </a:fld>
-            <a:endParaRPr lang="en-US" dirty="0"/>
-          </a:p>
-        </p:txBody>
-      </p:sp>
-    </p:spTree>
-    <p:extLst>
-      <p:ext uri="{BB962C8B-B14F-4D97-AF65-F5344CB8AC3E}">
-        <p14:creationId xmlns:p14="http://schemas.microsoft.com/office/powerpoint/2010/main" val="817859998"/>
       </p:ext>
     </p:extLst>
   </p:cSld>
@@ -9243,7 +8647,7 @@
           <p:cNvPr id="2" name="Title 1">
             <a:extLst>
               <a:ext uri="{FF2B5EF4-FFF2-40B4-BE49-F238E27FC236}">
-                <a16:creationId xmlns:a16="http://schemas.microsoft.com/office/drawing/2014/main" id="{776B00F1-0C6D-4A6B-A4DC-0AC687E06F33}"/>
+                <a16:creationId xmlns:a16="http://schemas.microsoft.com/office/drawing/2014/main" id="{C7BB3756-00A2-424D-B489-FC1536683FC8}"/>
               </a:ext>
             </a:extLst>
           </p:cNvPr>
@@ -9261,7 +8665,7 @@
           <a:p>
             <a:r>
               <a:rPr lang="en-US" dirty="0"/>
-              <a:t>Nest the GREAT</a:t>
+              <a:t>New requirement</a:t>
             </a:r>
             <a:endParaRPr lang="fa-IR" dirty="0"/>
           </a:p>
@@ -9272,7 +8676,7 @@
           <p:cNvPr id="3" name="Content Placeholder 2">
             <a:extLst>
               <a:ext uri="{FF2B5EF4-FFF2-40B4-BE49-F238E27FC236}">
-                <a16:creationId xmlns:a16="http://schemas.microsoft.com/office/drawing/2014/main" id="{1B5D5D2A-E14F-4B9B-9842-B6C28AD52755}"/>
+                <a16:creationId xmlns:a16="http://schemas.microsoft.com/office/drawing/2014/main" id="{BB33740E-30CA-4F7D-8C34-5AE2F2A664B9}"/>
               </a:ext>
             </a:extLst>
           </p:cNvPr>
@@ -9285,64 +8689,20 @@
         </p:nvSpPr>
         <p:spPr/>
         <p:txBody>
-          <a:bodyPr>
-            <a:normAutofit/>
-          </a:bodyPr>
+          <a:bodyPr/>
           <a:lstStyle/>
           <a:p>
             <a:r>
               <a:rPr lang="en-US" dirty="0"/>
-              <a:t>Nest has many building blocks that help us to maintain our application easily.</a:t>
+              <a:t>Wrap all responses inside an object with a filed called data.</a:t>
             </a:r>
           </a:p>
           <a:p>
             <a:r>
               <a:rPr lang="en-US" dirty="0"/>
-              <a:t>In nest.js we have more building blocks:</a:t>
-            </a:r>
-          </a:p>
-          <a:p>
-            <a:pPr lvl="1"/>
-            <a:r>
-              <a:rPr lang="en-US" dirty="0"/>
-              <a:t>Exception filters</a:t>
-            </a:r>
-          </a:p>
-          <a:p>
-            <a:pPr lvl="2"/>
-            <a:r>
-              <a:rPr lang="en-US" dirty="0"/>
-              <a:t>Responsible for handling and processing unhandled exceptions that might occur in our application.</a:t>
-            </a:r>
-          </a:p>
-          <a:p>
-            <a:pPr lvl="1"/>
-            <a:r>
-              <a:rPr lang="en-US" dirty="0"/>
-              <a:t>Pipes</a:t>
-            </a:r>
-          </a:p>
-          <a:p>
-            <a:pPr lvl="2"/>
-            <a:r>
-              <a:rPr lang="en-US" dirty="0"/>
-              <a:t>Transformation: transform input data to the desired output</a:t>
-            </a:r>
-          </a:p>
-          <a:p>
-            <a:pPr lvl="2"/>
-            <a:r>
-              <a:rPr lang="en-US" dirty="0"/>
-              <a:t>Validation: evaluating input data and if valid, let it pass through pip unchanged,  but if not valid throw and exception</a:t>
-            </a:r>
-          </a:p>
-          <a:p>
-            <a:pPr lvl="3"/>
-            <a:endParaRPr lang="en-US" dirty="0"/>
-          </a:p>
-          <a:p>
-            <a:pPr lvl="1"/>
-            <a:endParaRPr lang="en-US" dirty="0"/>
+              <a:t>Also add a timeout for all requests (make it configurable for me)</a:t>
+            </a:r>
+            <a:endParaRPr lang="fa-IR" dirty="0"/>
           </a:p>
         </p:txBody>
       </p:sp>
@@ -9351,7 +8711,7 @@
           <p:cNvPr id="4" name="Footer Placeholder 3">
             <a:extLst>
               <a:ext uri="{FF2B5EF4-FFF2-40B4-BE49-F238E27FC236}">
-                <a16:creationId xmlns:a16="http://schemas.microsoft.com/office/drawing/2014/main" id="{DFA08650-F8A9-4C29-A413-8959B6B37F56}"/>
+                <a16:creationId xmlns:a16="http://schemas.microsoft.com/office/drawing/2014/main" id="{5974FB87-24B0-44DE-958F-FDF1FC25A12B}"/>
               </a:ext>
             </a:extLst>
           </p:cNvPr>
@@ -9380,7 +8740,7 @@
           <p:cNvPr id="5" name="Slide Number Placeholder 4">
             <a:extLst>
               <a:ext uri="{FF2B5EF4-FFF2-40B4-BE49-F238E27FC236}">
-                <a16:creationId xmlns:a16="http://schemas.microsoft.com/office/drawing/2014/main" id="{E23897FC-9889-4C0D-A929-D58523B4F0F9}"/>
+                <a16:creationId xmlns:a16="http://schemas.microsoft.com/office/drawing/2014/main" id="{EF4C0C1A-952A-433B-AE83-DFFBF202A28E}"/>
               </a:ext>
             </a:extLst>
           </p:cNvPr>
@@ -9407,7 +8767,7 @@
     </p:spTree>
     <p:extLst>
       <p:ext uri="{BB962C8B-B14F-4D97-AF65-F5344CB8AC3E}">
-        <p14:creationId xmlns:p14="http://schemas.microsoft.com/office/powerpoint/2010/main" val="4197454892"/>
+        <p14:creationId xmlns:p14="http://schemas.microsoft.com/office/powerpoint/2010/main" val="563040513"/>
       </p:ext>
     </p:extLst>
   </p:cSld>
@@ -9439,7 +8799,7 @@
           <p:cNvPr id="2" name="Title 1">
             <a:extLst>
               <a:ext uri="{FF2B5EF4-FFF2-40B4-BE49-F238E27FC236}">
-                <a16:creationId xmlns:a16="http://schemas.microsoft.com/office/drawing/2014/main" id="{776B00F1-0C6D-4A6B-A4DC-0AC687E06F33}"/>
+                <a16:creationId xmlns:a16="http://schemas.microsoft.com/office/drawing/2014/main" id="{07B1FF07-6257-454D-B62B-64C7E619F515}"/>
               </a:ext>
             </a:extLst>
           </p:cNvPr>
@@ -9457,9 +8817,13 @@
           <a:p>
             <a:r>
               <a:rPr lang="en-US" dirty="0"/>
-              <a:t>Nest the GREAT</a:t>
-            </a:r>
-            <a:endParaRPr lang="fa-IR" dirty="0"/>
+              <a:t>Talk a little about </a:t>
+            </a:r>
+            <a:r>
+              <a:rPr lang="en-US" dirty="0" err="1"/>
+              <a:t>rxjs</a:t>
+            </a:r>
+            <a:endParaRPr lang="en-US" dirty="0"/>
           </a:p>
         </p:txBody>
       </p:sp>
@@ -9468,7 +8832,7 @@
           <p:cNvPr id="3" name="Content Placeholder 2">
             <a:extLst>
               <a:ext uri="{FF2B5EF4-FFF2-40B4-BE49-F238E27FC236}">
-                <a16:creationId xmlns:a16="http://schemas.microsoft.com/office/drawing/2014/main" id="{1B5D5D2A-E14F-4B9B-9842-B6C28AD52755}"/>
+                <a16:creationId xmlns:a16="http://schemas.microsoft.com/office/drawing/2014/main" id="{53B034D5-992C-4A42-AA59-1E991BFDAB7F}"/>
               </a:ext>
             </a:extLst>
           </p:cNvPr>
@@ -9481,65 +8845,16 @@
         </p:nvSpPr>
         <p:spPr/>
         <p:txBody>
-          <a:bodyPr>
-            <a:normAutofit/>
-          </a:bodyPr>
-          <a:lstStyle/>
-          <a:p>
-            <a:pPr lvl="1"/>
+          <a:bodyPr/>
+          <a:lstStyle/>
+          <a:p>
             <a:r>
               <a:rPr lang="en-US" dirty="0"/>
-              <a:t>Guards</a:t>
-            </a:r>
-          </a:p>
-          <a:p>
-            <a:pPr lvl="2"/>
-            <a:r>
-              <a:rPr lang="en-US" dirty="0"/>
-              <a:t>Determine that a given request  meets a certain condition like authentication, authorization, role, … and if the conditions are met the request allowed to access the route.</a:t>
-            </a:r>
-          </a:p>
-          <a:p>
-            <a:pPr lvl="1"/>
-            <a:r>
-              <a:rPr lang="en-US" dirty="0"/>
-              <a:t>Interceptors</a:t>
-            </a:r>
-          </a:p>
-          <a:p>
-            <a:pPr lvl="2"/>
-            <a:r>
-              <a:rPr lang="en-US" dirty="0"/>
-              <a:t>Bind extra logic before or after method execution</a:t>
-            </a:r>
-          </a:p>
-          <a:p>
-            <a:pPr lvl="2"/>
-            <a:r>
-              <a:rPr lang="en-US" dirty="0"/>
-              <a:t>Transform the results returned from a method</a:t>
-            </a:r>
-          </a:p>
-          <a:p>
-            <a:pPr lvl="2"/>
-            <a:r>
-              <a:rPr lang="en-US" dirty="0"/>
-              <a:t>Extend basic method behavior</a:t>
-            </a:r>
-          </a:p>
-          <a:p>
-            <a:pPr lvl="2"/>
-            <a:r>
-              <a:rPr lang="en-US" dirty="0"/>
-              <a:t>Completely override a method depending on specific condition</a:t>
-            </a:r>
-          </a:p>
-          <a:p>
-            <a:pPr lvl="2"/>
-            <a:r>
-              <a:rPr lang="en-US" dirty="0"/>
-              <a:t>For example, Handling caching responses</a:t>
-            </a:r>
+              <a:t>What is observable?</a:t>
+            </a:r>
+          </a:p>
+          <a:p>
+            <a:endParaRPr lang="en-US" dirty="0"/>
           </a:p>
         </p:txBody>
       </p:sp>
@@ -9548,7 +8863,7 @@
           <p:cNvPr id="4" name="Footer Placeholder 3">
             <a:extLst>
               <a:ext uri="{FF2B5EF4-FFF2-40B4-BE49-F238E27FC236}">
-                <a16:creationId xmlns:a16="http://schemas.microsoft.com/office/drawing/2014/main" id="{DFA08650-F8A9-4C29-A413-8959B6B37F56}"/>
+                <a16:creationId xmlns:a16="http://schemas.microsoft.com/office/drawing/2014/main" id="{FBE5AAFE-1800-4D7E-9460-0DDE36BF761E}"/>
               </a:ext>
             </a:extLst>
           </p:cNvPr>
@@ -9577,7 +8892,7 @@
           <p:cNvPr id="5" name="Slide Number Placeholder 4">
             <a:extLst>
               <a:ext uri="{FF2B5EF4-FFF2-40B4-BE49-F238E27FC236}">
-                <a16:creationId xmlns:a16="http://schemas.microsoft.com/office/drawing/2014/main" id="{E23897FC-9889-4C0D-A929-D58523B4F0F9}"/>
+                <a16:creationId xmlns:a16="http://schemas.microsoft.com/office/drawing/2014/main" id="{28C7F17E-7400-4058-8710-C5C0A0D19F1E}"/>
               </a:ext>
             </a:extLst>
           </p:cNvPr>
@@ -9601,10 +8916,40 @@
           </a:p>
         </p:txBody>
       </p:sp>
+      <p:pic>
+        <p:nvPicPr>
+          <p:cNvPr id="7" name="Picture 6">
+            <a:extLst>
+              <a:ext uri="{FF2B5EF4-FFF2-40B4-BE49-F238E27FC236}">
+                <a16:creationId xmlns:a16="http://schemas.microsoft.com/office/drawing/2014/main" id="{3DCBC89F-581C-415B-BAF0-B26627516837}"/>
+              </a:ext>
+            </a:extLst>
+          </p:cNvPr>
+          <p:cNvPicPr>
+            <a:picLocks noChangeAspect="1"/>
+          </p:cNvPicPr>
+          <p:nvPr/>
+        </p:nvPicPr>
+        <p:blipFill>
+          <a:blip r:embed="rId2"/>
+          <a:stretch>
+            <a:fillRect/>
+          </a:stretch>
+        </p:blipFill>
+        <p:spPr>
+          <a:xfrm>
+            <a:off x="3158290" y="2465724"/>
+            <a:ext cx="5864772" cy="3461062"/>
+          </a:xfrm>
+          <a:prstGeom prst="rect">
+            <a:avLst/>
+          </a:prstGeom>
+        </p:spPr>
+      </p:pic>
     </p:spTree>
     <p:extLst>
       <p:ext uri="{BB962C8B-B14F-4D97-AF65-F5344CB8AC3E}">
-        <p14:creationId xmlns:p14="http://schemas.microsoft.com/office/powerpoint/2010/main" val="3864641875"/>
+        <p14:creationId xmlns:p14="http://schemas.microsoft.com/office/powerpoint/2010/main" val="2853720986"/>
       </p:ext>
     </p:extLst>
   </p:cSld>
@@ -9636,7 +8981,7 @@
           <p:cNvPr id="2" name="Title 1">
             <a:extLst>
               <a:ext uri="{FF2B5EF4-FFF2-40B4-BE49-F238E27FC236}">
-                <a16:creationId xmlns:a16="http://schemas.microsoft.com/office/drawing/2014/main" id="{37DD65AA-D480-4128-AF5A-757E96F708D0}"/>
+                <a16:creationId xmlns:a16="http://schemas.microsoft.com/office/drawing/2014/main" id="{9692E3EB-F1C1-45AE-8C84-D844E217B11B}"/>
               </a:ext>
             </a:extLst>
           </p:cNvPr>
@@ -9654,9 +8999,8 @@
           <a:p>
             <a:r>
               <a:rPr lang="en-US" dirty="0"/>
-              <a:t>Binding techniques</a:t>
-            </a:r>
-            <a:endParaRPr lang="fa-IR" dirty="0"/>
+              <a:t>Demo</a:t>
+            </a:r>
           </a:p>
         </p:txBody>
       </p:sp>
@@ -9665,7 +9009,7 @@
           <p:cNvPr id="3" name="Content Placeholder 2">
             <a:extLst>
               <a:ext uri="{FF2B5EF4-FFF2-40B4-BE49-F238E27FC236}">
-                <a16:creationId xmlns:a16="http://schemas.microsoft.com/office/drawing/2014/main" id="{00954C44-17CE-44F5-B2A2-463683B6504B}"/>
+                <a16:creationId xmlns:a16="http://schemas.microsoft.com/office/drawing/2014/main" id="{9E3A51DC-5F07-4680-A0C1-69AE4F791780}"/>
               </a:ext>
             </a:extLst>
           </p:cNvPr>
@@ -9678,16 +9022,132 @@
         </p:nvSpPr>
         <p:spPr/>
         <p:txBody>
-          <a:bodyPr/>
+          <a:bodyPr>
+            <a:normAutofit fontScale="92500" lnSpcReduction="10000"/>
+          </a:bodyPr>
           <a:lstStyle/>
           <a:p>
             <a:r>
               <a:rPr lang="en-US" dirty="0"/>
-              <a:t>You can add earlier building blocks on top of these scopes:</a:t>
-            </a:r>
-          </a:p>
-          <a:p>
-            <a:endParaRPr lang="fa-IR" dirty="0"/>
+              <a:t>Create a simple observable</a:t>
+            </a:r>
+          </a:p>
+          <a:p>
+            <a:pPr lvl="1"/>
+            <a:r>
+              <a:rPr lang="en-US" dirty="0">
+                <a:latin typeface="Consolas" panose="020B0609020204030204" pitchFamily="49" charset="0"/>
+              </a:rPr>
+              <a:t>const observable = new Observable(subscriber =&gt; {</a:t>
+            </a:r>
+          </a:p>
+          <a:p>
+            <a:pPr lvl="2"/>
+            <a:r>
+              <a:rPr lang="en-US" dirty="0" err="1">
+                <a:latin typeface="Consolas" panose="020B0609020204030204" pitchFamily="49" charset="0"/>
+              </a:rPr>
+              <a:t>subscriber.next</a:t>
+            </a:r>
+            <a:r>
+              <a:rPr lang="en-US" dirty="0">
+                <a:latin typeface="Consolas" panose="020B0609020204030204" pitchFamily="49" charset="0"/>
+              </a:rPr>
+              <a:t>(&lt;some-value&gt;);</a:t>
+            </a:r>
+          </a:p>
+          <a:p>
+            <a:pPr lvl="2"/>
+            <a:r>
+              <a:rPr lang="en-US" dirty="0" err="1">
+                <a:latin typeface="Consolas" panose="020B0609020204030204" pitchFamily="49" charset="0"/>
+              </a:rPr>
+              <a:t>subscriber.complete</a:t>
+            </a:r>
+            <a:r>
+              <a:rPr lang="en-US" dirty="0">
+                <a:latin typeface="Consolas" panose="020B0609020204030204" pitchFamily="49" charset="0"/>
+              </a:rPr>
+              <a:t>(&lt;some-value&gt;);</a:t>
+            </a:r>
+          </a:p>
+          <a:p>
+            <a:pPr lvl="1"/>
+            <a:r>
+              <a:rPr lang="en-US" dirty="0">
+                <a:latin typeface="Consolas" panose="020B0609020204030204" pitchFamily="49" charset="0"/>
+              </a:rPr>
+              <a:t>});</a:t>
+            </a:r>
+          </a:p>
+          <a:p>
+            <a:r>
+              <a:rPr lang="en-US" dirty="0"/>
+              <a:t>Subscribe to an observable:</a:t>
+            </a:r>
+          </a:p>
+          <a:p>
+            <a:pPr lvl="1"/>
+            <a:r>
+              <a:rPr lang="en-US" dirty="0" err="1">
+                <a:latin typeface="Consolas" panose="020B0609020204030204" pitchFamily="49" charset="0"/>
+              </a:rPr>
+              <a:t>observable.subscribe</a:t>
+            </a:r>
+            <a:r>
+              <a:rPr lang="en-US" dirty="0">
+                <a:latin typeface="Consolas" panose="020B0609020204030204" pitchFamily="49" charset="0"/>
+              </a:rPr>
+              <a:t>({</a:t>
+            </a:r>
+          </a:p>
+          <a:p>
+            <a:pPr lvl="1"/>
+            <a:r>
+              <a:rPr lang="en-US" dirty="0">
+                <a:latin typeface="Consolas" panose="020B0609020204030204" pitchFamily="49" charset="0"/>
+              </a:rPr>
+              <a:t>  next(x) { console.log('got value ' + x); },</a:t>
+            </a:r>
+          </a:p>
+          <a:p>
+            <a:pPr lvl="1"/>
+            <a:r>
+              <a:rPr lang="en-US" dirty="0">
+                <a:latin typeface="Consolas" panose="020B0609020204030204" pitchFamily="49" charset="0"/>
+              </a:rPr>
+              <a:t>  error(err) { </a:t>
+            </a:r>
+            <a:r>
+              <a:rPr lang="en-US" dirty="0" err="1">
+                <a:latin typeface="Consolas" panose="020B0609020204030204" pitchFamily="49" charset="0"/>
+              </a:rPr>
+              <a:t>console.error</a:t>
+            </a:r>
+            <a:r>
+              <a:rPr lang="en-US" dirty="0">
+                <a:latin typeface="Consolas" panose="020B0609020204030204" pitchFamily="49" charset="0"/>
+              </a:rPr>
+              <a:t>('something wrong occurred: ' + err); },</a:t>
+            </a:r>
+          </a:p>
+          <a:p>
+            <a:pPr lvl="1"/>
+            <a:r>
+              <a:rPr lang="en-US" dirty="0">
+                <a:latin typeface="Consolas" panose="020B0609020204030204" pitchFamily="49" charset="0"/>
+              </a:rPr>
+              <a:t>  complete() { console.log('done'); }</a:t>
+            </a:r>
+          </a:p>
+          <a:p>
+            <a:pPr lvl="1"/>
+            <a:r>
+              <a:rPr lang="en-US" dirty="0">
+                <a:latin typeface="Consolas" panose="020B0609020204030204" pitchFamily="49" charset="0"/>
+              </a:rPr>
+              <a:t>});</a:t>
+            </a:r>
           </a:p>
         </p:txBody>
       </p:sp>
@@ -9696,7 +9156,7 @@
           <p:cNvPr id="4" name="Footer Placeholder 3">
             <a:extLst>
               <a:ext uri="{FF2B5EF4-FFF2-40B4-BE49-F238E27FC236}">
-                <a16:creationId xmlns:a16="http://schemas.microsoft.com/office/drawing/2014/main" id="{C87429D9-6D9D-4782-B777-FA0E09604197}"/>
+                <a16:creationId xmlns:a16="http://schemas.microsoft.com/office/drawing/2014/main" id="{13C33A84-0D83-43AF-87B5-076FC09F7D0F}"/>
               </a:ext>
             </a:extLst>
           </p:cNvPr>
@@ -9725,7 +9185,7 @@
           <p:cNvPr id="5" name="Slide Number Placeholder 4">
             <a:extLst>
               <a:ext uri="{FF2B5EF4-FFF2-40B4-BE49-F238E27FC236}">
-                <a16:creationId xmlns:a16="http://schemas.microsoft.com/office/drawing/2014/main" id="{EEBDDF7A-0927-406C-8CF8-27CCD771A16A}"/>
+                <a16:creationId xmlns:a16="http://schemas.microsoft.com/office/drawing/2014/main" id="{0600A2F2-A3A9-4D46-8BF6-92ACAE0C9FD2}"/>
               </a:ext>
             </a:extLst>
           </p:cNvPr>
@@ -9749,40 +9209,10 @@
           </a:p>
         </p:txBody>
       </p:sp>
-      <p:pic>
-        <p:nvPicPr>
-          <p:cNvPr id="9" name="Picture 8">
-            <a:extLst>
-              <a:ext uri="{FF2B5EF4-FFF2-40B4-BE49-F238E27FC236}">
-                <a16:creationId xmlns:a16="http://schemas.microsoft.com/office/drawing/2014/main" id="{8261B029-CADE-461F-B081-17DA6A788694}"/>
-              </a:ext>
-            </a:extLst>
-          </p:cNvPr>
-          <p:cNvPicPr>
-            <a:picLocks noChangeAspect="1"/>
-          </p:cNvPicPr>
-          <p:nvPr/>
-        </p:nvPicPr>
-        <p:blipFill>
-          <a:blip r:embed="rId2"/>
-          <a:stretch>
-            <a:fillRect/>
-          </a:stretch>
-        </p:blipFill>
-        <p:spPr>
-          <a:xfrm>
-            <a:off x="1383861" y="2090585"/>
-            <a:ext cx="9413630" cy="4247178"/>
-          </a:xfrm>
-          <a:prstGeom prst="rect">
-            <a:avLst/>
-          </a:prstGeom>
-        </p:spPr>
-      </p:pic>
     </p:spTree>
     <p:extLst>
       <p:ext uri="{BB962C8B-B14F-4D97-AF65-F5344CB8AC3E}">
-        <p14:creationId xmlns:p14="http://schemas.microsoft.com/office/powerpoint/2010/main" val="4132162159"/>
+        <p14:creationId xmlns:p14="http://schemas.microsoft.com/office/powerpoint/2010/main" val="1420025263"/>
       </p:ext>
     </p:extLst>
   </p:cSld>
@@ -9814,7 +9244,7 @@
           <p:cNvPr id="2" name="Title 1">
             <a:extLst>
               <a:ext uri="{FF2B5EF4-FFF2-40B4-BE49-F238E27FC236}">
-                <a16:creationId xmlns:a16="http://schemas.microsoft.com/office/drawing/2014/main" id="{0DE5745A-4438-4D8D-9373-928AF8731BA9}"/>
+                <a16:creationId xmlns:a16="http://schemas.microsoft.com/office/drawing/2014/main" id="{B42EDEBF-E305-4D22-B4F0-09BFB7F9C79F}"/>
               </a:ext>
             </a:extLst>
           </p:cNvPr>
@@ -9832,9 +9262,8 @@
           <a:p>
             <a:r>
               <a:rPr lang="en-US" dirty="0"/>
-              <a:t>Binding techniques</a:t>
-            </a:r>
-            <a:endParaRPr lang="fa-IR" dirty="0"/>
+              <a:t>Demo</a:t>
+            </a:r>
           </a:p>
         </p:txBody>
       </p:sp>
@@ -9843,7 +9272,7 @@
           <p:cNvPr id="3" name="Content Placeholder 2">
             <a:extLst>
               <a:ext uri="{FF2B5EF4-FFF2-40B4-BE49-F238E27FC236}">
-                <a16:creationId xmlns:a16="http://schemas.microsoft.com/office/drawing/2014/main" id="{CACB630B-5C3D-4870-9A3B-0E9CF9794CBD}"/>
+                <a16:creationId xmlns:a16="http://schemas.microsoft.com/office/drawing/2014/main" id="{4D3D34F1-9DE6-4C8C-991A-8B601AA3A0C4}"/>
               </a:ext>
             </a:extLst>
           </p:cNvPr>
@@ -9857,28 +9286,116 @@
         <p:spPr/>
         <p:txBody>
           <a:bodyPr>
-            <a:normAutofit/>
+            <a:normAutofit fontScale="77500" lnSpcReduction="20000"/>
           </a:bodyPr>
           <a:lstStyle/>
           <a:p>
             <a:r>
               <a:rPr lang="en-US" dirty="0"/>
-              <a:t>Remember, each one does not override another</a:t>
-            </a:r>
-            <a:endParaRPr lang="fa-IR" dirty="0"/>
-          </a:p>
-          <a:p>
+              <a:t>Operators:</a:t>
+            </a:r>
+          </a:p>
+          <a:p>
+            <a:pPr lvl="1"/>
             <a:r>
               <a:rPr lang="en-US" dirty="0"/>
-              <a:t>For example:</a:t>
+              <a:t>Creation</a:t>
+            </a:r>
+          </a:p>
+          <a:p>
+            <a:pPr lvl="2"/>
+            <a:r>
+              <a:rPr lang="en-US" dirty="0"/>
+              <a:t>From</a:t>
+            </a:r>
+          </a:p>
+          <a:p>
+            <a:pPr lvl="2"/>
+            <a:r>
+              <a:rPr lang="en-US" dirty="0"/>
+              <a:t>throwError</a:t>
             </a:r>
           </a:p>
           <a:p>
             <a:pPr lvl="1"/>
             <a:r>
               <a:rPr lang="en-US" dirty="0"/>
-              <a:t>If you have a globally scoped pipe, it will apply as well as many other you might add on another scopes, whether: controller, methos, …</a:t>
-            </a:r>
+              <a:t>pipe</a:t>
+            </a:r>
+          </a:p>
+          <a:p>
+            <a:pPr lvl="1"/>
+            <a:r>
+              <a:rPr lang="en-US" dirty="0"/>
+              <a:t>Transformation</a:t>
+            </a:r>
+          </a:p>
+          <a:p>
+            <a:pPr lvl="2"/>
+            <a:r>
+              <a:rPr lang="en-US" dirty="0"/>
+              <a:t>map</a:t>
+            </a:r>
+          </a:p>
+          <a:p>
+            <a:pPr lvl="1"/>
+            <a:r>
+              <a:rPr lang="en-US" dirty="0"/>
+              <a:t>Utility</a:t>
+            </a:r>
+          </a:p>
+          <a:p>
+            <a:pPr lvl="2"/>
+            <a:r>
+              <a:rPr lang="en-US" dirty="0"/>
+              <a:t>tap</a:t>
+            </a:r>
+          </a:p>
+          <a:p>
+            <a:pPr lvl="2"/>
+            <a:r>
+              <a:rPr lang="en-US" dirty="0"/>
+              <a:t>timeout</a:t>
+            </a:r>
+          </a:p>
+          <a:p>
+            <a:pPr lvl="1"/>
+            <a:r>
+              <a:rPr lang="en-US" dirty="0"/>
+              <a:t>Error handling</a:t>
+            </a:r>
+          </a:p>
+          <a:p>
+            <a:pPr lvl="2"/>
+            <a:r>
+              <a:rPr lang="en-US" dirty="0"/>
+              <a:t>catchError</a:t>
+            </a:r>
+          </a:p>
+          <a:p>
+            <a:pPr lvl="2"/>
+            <a:r>
+              <a:rPr lang="en-US" dirty="0"/>
+              <a:t>retry</a:t>
+            </a:r>
+          </a:p>
+          <a:p>
+            <a:pPr lvl="1"/>
+            <a:r>
+              <a:rPr lang="en-US" dirty="0"/>
+              <a:t>And may more, take a look here: </a:t>
+            </a:r>
+            <a:r>
+              <a:rPr lang="en-US" dirty="0">
+                <a:hlinkClick r:id="rId2"/>
+              </a:rPr>
+              <a:t>https://rxjs.dev/guide/operators</a:t>
+            </a:r>
+            <a:endParaRPr lang="en-US" dirty="0"/>
+          </a:p>
+          <a:p>
+            <a:pPr lvl="1"/>
+            <a:endParaRPr lang="en-US" dirty="0"/>
           </a:p>
         </p:txBody>
       </p:sp>
@@ -9887,7 +9404,7 @@
           <p:cNvPr id="4" name="Footer Placeholder 3">
             <a:extLst>
               <a:ext uri="{FF2B5EF4-FFF2-40B4-BE49-F238E27FC236}">
-                <a16:creationId xmlns:a16="http://schemas.microsoft.com/office/drawing/2014/main" id="{49E76259-1B2D-4E26-A0A2-6EF4B8AE93D4}"/>
+                <a16:creationId xmlns:a16="http://schemas.microsoft.com/office/drawing/2014/main" id="{11EC2750-D356-4039-A15E-E89394D631B5}"/>
               </a:ext>
             </a:extLst>
           </p:cNvPr>
@@ -9916,7 +9433,7 @@
           <p:cNvPr id="5" name="Slide Number Placeholder 4">
             <a:extLst>
               <a:ext uri="{FF2B5EF4-FFF2-40B4-BE49-F238E27FC236}">
-                <a16:creationId xmlns:a16="http://schemas.microsoft.com/office/drawing/2014/main" id="{1F2E0D22-0AC1-4A20-A385-BD5AC7A9803C}"/>
+                <a16:creationId xmlns:a16="http://schemas.microsoft.com/office/drawing/2014/main" id="{C0F22363-54A7-42A3-8C89-1D470AA9E394}"/>
               </a:ext>
             </a:extLst>
           </p:cNvPr>
@@ -9943,7 +9460,7 @@
     </p:spTree>
     <p:extLst>
       <p:ext uri="{BB962C8B-B14F-4D97-AF65-F5344CB8AC3E}">
-        <p14:creationId xmlns:p14="http://schemas.microsoft.com/office/powerpoint/2010/main" val="697486791"/>
+        <p14:creationId xmlns:p14="http://schemas.microsoft.com/office/powerpoint/2010/main" val="2618573365"/>
       </p:ext>
     </p:extLst>
   </p:cSld>
@@ -9975,7 +9492,7 @@
           <p:cNvPr id="2" name="Title 1">
             <a:extLst>
               <a:ext uri="{FF2B5EF4-FFF2-40B4-BE49-F238E27FC236}">
-                <a16:creationId xmlns:a16="http://schemas.microsoft.com/office/drawing/2014/main" id="{502C2772-B0E5-46DD-9459-81180A08CAE9}"/>
+                <a16:creationId xmlns:a16="http://schemas.microsoft.com/office/drawing/2014/main" id="{59C824AA-98C6-442B-9C3E-28E49CA4BEE7}"/>
               </a:ext>
             </a:extLst>
           </p:cNvPr>
@@ -9993,7 +9510,7 @@
           <a:p>
             <a:r>
               <a:rPr lang="en-US" dirty="0"/>
-              <a:t>How to define each one?</a:t>
+              <a:t>Demo</a:t>
             </a:r>
             <a:endParaRPr lang="fa-IR" dirty="0"/>
           </a:p>
@@ -10004,7 +9521,7 @@
           <p:cNvPr id="3" name="Content Placeholder 2">
             <a:extLst>
               <a:ext uri="{FF2B5EF4-FFF2-40B4-BE49-F238E27FC236}">
-                <a16:creationId xmlns:a16="http://schemas.microsoft.com/office/drawing/2014/main" id="{207EB5A4-3E8C-4A88-9044-9C6CBF669D06}"/>
+                <a16:creationId xmlns:a16="http://schemas.microsoft.com/office/drawing/2014/main" id="{B81E832D-6009-409D-9C14-9099612DA2C1}"/>
               </a:ext>
             </a:extLst>
           </p:cNvPr>
@@ -10017,100 +9534,70 @@
         </p:nvSpPr>
         <p:spPr/>
         <p:txBody>
-          <a:bodyPr>
-            <a:normAutofit lnSpcReduction="10000"/>
-          </a:bodyPr>
+          <a:bodyPr/>
           <a:lstStyle/>
           <a:p>
             <a:r>
               <a:rPr lang="en-US" dirty="0"/>
-              <a:t>Globally scoped: </a:t>
+              <a:t>Benefits of interceptors:</a:t>
             </a:r>
           </a:p>
           <a:p>
             <a:pPr lvl="1"/>
             <a:r>
               <a:rPr lang="en-US" dirty="0"/>
-              <a:t>Inside </a:t>
-            </a:r>
-            <a:r>
-              <a:rPr lang="en-US" dirty="0" err="1"/>
-              <a:t>main.ts</a:t>
-            </a:r>
+              <a:t>Bind extra logics before or after method execution</a:t>
+            </a:r>
+          </a:p>
+          <a:p>
+            <a:pPr lvl="1"/>
             <a:r>
               <a:rPr lang="en-US" dirty="0"/>
-              <a:t> through:</a:t>
-            </a:r>
-          </a:p>
-          <a:p>
-            <a:pPr lvl="2"/>
-            <a:r>
-              <a:rPr lang="en-US" dirty="0" err="1"/>
-              <a:t>app.useGlobalPipes</a:t>
-            </a:r>
-            <a:endParaRPr lang="en-US" dirty="0"/>
-          </a:p>
-          <a:p>
-            <a:pPr lvl="2"/>
-            <a:r>
-              <a:rPr lang="en-US" dirty="0" err="1"/>
-              <a:t>app.useGlobalFilters</a:t>
-            </a:r>
-            <a:endParaRPr lang="en-US" dirty="0"/>
-          </a:p>
-          <a:p>
-            <a:pPr lvl="2"/>
-            <a:r>
-              <a:rPr lang="en-US" dirty="0" err="1"/>
-              <a:t>app.useGlobalGuards</a:t>
-            </a:r>
-            <a:endParaRPr lang="en-US" dirty="0"/>
-          </a:p>
-          <a:p>
-            <a:pPr lvl="2"/>
-            <a:r>
-              <a:rPr lang="en-US" dirty="0" err="1"/>
-              <a:t>app.useGlobalInterceptors</a:t>
-            </a:r>
-            <a:endParaRPr lang="en-US" dirty="0"/>
-          </a:p>
-          <a:p>
-            <a:pPr lvl="2"/>
+              <a:t>Transform the result returned from a method</a:t>
+            </a:r>
+          </a:p>
+          <a:p>
+            <a:pPr lvl="1"/>
             <a:r>
               <a:rPr lang="en-US" dirty="0"/>
-              <a:t>Limitation: We can’t inject dependencies in main.ts</a:t>
+              <a:t>Transform the exceptions throwed from a method</a:t>
             </a:r>
           </a:p>
           <a:p>
             <a:pPr lvl="1"/>
             <a:r>
               <a:rPr lang="en-US" dirty="0"/>
-              <a:t>Directly inside the nest Module:</a:t>
-            </a:r>
-          </a:p>
-          <a:p>
-            <a:pPr lvl="2"/>
+              <a:t>Extend basic method behavior</a:t>
+            </a:r>
+          </a:p>
+          <a:p>
+            <a:pPr lvl="1"/>
             <a:r>
               <a:rPr lang="en-US" dirty="0"/>
-              <a:t>Then DI container will handle instantiation</a:t>
-            </a:r>
-          </a:p>
-          <a:p>
-            <a:pPr lvl="2"/>
+              <a:t>Completely override a method depending on specific condition (caching)</a:t>
+            </a:r>
+          </a:p>
+          <a:p>
             <a:r>
               <a:rPr lang="en-US" dirty="0"/>
-              <a:t>Using provider tokens (exported from nest core package) inside AppModule:</a:t>
-            </a:r>
-          </a:p>
-          <a:p>
-            <a:pPr lvl="3"/>
+              <a:t>How to create interceptor</a:t>
+            </a:r>
+          </a:p>
+          <a:p>
+            <a:pPr lvl="1"/>
+            <a:r>
+              <a:rPr lang="en-US" dirty="0">
+                <a:latin typeface="Consolas" panose="020B0609020204030204" pitchFamily="49" charset="0"/>
+              </a:rPr>
+              <a:t>nest g interceptor &lt;path-to-your-class&gt;</a:t>
+            </a:r>
+          </a:p>
+          <a:p>
+            <a:pPr lvl="1"/>
             <a:r>
               <a:rPr lang="en-US" dirty="0"/>
-              <a:t>APP_PIPE, APP_GUARD, APP_FILTER, APP_INTERCEPTOR</a:t>
-            </a:r>
-            <a:endParaRPr lang="fa-IR" dirty="0"/>
-          </a:p>
-          <a:p>
+              <a:t>You should implement intercept method</a:t>
+            </a:r>
             <a:endParaRPr lang="fa-IR" dirty="0"/>
           </a:p>
         </p:txBody>
@@ -10120,7 +9607,7 @@
           <p:cNvPr id="4" name="Footer Placeholder 3">
             <a:extLst>
               <a:ext uri="{FF2B5EF4-FFF2-40B4-BE49-F238E27FC236}">
-                <a16:creationId xmlns:a16="http://schemas.microsoft.com/office/drawing/2014/main" id="{A3FE4519-DC8B-45BA-A990-99A79CF2F563}"/>
+                <a16:creationId xmlns:a16="http://schemas.microsoft.com/office/drawing/2014/main" id="{62300816-4443-4FD8-9DD2-6E984A3975EC}"/>
               </a:ext>
             </a:extLst>
           </p:cNvPr>
@@ -10149,7 +9636,7 @@
           <p:cNvPr id="5" name="Slide Number Placeholder 4">
             <a:extLst>
               <a:ext uri="{FF2B5EF4-FFF2-40B4-BE49-F238E27FC236}">
-                <a16:creationId xmlns:a16="http://schemas.microsoft.com/office/drawing/2014/main" id="{1608D28C-56C2-45C5-81AC-DA276D4974D8}"/>
+                <a16:creationId xmlns:a16="http://schemas.microsoft.com/office/drawing/2014/main" id="{BC18DAB2-4064-40E9-A516-F486A96161D7}"/>
               </a:ext>
             </a:extLst>
           </p:cNvPr>
@@ -10176,7 +9663,7 @@
     </p:spTree>
     <p:extLst>
       <p:ext uri="{BB962C8B-B14F-4D97-AF65-F5344CB8AC3E}">
-        <p14:creationId xmlns:p14="http://schemas.microsoft.com/office/powerpoint/2010/main" val="1235601339"/>
+        <p14:creationId xmlns:p14="http://schemas.microsoft.com/office/powerpoint/2010/main" val="27077479"/>
       </p:ext>
     </p:extLst>
   </p:cSld>
@@ -10208,7 +9695,7 @@
           <p:cNvPr id="2" name="Title 1">
             <a:extLst>
               <a:ext uri="{FF2B5EF4-FFF2-40B4-BE49-F238E27FC236}">
-                <a16:creationId xmlns:a16="http://schemas.microsoft.com/office/drawing/2014/main" id="{3B2ADBB1-A7A9-4F19-B3AA-5195BB35D075}"/>
+                <a16:creationId xmlns:a16="http://schemas.microsoft.com/office/drawing/2014/main" id="{A4699B38-1E23-4F16-B1D7-0BAC0CE16C47}"/>
               </a:ext>
             </a:extLst>
           </p:cNvPr>
@@ -10226,7 +9713,7 @@
           <a:p>
             <a:r>
               <a:rPr lang="en-US" dirty="0"/>
-              <a:t>How to define each one?</a:t>
+              <a:t>Demo</a:t>
             </a:r>
             <a:endParaRPr lang="fa-IR" dirty="0"/>
           </a:p>
@@ -10237,7 +9724,7 @@
           <p:cNvPr id="3" name="Content Placeholder 2">
             <a:extLst>
               <a:ext uri="{FF2B5EF4-FFF2-40B4-BE49-F238E27FC236}">
-                <a16:creationId xmlns:a16="http://schemas.microsoft.com/office/drawing/2014/main" id="{74EB8E73-09CA-46F2-85B6-2E6EF5F501F3}"/>
+                <a16:creationId xmlns:a16="http://schemas.microsoft.com/office/drawing/2014/main" id="{A4CA9403-858C-4BBF-8F6F-55C8634DF6AF}"/>
               </a:ext>
             </a:extLst>
           </p:cNvPr>
@@ -10255,58 +9742,58 @@
           <a:p>
             <a:r>
               <a:rPr lang="en-US" dirty="0"/>
-              <a:t>Controller scoped:</a:t>
+              <a:t>We say that we can access before and after request, where are them?</a:t>
             </a:r>
           </a:p>
           <a:p>
             <a:pPr lvl="1"/>
             <a:r>
               <a:rPr lang="en-US" dirty="0"/>
-              <a:t>Using decorator for controller, they accepts single class, or comma separated list of classes:</a:t>
-            </a:r>
-          </a:p>
-          <a:p>
-            <a:pPr lvl="2"/>
+              <a:t>Before: previous to return</a:t>
+            </a:r>
+          </a:p>
+          <a:p>
+            <a:pPr lvl="1"/>
             <a:r>
               <a:rPr lang="en-US" dirty="0"/>
-              <a:t>@UsePipes, @UseGuards, @UseInterceptors, @UseFilters</a:t>
-            </a:r>
-          </a:p>
-          <a:p>
+              <a:t>After: You can pipe to the observable returned from the </a:t>
+            </a:r>
+            <a:r>
+              <a:rPr lang="en-US" dirty="0" err="1">
+                <a:latin typeface="Consolas" panose="020B0609020204030204" pitchFamily="49" charset="0"/>
+              </a:rPr>
+              <a:t>nest.handle</a:t>
+            </a:r>
+            <a:r>
+              <a:rPr lang="en-US" dirty="0">
+                <a:latin typeface="Consolas" panose="020B0609020204030204" pitchFamily="49" charset="0"/>
+              </a:rPr>
+              <a:t>() </a:t>
+            </a:r>
             <a:r>
               <a:rPr lang="en-US" dirty="0"/>
-              <a:t>Method scoped:</a:t>
+              <a:t>function</a:t>
+            </a:r>
+          </a:p>
+          <a:p>
+            <a:r>
+              <a:rPr lang="en-US" dirty="0"/>
+              <a:t>How to add multiple interceptor</a:t>
             </a:r>
           </a:p>
           <a:p>
             <a:pPr lvl="1"/>
             <a:r>
               <a:rPr lang="en-US" dirty="0"/>
-              <a:t>Use previous decorators for your controller methods</a:t>
-            </a:r>
-          </a:p>
-          <a:p>
-            <a:r>
-              <a:rPr lang="en-US" dirty="0"/>
-              <a:t>Param scoped:</a:t>
-            </a:r>
-          </a:p>
-          <a:p>
-            <a:pPr lvl="1"/>
-            <a:r>
-              <a:rPr lang="en-US" dirty="0"/>
-              <a:t>One specific parameter:</a:t>
-            </a:r>
-          </a:p>
-          <a:p>
-            <a:pPr lvl="2"/>
-            <a:r>
-              <a:rPr lang="en-US" dirty="0"/>
-              <a:t>Pass the class to the Body </a:t>
-            </a:r>
-          </a:p>
-          <a:p>
-            <a:endParaRPr lang="en-US" dirty="0"/>
+              <a:t>Arrays are your friend man </a:t>
+            </a:r>
+            <a:r>
+              <a:rPr lang="en-US" dirty="0">
+                <a:sym typeface="Wingdings" panose="05000000000000000000" pitchFamily="2" charset="2"/>
+              </a:rPr>
+              <a:t></a:t>
+            </a:r>
+            <a:endParaRPr lang="fa-IR" dirty="0"/>
           </a:p>
         </p:txBody>
       </p:sp>
@@ -10315,7 +9802,7 @@
           <p:cNvPr id="4" name="Footer Placeholder 3">
             <a:extLst>
               <a:ext uri="{FF2B5EF4-FFF2-40B4-BE49-F238E27FC236}">
-                <a16:creationId xmlns:a16="http://schemas.microsoft.com/office/drawing/2014/main" id="{33D4E14F-FD75-43AE-88DE-7E2C000F6FDB}"/>
+                <a16:creationId xmlns:a16="http://schemas.microsoft.com/office/drawing/2014/main" id="{3559274D-2BB2-42F2-AAB6-2B589491BB8A}"/>
               </a:ext>
             </a:extLst>
           </p:cNvPr>
@@ -10344,7 +9831,7 @@
           <p:cNvPr id="5" name="Slide Number Placeholder 4">
             <a:extLst>
               <a:ext uri="{FF2B5EF4-FFF2-40B4-BE49-F238E27FC236}">
-                <a16:creationId xmlns:a16="http://schemas.microsoft.com/office/drawing/2014/main" id="{035AB048-7E88-46B1-AE2F-339278209EE2}"/>
+                <a16:creationId xmlns:a16="http://schemas.microsoft.com/office/drawing/2014/main" id="{6114D192-0D90-4A43-BBC7-34131FFA1DA0}"/>
               </a:ext>
             </a:extLst>
           </p:cNvPr>
@@ -10371,7 +9858,7 @@
     </p:spTree>
     <p:extLst>
       <p:ext uri="{BB962C8B-B14F-4D97-AF65-F5344CB8AC3E}">
-        <p14:creationId xmlns:p14="http://schemas.microsoft.com/office/powerpoint/2010/main" val="3116574206"/>
+        <p14:creationId xmlns:p14="http://schemas.microsoft.com/office/powerpoint/2010/main" val="2196419277"/>
       </p:ext>
     </p:extLst>
   </p:cSld>
@@ -10403,7 +9890,7 @@
           <p:cNvPr id="2" name="Title 1">
             <a:extLst>
               <a:ext uri="{FF2B5EF4-FFF2-40B4-BE49-F238E27FC236}">
-                <a16:creationId xmlns:a16="http://schemas.microsoft.com/office/drawing/2014/main" id="{AF601AB9-C2B5-4999-A30D-6F807C234B6F}"/>
+                <a16:creationId xmlns:a16="http://schemas.microsoft.com/office/drawing/2014/main" id="{6C7E4EDB-3C99-4561-91BE-45B0D2795F43}"/>
               </a:ext>
             </a:extLst>
           </p:cNvPr>
@@ -10432,7 +9919,7 @@
           <p:cNvPr id="3" name="Content Placeholder 2">
             <a:extLst>
               <a:ext uri="{FF2B5EF4-FFF2-40B4-BE49-F238E27FC236}">
-                <a16:creationId xmlns:a16="http://schemas.microsoft.com/office/drawing/2014/main" id="{7972917B-6DD9-485E-AC27-0905194F6C05}"/>
+                <a16:creationId xmlns:a16="http://schemas.microsoft.com/office/drawing/2014/main" id="{2CAA97B9-4E26-4EE7-91E8-19797D51254B}"/>
               </a:ext>
             </a:extLst>
           </p:cNvPr>
@@ -10450,8 +9937,17 @@
           <a:p>
             <a:r>
               <a:rPr lang="en-US" dirty="0"/>
-              <a:t>Log every exception in database and return inserted id</a:t>
-            </a:r>
+              <a:t>User can create schedule notify for a specific price in a category and we will inform him/her whenever a better price is ready</a:t>
+            </a:r>
+          </a:p>
+          <a:p>
+            <a:pPr lvl="1"/>
+            <a:r>
+              <a:rPr lang="en-US" dirty="0"/>
+              <a:t>We have to ensure that user don’t pass incorrect price, so Remove all commas from prices and then pass it to the service</a:t>
+            </a:r>
+          </a:p>
+          <a:p>
             <a:endParaRPr lang="fa-IR" dirty="0"/>
           </a:p>
         </p:txBody>
@@ -10461,7 +9957,7 @@
           <p:cNvPr id="4" name="Footer Placeholder 3">
             <a:extLst>
               <a:ext uri="{FF2B5EF4-FFF2-40B4-BE49-F238E27FC236}">
-                <a16:creationId xmlns:a16="http://schemas.microsoft.com/office/drawing/2014/main" id="{A518ED81-8C59-4B9C-9095-38C58D26B104}"/>
+                <a16:creationId xmlns:a16="http://schemas.microsoft.com/office/drawing/2014/main" id="{F498F1CF-EB07-4297-B572-0470C43F0934}"/>
               </a:ext>
             </a:extLst>
           </p:cNvPr>
@@ -10490,7 +9986,7 @@
           <p:cNvPr id="5" name="Slide Number Placeholder 4">
             <a:extLst>
               <a:ext uri="{FF2B5EF4-FFF2-40B4-BE49-F238E27FC236}">
-                <a16:creationId xmlns:a16="http://schemas.microsoft.com/office/drawing/2014/main" id="{876391CD-8B4D-4AEE-B5BE-A63F69BF8CC7}"/>
+                <a16:creationId xmlns:a16="http://schemas.microsoft.com/office/drawing/2014/main" id="{1DB97C80-30A3-4CBF-9406-B4BB57347374}"/>
               </a:ext>
             </a:extLst>
           </p:cNvPr>
@@ -10517,7 +10013,7 @@
     </p:spTree>
     <p:extLst>
       <p:ext uri="{BB962C8B-B14F-4D97-AF65-F5344CB8AC3E}">
-        <p14:creationId xmlns:p14="http://schemas.microsoft.com/office/powerpoint/2010/main" val="3485935232"/>
+        <p14:creationId xmlns:p14="http://schemas.microsoft.com/office/powerpoint/2010/main" val="3285941705"/>
       </p:ext>
     </p:extLst>
   </p:cSld>

</xml_diff>

<commit_message>
feat: 🎸 update session07 nest.js class codes and add 08
</commit_message>
<xml_diff>
--- a/nestjs/nestjs-07.pptx
+++ b/nestjs/nestjs-07.pptx
@@ -5,7 +5,7 @@
     <p:sldMasterId id="2147483705" r:id="rId1"/>
   </p:sldMasterIdLst>
   <p:notesMasterIdLst>
-    <p:notesMasterId r:id="rId19"/>
+    <p:notesMasterId r:id="rId16"/>
   </p:notesMasterIdLst>
   <p:sldIdLst>
     <p:sldId id="259" r:id="rId2"/>
@@ -20,11 +20,8 @@
     <p:sldId id="344" r:id="rId11"/>
     <p:sldId id="337" r:id="rId12"/>
     <p:sldId id="338" r:id="rId13"/>
-    <p:sldId id="339" r:id="rId14"/>
-    <p:sldId id="345" r:id="rId15"/>
-    <p:sldId id="346" r:id="rId16"/>
-    <p:sldId id="340" r:id="rId17"/>
-    <p:sldId id="320" r:id="rId18"/>
+    <p:sldId id="340" r:id="rId14"/>
+    <p:sldId id="320" r:id="rId15"/>
   </p:sldIdLst>
   <p:sldSz cx="12192000" cy="6858000"/>
   <p:notesSz cx="6858000" cy="9144000"/>
@@ -213,7 +210,7 @@
           <a:p>
             <a:fld id="{9B9ECB28-6A22-4037-9487-F3F739F744D6}" type="datetimeFigureOut">
               <a:rPr lang="en-US" smtClean="0"/>
-              <a:t>1/30/2022</a:t>
+              <a:t>1/31/2022</a:t>
             </a:fld>
             <a:endParaRPr lang="en-US"/>
           </a:p>
@@ -551,7 +548,7 @@
           <a:p>
             <a:fld id="{0FE84E6F-3671-472C-BE6F-A37BC298F4AB}" type="slidenum">
               <a:rPr lang="en-US" smtClean="0"/>
-              <a:t>16</a:t>
+              <a:t>13</a:t>
             </a:fld>
             <a:endParaRPr lang="en-US"/>
           </a:p>
@@ -694,7 +691,7 @@
           <a:p>
             <a:fld id="{0FE84E6F-3671-472C-BE6F-A37BC298F4AB}" type="slidenum">
               <a:rPr lang="en-US" smtClean="0"/>
-              <a:t>17</a:t>
+              <a:t>14</a:t>
             </a:fld>
             <a:endParaRPr lang="en-US"/>
           </a:p>
@@ -897,7 +894,7 @@
           <a:p>
             <a:fld id="{19B6F524-99F3-4BEA-ACD7-976EF4D36657}" type="datetime1">
               <a:rPr lang="en-US" smtClean="0"/>
-              <a:t>1/30/2022</a:t>
+              <a:t>1/31/2022</a:t>
             </a:fld>
             <a:endParaRPr lang="en-US" dirty="0"/>
           </a:p>
@@ -1206,7 +1203,7 @@
           <a:p>
             <a:fld id="{2145C3A9-05D9-428D-9788-A7F14838F6F9}" type="datetime1">
               <a:rPr lang="en-US" smtClean="0"/>
-              <a:t>1/30/2022</a:t>
+              <a:t>1/31/2022</a:t>
             </a:fld>
             <a:endParaRPr lang="en-US" dirty="0"/>
           </a:p>
@@ -1404,7 +1401,7 @@
           <a:p>
             <a:fld id="{82C701FB-B03E-4981-A9F8-99B474DD173A}" type="datetime1">
               <a:rPr lang="en-US" smtClean="0"/>
-              <a:t>1/30/2022</a:t>
+              <a:t>1/31/2022</a:t>
             </a:fld>
             <a:endParaRPr lang="en-US" dirty="0"/>
           </a:p>
@@ -1671,7 +1668,7 @@
           <a:p>
             <a:fld id="{7A7E8EF3-CBF7-4EB9-B6E5-3754574E3433}" type="datetime1">
               <a:rPr lang="en-US" smtClean="0"/>
-              <a:t>1/30/2022</a:t>
+              <a:t>1/31/2022</a:t>
             </a:fld>
             <a:endParaRPr lang="en-US" dirty="0"/>
           </a:p>
@@ -2111,7 +2108,7 @@
           <a:p>
             <a:fld id="{DA8A4A96-31AC-487C-9F15-1822D58542B7}" type="datetime1">
               <a:rPr lang="en-US" smtClean="0"/>
-              <a:t>1/30/2022</a:t>
+              <a:t>1/31/2022</a:t>
             </a:fld>
             <a:endParaRPr lang="en-US" dirty="0"/>
           </a:p>
@@ -2652,7 +2649,7 @@
           <a:p>
             <a:fld id="{FBBF9546-09C4-4F24-A284-5B81FF8659B4}" type="datetime1">
               <a:rPr lang="en-US" smtClean="0"/>
-              <a:t>1/30/2022</a:t>
+              <a:t>1/31/2022</a:t>
             </a:fld>
             <a:endParaRPr lang="en-US" dirty="0"/>
           </a:p>
@@ -3538,7 +3535,7 @@
           <a:p>
             <a:fld id="{5BF4405D-15A5-450B-B053-484859B9C8F7}" type="datetime1">
               <a:rPr lang="en-US" smtClean="0"/>
-              <a:t>1/30/2022</a:t>
+              <a:t>1/31/2022</a:t>
             </a:fld>
             <a:endParaRPr lang="en-US" dirty="0"/>
           </a:p>
@@ -3712,7 +3709,7 @@
           <a:p>
             <a:fld id="{E0366559-EC21-40C1-8A65-9A3B4EA78391}" type="datetime1">
               <a:rPr lang="en-US" smtClean="0"/>
-              <a:t>1/30/2022</a:t>
+              <a:t>1/31/2022</a:t>
             </a:fld>
             <a:endParaRPr lang="en-US" dirty="0"/>
           </a:p>
@@ -3900,7 +3897,7 @@
           <a:p>
             <a:fld id="{4F09CA92-695C-4FFA-8E37-4D2C288BCC04}" type="datetime1">
               <a:rPr lang="en-US" smtClean="0"/>
-              <a:t>1/30/2022</a:t>
+              <a:t>1/31/2022</a:t>
             </a:fld>
             <a:endParaRPr lang="en-US" dirty="0"/>
           </a:p>
@@ -4074,7 +4071,7 @@
           <a:p>
             <a:fld id="{CA551262-FC07-4FE4-9221-F72F7D4F209A}" type="datetime1">
               <a:rPr lang="en-US" smtClean="0"/>
-              <a:t>1/30/2022</a:t>
+              <a:t>1/31/2022</a:t>
             </a:fld>
             <a:endParaRPr lang="en-US" dirty="0"/>
           </a:p>
@@ -4322,7 +4319,7 @@
           <a:p>
             <a:fld id="{46A321E4-8899-4F7D-BEB1-BD52626ABD8D}" type="datetime1">
               <a:rPr lang="en-US" smtClean="0"/>
-              <a:t>1/30/2022</a:t>
+              <a:t>1/31/2022</a:t>
             </a:fld>
             <a:endParaRPr lang="en-US" dirty="0"/>
           </a:p>
@@ -4568,7 +4565,7 @@
           <a:p>
             <a:fld id="{B53F6DFA-8A0E-4513-867D-18B9AA66B23C}" type="datetime1">
               <a:rPr lang="en-US" smtClean="0"/>
-              <a:t>1/30/2022</a:t>
+              <a:t>1/31/2022</a:t>
             </a:fld>
             <a:endParaRPr lang="en-US" dirty="0"/>
           </a:p>
@@ -5055,7 +5052,7 @@
           <a:p>
             <a:fld id="{154283A7-B9AC-454B-A468-44B75A398B49}" type="datetime1">
               <a:rPr lang="en-US" smtClean="0"/>
-              <a:t>1/30/2022</a:t>
+              <a:t>1/31/2022</a:t>
             </a:fld>
             <a:endParaRPr lang="en-US" dirty="0"/>
           </a:p>
@@ -5177,7 +5174,7 @@
           <a:p>
             <a:fld id="{A3F8184D-DEDD-48A0-9ACA-5F6ED9EFE5B8}" type="datetime1">
               <a:rPr lang="en-US" smtClean="0"/>
-              <a:t>1/30/2022</a:t>
+              <a:t>1/31/2022</a:t>
             </a:fld>
             <a:endParaRPr lang="en-US" dirty="0"/>
           </a:p>
@@ -5276,7 +5273,7 @@
           <a:p>
             <a:fld id="{BF38AC0E-F520-48F3-BA14-8BAB82D735FB}" type="datetime1">
               <a:rPr lang="en-US" smtClean="0"/>
-              <a:t>1/30/2022</a:t>
+              <a:t>1/31/2022</a:t>
             </a:fld>
             <a:endParaRPr lang="en-US" dirty="0"/>
           </a:p>
@@ -5535,7 +5532,7 @@
           <a:p>
             <a:fld id="{317D0F2A-2724-4AD4-BF4C-A7B1910D9412}" type="datetime1">
               <a:rPr lang="en-US" smtClean="0"/>
-              <a:t>1/30/2022</a:t>
+              <a:t>1/31/2022</a:t>
             </a:fld>
             <a:endParaRPr lang="en-US" dirty="0"/>
           </a:p>
@@ -5846,7 +5843,7 @@
           <a:p>
             <a:fld id="{9A0B82A5-4A21-4F82-91DB-989CE997E82E}" type="datetime1">
               <a:rPr lang="en-US" smtClean="0"/>
-              <a:t>1/30/2022</a:t>
+              <a:t>1/31/2022</a:t>
             </a:fld>
             <a:endParaRPr lang="en-US" dirty="0"/>
           </a:p>
@@ -6083,7 +6080,7 @@
           <a:p>
             <a:fld id="{01BFEF8A-AE08-4951-B923-589F814B0C31}" type="datetime1">
               <a:rPr lang="en-US" smtClean="0"/>
-              <a:t>1/30/2022</a:t>
+              <a:t>1/31/2022</a:t>
             </a:fld>
             <a:endParaRPr lang="en-US" dirty="0"/>
           </a:p>
@@ -6900,8 +6897,12 @@
           </a:p>
           <a:p>
             <a:r>
+              <a:rPr lang="en-US" sz="2800"/>
+              <a:t>07 </a:t>
+            </a:r>
+            <a:r>
               <a:rPr lang="en-US" sz="2800" dirty="0"/>
-              <a:t>06 – Other building blocks</a:t>
+              <a:t>– Other building blocks</a:t>
             </a:r>
           </a:p>
         </p:txBody>
@@ -7493,581 +7494,6 @@
           <p:cNvPr id="2" name="Title 1">
             <a:extLst>
               <a:ext uri="{FF2B5EF4-FFF2-40B4-BE49-F238E27FC236}">
-                <a16:creationId xmlns:a16="http://schemas.microsoft.com/office/drawing/2014/main" id="{80F762D4-A843-463B-82DD-D9EDE7DB59FF}"/>
-              </a:ext>
-            </a:extLst>
-          </p:cNvPr>
-          <p:cNvSpPr>
-            <a:spLocks noGrp="1"/>
-          </p:cNvSpPr>
-          <p:nvPr>
-            <p:ph type="title"/>
-          </p:nvPr>
-        </p:nvSpPr>
-        <p:spPr/>
-        <p:txBody>
-          <a:bodyPr/>
-          <a:lstStyle/>
-          <a:p>
-            <a:r>
-              <a:rPr lang="en-US" dirty="0"/>
-              <a:t>New requirement</a:t>
-            </a:r>
-          </a:p>
-        </p:txBody>
-      </p:sp>
-      <p:sp>
-        <p:nvSpPr>
-          <p:cNvPr id="3" name="Content Placeholder 2">
-            <a:extLst>
-              <a:ext uri="{FF2B5EF4-FFF2-40B4-BE49-F238E27FC236}">
-                <a16:creationId xmlns:a16="http://schemas.microsoft.com/office/drawing/2014/main" id="{BFF78A40-5448-4212-BD70-5E8C0095277D}"/>
-              </a:ext>
-            </a:extLst>
-          </p:cNvPr>
-          <p:cNvSpPr>
-            <a:spLocks noGrp="1"/>
-          </p:cNvSpPr>
-          <p:nvPr>
-            <p:ph idx="1"/>
-          </p:nvPr>
-        </p:nvSpPr>
-        <p:spPr/>
-        <p:txBody>
-          <a:bodyPr/>
-          <a:lstStyle/>
-          <a:p>
-            <a:r>
-              <a:rPr lang="en-US" dirty="0"/>
-              <a:t>Dev:</a:t>
-            </a:r>
-          </a:p>
-          <a:p>
-            <a:pPr lvl="1"/>
-            <a:r>
-              <a:rPr lang="en-US" dirty="0"/>
-              <a:t>Log every request duration, we want this to measure our performance </a:t>
-            </a:r>
-            <a:r>
-              <a:rPr lang="en-US" dirty="0">
-                <a:sym typeface="Wingdings" panose="05000000000000000000" pitchFamily="2" charset="2"/>
-              </a:rPr>
-              <a:t></a:t>
-            </a:r>
-            <a:endParaRPr lang="en-US" dirty="0"/>
-          </a:p>
-          <a:p>
-            <a:pPr lvl="1"/>
-            <a:endParaRPr lang="en-US" dirty="0"/>
-          </a:p>
-        </p:txBody>
-      </p:sp>
-      <p:sp>
-        <p:nvSpPr>
-          <p:cNvPr id="4" name="Footer Placeholder 3">
-            <a:extLst>
-              <a:ext uri="{FF2B5EF4-FFF2-40B4-BE49-F238E27FC236}">
-                <a16:creationId xmlns:a16="http://schemas.microsoft.com/office/drawing/2014/main" id="{098447D3-F92B-4607-A138-6F9DA6B4A32F}"/>
-              </a:ext>
-            </a:extLst>
-          </p:cNvPr>
-          <p:cNvSpPr>
-            <a:spLocks noGrp="1"/>
-          </p:cNvSpPr>
-          <p:nvPr>
-            <p:ph type="ftr" sz="quarter" idx="11"/>
-          </p:nvPr>
-        </p:nvSpPr>
-        <p:spPr/>
-        <p:txBody>
-          <a:bodyPr/>
-          <a:lstStyle/>
-          <a:p>
-            <a:r>
-              <a:rPr lang="en-US"/>
-              <a:t>Nodejs Basics</a:t>
-            </a:r>
-            <a:endParaRPr lang="en-US" dirty="0"/>
-          </a:p>
-        </p:txBody>
-      </p:sp>
-      <p:sp>
-        <p:nvSpPr>
-          <p:cNvPr id="5" name="Slide Number Placeholder 4">
-            <a:extLst>
-              <a:ext uri="{FF2B5EF4-FFF2-40B4-BE49-F238E27FC236}">
-                <a16:creationId xmlns:a16="http://schemas.microsoft.com/office/drawing/2014/main" id="{6C8FCFB8-044D-4395-9869-7485523DF77B}"/>
-              </a:ext>
-            </a:extLst>
-          </p:cNvPr>
-          <p:cNvSpPr>
-            <a:spLocks noGrp="1"/>
-          </p:cNvSpPr>
-          <p:nvPr>
-            <p:ph type="sldNum" sz="quarter" idx="12"/>
-          </p:nvPr>
-        </p:nvSpPr>
-        <p:spPr/>
-        <p:txBody>
-          <a:bodyPr/>
-          <a:lstStyle/>
-          <a:p>
-            <a:fld id="{3A98EE3D-8CD1-4C3F-BD1C-C98C9596463C}" type="slidenum">
-              <a:rPr lang="en-US" smtClean="0"/>
-              <a:t>13</a:t>
-            </a:fld>
-            <a:endParaRPr lang="en-US" dirty="0"/>
-          </a:p>
-        </p:txBody>
-      </p:sp>
-    </p:spTree>
-    <p:extLst>
-      <p:ext uri="{BB962C8B-B14F-4D97-AF65-F5344CB8AC3E}">
-        <p14:creationId xmlns:p14="http://schemas.microsoft.com/office/powerpoint/2010/main" val="2545455785"/>
-      </p:ext>
-    </p:extLst>
-  </p:cSld>
-  <p:clrMapOvr>
-    <a:masterClrMapping/>
-  </p:clrMapOvr>
-</p:sld>
-</file>
-
-<file path=ppt/slides/slide14.xml><?xml version="1.0" encoding="utf-8"?>
-<p:sld xmlns:a="http://schemas.openxmlformats.org/drawingml/2006/main" xmlns:r="http://schemas.openxmlformats.org/officeDocument/2006/relationships" xmlns:p="http://schemas.openxmlformats.org/presentationml/2006/main">
-  <p:cSld>
-    <p:spTree>
-      <p:nvGrpSpPr>
-        <p:cNvPr id="1" name=""/>
-        <p:cNvGrpSpPr/>
-        <p:nvPr/>
-      </p:nvGrpSpPr>
-      <p:grpSpPr>
-        <a:xfrm>
-          <a:off x="0" y="0"/>
-          <a:ext cx="0" cy="0"/>
-          <a:chOff x="0" y="0"/>
-          <a:chExt cx="0" cy="0"/>
-        </a:xfrm>
-      </p:grpSpPr>
-      <p:sp>
-        <p:nvSpPr>
-          <p:cNvPr id="2" name="Title 1">
-            <a:extLst>
-              <a:ext uri="{FF2B5EF4-FFF2-40B4-BE49-F238E27FC236}">
-                <a16:creationId xmlns:a16="http://schemas.microsoft.com/office/drawing/2014/main" id="{7C98B97C-3663-43CD-874E-2BB4CE1C8897}"/>
-              </a:ext>
-            </a:extLst>
-          </p:cNvPr>
-          <p:cNvSpPr>
-            <a:spLocks noGrp="1"/>
-          </p:cNvSpPr>
-          <p:nvPr>
-            <p:ph type="title"/>
-          </p:nvPr>
-        </p:nvSpPr>
-        <p:spPr/>
-        <p:txBody>
-          <a:bodyPr/>
-          <a:lstStyle/>
-          <a:p>
-            <a:r>
-              <a:rPr lang="en-US" dirty="0"/>
-              <a:t>Demo</a:t>
-            </a:r>
-          </a:p>
-        </p:txBody>
-      </p:sp>
-      <p:sp>
-        <p:nvSpPr>
-          <p:cNvPr id="3" name="Content Placeholder 2">
-            <a:extLst>
-              <a:ext uri="{FF2B5EF4-FFF2-40B4-BE49-F238E27FC236}">
-                <a16:creationId xmlns:a16="http://schemas.microsoft.com/office/drawing/2014/main" id="{3B721B17-E87C-4130-9BC5-89CE3661FC1D}"/>
-              </a:ext>
-            </a:extLst>
-          </p:cNvPr>
-          <p:cNvSpPr>
-            <a:spLocks noGrp="1"/>
-          </p:cNvSpPr>
-          <p:nvPr>
-            <p:ph idx="1"/>
-          </p:nvPr>
-        </p:nvSpPr>
-        <p:spPr/>
-        <p:txBody>
-          <a:bodyPr/>
-          <a:lstStyle/>
-          <a:p>
-            <a:r>
-              <a:rPr lang="en-US" dirty="0"/>
-              <a:t>Middleware:</a:t>
-            </a:r>
-          </a:p>
-          <a:p>
-            <a:pPr lvl="1"/>
-            <a:r>
-              <a:rPr lang="en-US" dirty="0"/>
-              <a:t>They have access to req and res objects</a:t>
-            </a:r>
-          </a:p>
-          <a:p>
-            <a:pPr lvl="1"/>
-            <a:r>
-              <a:rPr lang="en-US" dirty="0"/>
-              <a:t>Benefits:</a:t>
-            </a:r>
-          </a:p>
-          <a:p>
-            <a:pPr lvl="2"/>
-            <a:r>
-              <a:rPr lang="en-US" dirty="0"/>
-              <a:t>Making changes to req, res</a:t>
-            </a:r>
-          </a:p>
-          <a:p>
-            <a:pPr lvl="2"/>
-            <a:r>
-              <a:rPr lang="en-US" dirty="0"/>
-              <a:t>Ending req, res cycle</a:t>
-            </a:r>
-          </a:p>
-          <a:p>
-            <a:pPr lvl="2"/>
-            <a:r>
-              <a:rPr lang="en-US" dirty="0"/>
-              <a:t>You have to call next method</a:t>
-            </a:r>
-          </a:p>
-          <a:p>
-            <a:pPr lvl="1"/>
-            <a:r>
-              <a:rPr lang="en-US" dirty="0"/>
-              <a:t>How to create them:</a:t>
-            </a:r>
-          </a:p>
-          <a:p>
-            <a:pPr lvl="2"/>
-            <a:r>
-              <a:rPr lang="en-US" dirty="0"/>
-              <a:t>nest g middleware &lt;path-to-your-class&gt;</a:t>
-            </a:r>
-          </a:p>
-          <a:p>
-            <a:pPr lvl="1"/>
-            <a:r>
-              <a:rPr lang="en-US" dirty="0"/>
-              <a:t>Function Middlewares are stateless, buy class Middlewares is able to have state</a:t>
-            </a:r>
-          </a:p>
-        </p:txBody>
-      </p:sp>
-      <p:sp>
-        <p:nvSpPr>
-          <p:cNvPr id="4" name="Footer Placeholder 3">
-            <a:extLst>
-              <a:ext uri="{FF2B5EF4-FFF2-40B4-BE49-F238E27FC236}">
-                <a16:creationId xmlns:a16="http://schemas.microsoft.com/office/drawing/2014/main" id="{F1D396F6-5965-4C34-969D-4E0AAC94EBE2}"/>
-              </a:ext>
-            </a:extLst>
-          </p:cNvPr>
-          <p:cNvSpPr>
-            <a:spLocks noGrp="1"/>
-          </p:cNvSpPr>
-          <p:nvPr>
-            <p:ph type="ftr" sz="quarter" idx="11"/>
-          </p:nvPr>
-        </p:nvSpPr>
-        <p:spPr/>
-        <p:txBody>
-          <a:bodyPr/>
-          <a:lstStyle/>
-          <a:p>
-            <a:r>
-              <a:rPr lang="en-US"/>
-              <a:t>Nodejs Basics</a:t>
-            </a:r>
-            <a:endParaRPr lang="en-US" dirty="0"/>
-          </a:p>
-        </p:txBody>
-      </p:sp>
-      <p:sp>
-        <p:nvSpPr>
-          <p:cNvPr id="5" name="Slide Number Placeholder 4">
-            <a:extLst>
-              <a:ext uri="{FF2B5EF4-FFF2-40B4-BE49-F238E27FC236}">
-                <a16:creationId xmlns:a16="http://schemas.microsoft.com/office/drawing/2014/main" id="{DADCC05A-E211-4F4B-9AA9-1CB11FE83FB4}"/>
-              </a:ext>
-            </a:extLst>
-          </p:cNvPr>
-          <p:cNvSpPr>
-            <a:spLocks noGrp="1"/>
-          </p:cNvSpPr>
-          <p:nvPr>
-            <p:ph type="sldNum" sz="quarter" idx="12"/>
-          </p:nvPr>
-        </p:nvSpPr>
-        <p:spPr/>
-        <p:txBody>
-          <a:bodyPr/>
-          <a:lstStyle/>
-          <a:p>
-            <a:fld id="{3A98EE3D-8CD1-4C3F-BD1C-C98C9596463C}" type="slidenum">
-              <a:rPr lang="en-US" smtClean="0"/>
-              <a:t>14</a:t>
-            </a:fld>
-            <a:endParaRPr lang="en-US" dirty="0"/>
-          </a:p>
-        </p:txBody>
-      </p:sp>
-    </p:spTree>
-    <p:extLst>
-      <p:ext uri="{BB962C8B-B14F-4D97-AF65-F5344CB8AC3E}">
-        <p14:creationId xmlns:p14="http://schemas.microsoft.com/office/powerpoint/2010/main" val="3193930332"/>
-      </p:ext>
-    </p:extLst>
-  </p:cSld>
-  <p:clrMapOvr>
-    <a:masterClrMapping/>
-  </p:clrMapOvr>
-</p:sld>
-</file>
-
-<file path=ppt/slides/slide15.xml><?xml version="1.0" encoding="utf-8"?>
-<p:sld xmlns:a="http://schemas.openxmlformats.org/drawingml/2006/main" xmlns:r="http://schemas.openxmlformats.org/officeDocument/2006/relationships" xmlns:p="http://schemas.openxmlformats.org/presentationml/2006/main">
-  <p:cSld>
-    <p:spTree>
-      <p:nvGrpSpPr>
-        <p:cNvPr id="1" name=""/>
-        <p:cNvGrpSpPr/>
-        <p:nvPr/>
-      </p:nvGrpSpPr>
-      <p:grpSpPr>
-        <a:xfrm>
-          <a:off x="0" y="0"/>
-          <a:ext cx="0" cy="0"/>
-          <a:chOff x="0" y="0"/>
-          <a:chExt cx="0" cy="0"/>
-        </a:xfrm>
-      </p:grpSpPr>
-      <p:sp>
-        <p:nvSpPr>
-          <p:cNvPr id="2" name="Title 1">
-            <a:extLst>
-              <a:ext uri="{FF2B5EF4-FFF2-40B4-BE49-F238E27FC236}">
-                <a16:creationId xmlns:a16="http://schemas.microsoft.com/office/drawing/2014/main" id="{60070020-B583-4B9E-9C23-16AB23FD7BDB}"/>
-              </a:ext>
-            </a:extLst>
-          </p:cNvPr>
-          <p:cNvSpPr>
-            <a:spLocks noGrp="1"/>
-          </p:cNvSpPr>
-          <p:nvPr>
-            <p:ph type="title"/>
-          </p:nvPr>
-        </p:nvSpPr>
-        <p:spPr/>
-        <p:txBody>
-          <a:bodyPr/>
-          <a:lstStyle/>
-          <a:p>
-            <a:r>
-              <a:rPr lang="en-US" dirty="0"/>
-              <a:t>Demo</a:t>
-            </a:r>
-          </a:p>
-        </p:txBody>
-      </p:sp>
-      <p:sp>
-        <p:nvSpPr>
-          <p:cNvPr id="3" name="Content Placeholder 2">
-            <a:extLst>
-              <a:ext uri="{FF2B5EF4-FFF2-40B4-BE49-F238E27FC236}">
-                <a16:creationId xmlns:a16="http://schemas.microsoft.com/office/drawing/2014/main" id="{76F2F745-7621-4900-82C9-22402813DCB5}"/>
-              </a:ext>
-            </a:extLst>
-          </p:cNvPr>
-          <p:cNvSpPr>
-            <a:spLocks noGrp="1"/>
-          </p:cNvSpPr>
-          <p:nvPr>
-            <p:ph idx="1"/>
-          </p:nvPr>
-        </p:nvSpPr>
-        <p:spPr/>
-        <p:txBody>
-          <a:bodyPr/>
-          <a:lstStyle/>
-          <a:p>
-            <a:r>
-              <a:rPr lang="en-US" dirty="0"/>
-              <a:t>How to use them?</a:t>
-            </a:r>
-          </a:p>
-          <a:p>
-            <a:pPr lvl="1"/>
-            <a:r>
-              <a:rPr lang="en-US" dirty="0"/>
-              <a:t>Middlewares are not bind to any methods, but instead to routes so</a:t>
-            </a:r>
-          </a:p>
-          <a:p>
-            <a:pPr lvl="2"/>
-            <a:r>
-              <a:rPr lang="en-US" dirty="0"/>
-              <a:t>You can’t inject them, you have to change your module structure as follows</a:t>
-            </a:r>
-          </a:p>
-          <a:p>
-            <a:pPr lvl="1"/>
-            <a:r>
-              <a:rPr lang="en-US" dirty="0"/>
-              <a:t>Implements </a:t>
-            </a:r>
-            <a:r>
-              <a:rPr lang="en-US" dirty="0" err="1"/>
-              <a:t>NestModule</a:t>
-            </a:r>
-            <a:r>
-              <a:rPr lang="en-US" dirty="0"/>
-              <a:t> interface</a:t>
-            </a:r>
-          </a:p>
-          <a:p>
-            <a:pPr lvl="2"/>
-            <a:r>
-              <a:rPr lang="en-US" dirty="0"/>
-              <a:t>Require you to define configure() function with a consumer</a:t>
-            </a:r>
-          </a:p>
-          <a:p>
-            <a:pPr lvl="2"/>
-            <a:r>
-              <a:rPr lang="en-US" dirty="0" err="1"/>
-              <a:t>consumer.apply</a:t>
-            </a:r>
-            <a:r>
-              <a:rPr lang="en-US" dirty="0"/>
-              <a:t>(your-middleware).</a:t>
-            </a:r>
-            <a:r>
-              <a:rPr lang="en-US" dirty="0" err="1"/>
-              <a:t>forRoutes</a:t>
-            </a:r>
-            <a:r>
-              <a:rPr lang="en-US" dirty="0"/>
-              <a:t>(‘*’)</a:t>
-            </a:r>
-          </a:p>
-          <a:p>
-            <a:pPr lvl="2"/>
-            <a:r>
-              <a:rPr lang="en-US" dirty="0"/>
-              <a:t>You can exclude() some routes</a:t>
-            </a:r>
-          </a:p>
-          <a:p>
-            <a:pPr lvl="1"/>
-            <a:r>
-              <a:rPr lang="en-US" dirty="0"/>
-              <a:t>Add our callback to finish event on res</a:t>
-            </a:r>
-          </a:p>
-        </p:txBody>
-      </p:sp>
-      <p:sp>
-        <p:nvSpPr>
-          <p:cNvPr id="4" name="Footer Placeholder 3">
-            <a:extLst>
-              <a:ext uri="{FF2B5EF4-FFF2-40B4-BE49-F238E27FC236}">
-                <a16:creationId xmlns:a16="http://schemas.microsoft.com/office/drawing/2014/main" id="{98E37E77-EC0E-4CD0-8FC5-ADCDD08502F6}"/>
-              </a:ext>
-            </a:extLst>
-          </p:cNvPr>
-          <p:cNvSpPr>
-            <a:spLocks noGrp="1"/>
-          </p:cNvSpPr>
-          <p:nvPr>
-            <p:ph type="ftr" sz="quarter" idx="11"/>
-          </p:nvPr>
-        </p:nvSpPr>
-        <p:spPr/>
-        <p:txBody>
-          <a:bodyPr/>
-          <a:lstStyle/>
-          <a:p>
-            <a:r>
-              <a:rPr lang="en-US"/>
-              <a:t>Nodejs Basics</a:t>
-            </a:r>
-            <a:endParaRPr lang="en-US" dirty="0"/>
-          </a:p>
-        </p:txBody>
-      </p:sp>
-      <p:sp>
-        <p:nvSpPr>
-          <p:cNvPr id="5" name="Slide Number Placeholder 4">
-            <a:extLst>
-              <a:ext uri="{FF2B5EF4-FFF2-40B4-BE49-F238E27FC236}">
-                <a16:creationId xmlns:a16="http://schemas.microsoft.com/office/drawing/2014/main" id="{A1C9AFEB-A955-463C-940F-72A39F2D653F}"/>
-              </a:ext>
-            </a:extLst>
-          </p:cNvPr>
-          <p:cNvSpPr>
-            <a:spLocks noGrp="1"/>
-          </p:cNvSpPr>
-          <p:nvPr>
-            <p:ph type="sldNum" sz="quarter" idx="12"/>
-          </p:nvPr>
-        </p:nvSpPr>
-        <p:spPr/>
-        <p:txBody>
-          <a:bodyPr/>
-          <a:lstStyle/>
-          <a:p>
-            <a:fld id="{3A98EE3D-8CD1-4C3F-BD1C-C98C9596463C}" type="slidenum">
-              <a:rPr lang="en-US" smtClean="0"/>
-              <a:t>15</a:t>
-            </a:fld>
-            <a:endParaRPr lang="en-US" dirty="0"/>
-          </a:p>
-        </p:txBody>
-      </p:sp>
-    </p:spTree>
-    <p:extLst>
-      <p:ext uri="{BB962C8B-B14F-4D97-AF65-F5344CB8AC3E}">
-        <p14:creationId xmlns:p14="http://schemas.microsoft.com/office/powerpoint/2010/main" val="3784153259"/>
-      </p:ext>
-    </p:extLst>
-  </p:cSld>
-  <p:clrMapOvr>
-    <a:masterClrMapping/>
-  </p:clrMapOvr>
-</p:sld>
-</file>
-
-<file path=ppt/slides/slide16.xml><?xml version="1.0" encoding="utf-8"?>
-<p:sld xmlns:a="http://schemas.openxmlformats.org/drawingml/2006/main" xmlns:r="http://schemas.openxmlformats.org/officeDocument/2006/relationships" xmlns:p="http://schemas.openxmlformats.org/presentationml/2006/main">
-  <p:cSld>
-    <p:spTree>
-      <p:nvGrpSpPr>
-        <p:cNvPr id="1" name=""/>
-        <p:cNvGrpSpPr/>
-        <p:nvPr/>
-      </p:nvGrpSpPr>
-      <p:grpSpPr>
-        <a:xfrm>
-          <a:off x="0" y="0"/>
-          <a:ext cx="0" cy="0"/>
-          <a:chOff x="0" y="0"/>
-          <a:chExt cx="0" cy="0"/>
-        </a:xfrm>
-      </p:grpSpPr>
-      <p:sp>
-        <p:nvSpPr>
-          <p:cNvPr id="2" name="Title 1">
-            <a:extLst>
-              <a:ext uri="{FF2B5EF4-FFF2-40B4-BE49-F238E27FC236}">
                 <a16:creationId xmlns:a16="http://schemas.microsoft.com/office/drawing/2014/main" id="{6ED9877A-E202-4619-8997-A577FDC71D18}"/>
               </a:ext>
             </a:extLst>
@@ -8143,7 +7569,7 @@
           <a:p>
             <a:fld id="{3A98EE3D-8CD1-4C3F-BD1C-C98C9596463C}" type="slidenum">
               <a:rPr lang="en-US" smtClean="0"/>
-              <a:t>16</a:t>
+              <a:t>13</a:t>
             </a:fld>
             <a:endParaRPr lang="en-US" dirty="0"/>
           </a:p>
@@ -8256,7 +7682,7 @@
 </p:sld>
 </file>
 
-<file path=ppt/slides/slide17.xml><?xml version="1.0" encoding="utf-8"?>
+<file path=ppt/slides/slide14.xml><?xml version="1.0" encoding="utf-8"?>
 <p:sld xmlns:a="http://schemas.openxmlformats.org/drawingml/2006/main" xmlns:r="http://schemas.openxmlformats.org/officeDocument/2006/relationships" xmlns:p="http://schemas.openxmlformats.org/presentationml/2006/main">
   <p:cSld>
     <p:spTree>
@@ -8426,7 +7852,7 @@
           <a:p>
             <a:fld id="{3A98EE3D-8CD1-4C3F-BD1C-C98C9596463C}" type="slidenum">
               <a:rPr lang="en-US" smtClean="0"/>
-              <a:t>17</a:t>
+              <a:t>14</a:t>
             </a:fld>
             <a:endParaRPr lang="en-US" dirty="0"/>
           </a:p>
@@ -8540,16 +7966,6 @@
                 </a:solidFill>
               </a:rPr>
               <a:t>Creating Custom Pipes</a:t>
-            </a:r>
-          </a:p>
-          <a:p>
-            <a:r>
-              <a:rPr lang="en-US" dirty="0">
-                <a:solidFill>
-                  <a:schemeClr val="tx1"/>
-                </a:solidFill>
-              </a:rPr>
-              <a:t>Add Request Logging with Middlewares</a:t>
             </a:r>
           </a:p>
         </p:txBody>

</xml_diff>